<commit_message>
Removed slide Why Go
</commit_message>
<xml_diff>
--- a/go/Go.pptx
+++ b/go/Go.pptx
@@ -5,27 +5,26 @@
     <p:sldMasterId id="2147483707" r:id="rId4"/>
   </p:sldMasterIdLst>
   <p:notesMasterIdLst>
-    <p:notesMasterId r:id="rId23"/>
+    <p:notesMasterId r:id="rId22"/>
   </p:notesMasterIdLst>
   <p:sldIdLst>
     <p:sldId id="328" r:id="rId5"/>
     <p:sldId id="415" r:id="rId6"/>
-    <p:sldId id="417" r:id="rId7"/>
-    <p:sldId id="418" r:id="rId8"/>
-    <p:sldId id="419" r:id="rId9"/>
-    <p:sldId id="427" r:id="rId10"/>
-    <p:sldId id="426" r:id="rId11"/>
-    <p:sldId id="420" r:id="rId12"/>
-    <p:sldId id="422" r:id="rId13"/>
-    <p:sldId id="423" r:id="rId14"/>
-    <p:sldId id="424" r:id="rId15"/>
-    <p:sldId id="425" r:id="rId16"/>
-    <p:sldId id="428" r:id="rId17"/>
-    <p:sldId id="421" r:id="rId18"/>
-    <p:sldId id="430" r:id="rId19"/>
-    <p:sldId id="429" r:id="rId20"/>
-    <p:sldId id="431" r:id="rId21"/>
-    <p:sldId id="414" r:id="rId22"/>
+    <p:sldId id="418" r:id="rId7"/>
+    <p:sldId id="419" r:id="rId8"/>
+    <p:sldId id="427" r:id="rId9"/>
+    <p:sldId id="426" r:id="rId10"/>
+    <p:sldId id="420" r:id="rId11"/>
+    <p:sldId id="422" r:id="rId12"/>
+    <p:sldId id="423" r:id="rId13"/>
+    <p:sldId id="424" r:id="rId14"/>
+    <p:sldId id="425" r:id="rId15"/>
+    <p:sldId id="428" r:id="rId16"/>
+    <p:sldId id="421" r:id="rId17"/>
+    <p:sldId id="430" r:id="rId18"/>
+    <p:sldId id="429" r:id="rId19"/>
+    <p:sldId id="431" r:id="rId20"/>
+    <p:sldId id="414" r:id="rId21"/>
   </p:sldIdLst>
   <p:sldSz cx="9144000" cy="5143500" type="screen16x9"/>
   <p:notesSz cx="6858000" cy="9144000"/>
@@ -231,7 +230,7 @@
             <a:fld id="{6C5D2418-5498-496B-9B3E-912B9D6443B9}" type="datetimeFigureOut">
               <a:rPr lang="en-US" smtClean="0"/>
               <a:pPr/>
-              <a:t>2/11/2016</a:t>
+              <a:t>2/14/2016</a:t>
             </a:fld>
             <a:endParaRPr lang="en-US"/>
           </a:p>
@@ -705,7 +704,7 @@
             <a:fld id="{DBDA5EBE-E194-4A8A-BBBE-6B90DE9885F5}" type="slidenum">
               <a:rPr lang="en-US" smtClean="0"/>
               <a:pPr/>
-              <a:t>18</a:t>
+              <a:t>17</a:t>
             </a:fld>
             <a:endParaRPr lang="en-US"/>
           </a:p>
@@ -7319,7 +7318,7 @@
             <a:fld id="{1D8BD707-D9CF-40AE-B4C6-C98DA3205C09}" type="datetimeFigureOut">
               <a:rPr lang="en-US"/>
               <a:pPr/>
-              <a:t>2/11/2016</a:t>
+              <a:t>2/14/2016</a:t>
             </a:fld>
             <a:endParaRPr lang="en-US"/>
           </a:p>
@@ -11871,7 +11870,7 @@
           <a:p>
             <a:r>
               <a:rPr lang="en-US" dirty="0" smtClean="0"/>
-              <a:t>Short variable declaration</a:t>
+              <a:t>Basic data types</a:t>
             </a:r>
             <a:endParaRPr lang="en-US" dirty="0"/>
           </a:p>
@@ -11889,45 +11888,100 @@
         </p:nvSpPr>
         <p:spPr/>
         <p:txBody>
-          <a:bodyPr/>
+          <a:bodyPr>
+            <a:normAutofit fontScale="92500" lnSpcReduction="10000"/>
+          </a:bodyPr>
           <a:lstStyle/>
           <a:p>
             <a:r>
               <a:rPr lang="en-US" dirty="0"/>
-              <a:t>Inside a function, the := short assignment statement can be used in place of a </a:t>
-            </a:r>
+              <a:t>bool</a:t>
+            </a:r>
+          </a:p>
+          <a:p>
+            <a:r>
+              <a:rPr lang="en-US" dirty="0" smtClean="0"/>
+              <a:t>string</a:t>
+            </a:r>
+            <a:endParaRPr lang="en-US" dirty="0"/>
+          </a:p>
+          <a:p>
+            <a:r>
+              <a:rPr lang="en-US" dirty="0" err="1" smtClean="0"/>
+              <a:t>int</a:t>
+            </a:r>
+            <a:r>
+              <a:rPr lang="en-US" dirty="0" smtClean="0"/>
+              <a:t>  </a:t>
+            </a:r>
+            <a:r>
+              <a:rPr lang="en-US" dirty="0"/>
+              <a:t>int8  int16  int32  int64</a:t>
+            </a:r>
+          </a:p>
+          <a:p>
             <a:r>
               <a:rPr lang="en-US" dirty="0" err="1"/>
-              <a:t>var</a:t>
+              <a:t>uint</a:t>
             </a:r>
             <a:r>
               <a:rPr lang="en-US" dirty="0"/>
-              <a:t> declaration with implicit type.</a:t>
-            </a:r>
-          </a:p>
-          <a:p>
+              <a:t> uint8 uint16 uint32 uint64 </a:t>
+            </a:r>
+            <a:r>
+              <a:rPr lang="en-US" dirty="0" err="1" smtClean="0"/>
+              <a:t>uintptr</a:t>
+            </a:r>
+            <a:r>
+              <a:rPr lang="en-US" dirty="0" smtClean="0"/>
+              <a:t> //unsigned integer – only positive integers</a:t>
+            </a:r>
             <a:endParaRPr lang="en-US" dirty="0"/>
           </a:p>
           <a:p>
             <a:r>
+              <a:rPr lang="en-US" dirty="0" smtClean="0"/>
+              <a:t>byte </a:t>
+            </a:r>
+            <a:r>
               <a:rPr lang="en-US" dirty="0"/>
-              <a:t>Outside a function, every statement begins with a keyword (</a:t>
-            </a:r>
-            <a:r>
-              <a:rPr lang="en-US" dirty="0" err="1"/>
-              <a:t>var</a:t>
+              <a:t>// alias for uint8</a:t>
+            </a:r>
+          </a:p>
+          <a:p>
+            <a:r>
+              <a:rPr lang="en-US" dirty="0" smtClean="0"/>
+              <a:t>rune </a:t>
             </a:r>
             <a:r>
               <a:rPr lang="en-US" dirty="0"/>
-              <a:t>, </a:t>
-            </a:r>
-            <a:r>
-              <a:rPr lang="en-US" dirty="0" err="1"/>
-              <a:t>func</a:t>
-            </a:r>
+              <a:t>// alias for int32</a:t>
+            </a:r>
+          </a:p>
+          <a:p>
             <a:r>
               <a:rPr lang="en-US" dirty="0"/>
-              <a:t>, and so on) and so the := construct is not available.</a:t>
+              <a:t>     // represents a Unicode code point</a:t>
+            </a:r>
+          </a:p>
+          <a:p>
+            <a:r>
+              <a:rPr lang="en-US" dirty="0" smtClean="0"/>
+              <a:t>float32 </a:t>
+            </a:r>
+            <a:r>
+              <a:rPr lang="en-US" dirty="0"/>
+              <a:t>float64</a:t>
+            </a:r>
+          </a:p>
+          <a:p>
+            <a:r>
+              <a:rPr lang="en-US" dirty="0" smtClean="0"/>
+              <a:t>complex64 </a:t>
+            </a:r>
+            <a:r>
+              <a:rPr lang="en-US" dirty="0"/>
+              <a:t>complex128</a:t>
             </a:r>
           </a:p>
         </p:txBody>
@@ -11935,7 +11989,7 @@
     </p:spTree>
     <p:extLst>
       <p:ext uri="{BB962C8B-B14F-4D97-AF65-F5344CB8AC3E}">
-        <p14:creationId xmlns:p14="http://schemas.microsoft.com/office/powerpoint/2010/main" val="1230287746"/>
+        <p14:creationId xmlns:p14="http://schemas.microsoft.com/office/powerpoint/2010/main" val="553510561"/>
       </p:ext>
     </p:extLst>
   </p:cSld>
@@ -11979,7 +12033,7 @@
           <a:p>
             <a:r>
               <a:rPr lang="en-US" dirty="0" smtClean="0"/>
-              <a:t>Basic data types</a:t>
+              <a:t>Constants</a:t>
             </a:r>
             <a:endParaRPr lang="en-US" dirty="0"/>
           </a:p>
@@ -11997,100 +12051,46 @@
         </p:nvSpPr>
         <p:spPr/>
         <p:txBody>
-          <a:bodyPr>
-            <a:normAutofit fontScale="92500" lnSpcReduction="10000"/>
-          </a:bodyPr>
+          <a:bodyPr/>
           <a:lstStyle/>
           <a:p>
             <a:r>
               <a:rPr lang="en-US" dirty="0"/>
-              <a:t>bool</a:t>
-            </a:r>
-          </a:p>
-          <a:p>
-            <a:r>
-              <a:rPr lang="en-US" dirty="0" smtClean="0"/>
-              <a:t>string</a:t>
-            </a:r>
+              <a:t>Constants are declared like variables, but with the </a:t>
+            </a:r>
+            <a:r>
+              <a:rPr lang="en-US" dirty="0" err="1"/>
+              <a:t>const</a:t>
+            </a:r>
+            <a:r>
+              <a:rPr lang="en-US" dirty="0"/>
+              <a:t> keyword.</a:t>
+            </a:r>
+          </a:p>
+          <a:p>
             <a:endParaRPr lang="en-US" dirty="0"/>
           </a:p>
           <a:p>
             <a:r>
-              <a:rPr lang="en-US" dirty="0" err="1" smtClean="0"/>
-              <a:t>int</a:t>
-            </a:r>
-            <a:r>
-              <a:rPr lang="en-US" dirty="0" smtClean="0"/>
-              <a:t>  </a:t>
-            </a:r>
-            <a:r>
               <a:rPr lang="en-US" dirty="0"/>
-              <a:t>int8  int16  int32  int64</a:t>
-            </a:r>
-          </a:p>
-          <a:p>
+              <a:t>Constants can be character, string, </a:t>
+            </a:r>
             <a:r>
               <a:rPr lang="en-US" dirty="0" err="1"/>
-              <a:t>uint</a:t>
+              <a:t>boolean</a:t>
             </a:r>
             <a:r>
               <a:rPr lang="en-US" dirty="0"/>
-              <a:t> uint8 uint16 uint32 uint64 </a:t>
-            </a:r>
-            <a:r>
-              <a:rPr lang="en-US" dirty="0" err="1" smtClean="0"/>
-              <a:t>uintptr</a:t>
-            </a:r>
-            <a:r>
-              <a:rPr lang="en-US" dirty="0" smtClean="0"/>
-              <a:t> //unsigned integer – only positive integers</a:t>
-            </a:r>
+              <a:t>, or numeric values.</a:t>
+            </a:r>
+          </a:p>
+          <a:p>
             <a:endParaRPr lang="en-US" dirty="0"/>
           </a:p>
           <a:p>
             <a:r>
-              <a:rPr lang="en-US" dirty="0" smtClean="0"/>
-              <a:t>byte </a:t>
-            </a:r>
-            <a:r>
               <a:rPr lang="en-US" dirty="0"/>
-              <a:t>// alias for uint8</a:t>
-            </a:r>
-          </a:p>
-          <a:p>
-            <a:r>
-              <a:rPr lang="en-US" dirty="0" smtClean="0"/>
-              <a:t>rune </a:t>
-            </a:r>
-            <a:r>
-              <a:rPr lang="en-US" dirty="0"/>
-              <a:t>// alias for int32</a:t>
-            </a:r>
-          </a:p>
-          <a:p>
-            <a:r>
-              <a:rPr lang="en-US" dirty="0"/>
-              <a:t>     // represents a Unicode code point</a:t>
-            </a:r>
-          </a:p>
-          <a:p>
-            <a:r>
-              <a:rPr lang="en-US" dirty="0" smtClean="0"/>
-              <a:t>float32 </a:t>
-            </a:r>
-            <a:r>
-              <a:rPr lang="en-US" dirty="0"/>
-              <a:t>float64</a:t>
-            </a:r>
-          </a:p>
-          <a:p>
-            <a:r>
-              <a:rPr lang="en-US" dirty="0" smtClean="0"/>
-              <a:t>complex64 </a:t>
-            </a:r>
-            <a:r>
-              <a:rPr lang="en-US" dirty="0"/>
-              <a:t>complex128</a:t>
+              <a:t>Constants cannot be declared using the := syntax.</a:t>
             </a:r>
           </a:p>
         </p:txBody>
@@ -12098,7 +12098,7 @@
     </p:spTree>
     <p:extLst>
       <p:ext uri="{BB962C8B-B14F-4D97-AF65-F5344CB8AC3E}">
-        <p14:creationId xmlns:p14="http://schemas.microsoft.com/office/powerpoint/2010/main" val="553510561"/>
+        <p14:creationId xmlns:p14="http://schemas.microsoft.com/office/powerpoint/2010/main" val="2892542115"/>
       </p:ext>
     </p:extLst>
   </p:cSld>
@@ -12127,22 +12127,24 @@
       </p:grpSpPr>
       <p:sp>
         <p:nvSpPr>
-          <p:cNvPr id="2" name="Title 1"/>
-          <p:cNvSpPr>
-            <a:spLocks noGrp="1"/>
-          </p:cNvSpPr>
-          <p:nvPr>
-            <p:ph type="title"/>
+          <p:cNvPr id="4" name="Text Placeholder 3"/>
+          <p:cNvSpPr>
+            <a:spLocks noGrp="1"/>
+          </p:cNvSpPr>
+          <p:nvPr>
+            <p:ph type="body" sz="quarter" idx="11"/>
           </p:nvPr>
         </p:nvSpPr>
         <p:spPr/>
         <p:txBody>
-          <a:bodyPr/>
+          <a:bodyPr>
+            <a:normAutofit fontScale="92500" lnSpcReduction="20000"/>
+          </a:bodyPr>
           <a:lstStyle/>
           <a:p>
             <a:r>
               <a:rPr lang="en-US" dirty="0" smtClean="0"/>
-              <a:t>Constants</a:t>
+              <a:t>Flow control statements</a:t>
             </a:r>
             <a:endParaRPr lang="en-US" dirty="0"/>
           </a:p>
@@ -12150,64 +12152,29 @@
       </p:sp>
       <p:sp>
         <p:nvSpPr>
-          <p:cNvPr id="3" name="Content Placeholder 2"/>
-          <p:cNvSpPr>
-            <a:spLocks noGrp="1"/>
-          </p:cNvSpPr>
-          <p:nvPr>
-            <p:ph idx="1"/>
+          <p:cNvPr id="5" name="Text Placeholder 4"/>
+          <p:cNvSpPr>
+            <a:spLocks noGrp="1"/>
+          </p:cNvSpPr>
+          <p:nvPr>
+            <p:ph type="body" sz="quarter" idx="12"/>
           </p:nvPr>
         </p:nvSpPr>
         <p:spPr/>
         <p:txBody>
-          <a:bodyPr/>
+          <a:bodyPr>
+            <a:normAutofit lnSpcReduction="10000"/>
+          </a:bodyPr>
           <a:lstStyle/>
           <a:p>
-            <a:r>
-              <a:rPr lang="en-US" dirty="0"/>
-              <a:t>Constants are declared like variables, but with the </a:t>
-            </a:r>
-            <a:r>
-              <a:rPr lang="en-US" dirty="0" err="1"/>
-              <a:t>const</a:t>
-            </a:r>
-            <a:r>
-              <a:rPr lang="en-US" dirty="0"/>
-              <a:t> keyword.</a:t>
-            </a:r>
-          </a:p>
-          <a:p>
-            <a:endParaRPr lang="en-US" dirty="0"/>
-          </a:p>
-          <a:p>
-            <a:r>
-              <a:rPr lang="en-US" dirty="0"/>
-              <a:t>Constants can be character, string, </a:t>
-            </a:r>
-            <a:r>
-              <a:rPr lang="en-US" dirty="0" err="1"/>
-              <a:t>boolean</a:t>
-            </a:r>
-            <a:r>
-              <a:rPr lang="en-US" dirty="0"/>
-              <a:t>, or numeric values.</a:t>
-            </a:r>
-          </a:p>
-          <a:p>
-            <a:endParaRPr lang="en-US" dirty="0"/>
-          </a:p>
-          <a:p>
-            <a:r>
-              <a:rPr lang="en-US" dirty="0"/>
-              <a:t>Constants cannot be declared using the := syntax.</a:t>
-            </a:r>
+            <a:endParaRPr lang="en-US"/>
           </a:p>
         </p:txBody>
       </p:sp>
     </p:spTree>
     <p:extLst>
       <p:ext uri="{BB962C8B-B14F-4D97-AF65-F5344CB8AC3E}">
-        <p14:creationId xmlns:p14="http://schemas.microsoft.com/office/powerpoint/2010/main" val="2892542115"/>
+        <p14:creationId xmlns:p14="http://schemas.microsoft.com/office/powerpoint/2010/main" val="707752395"/>
       </p:ext>
     </p:extLst>
   </p:cSld>
@@ -12236,54 +12203,126 @@
       </p:grpSpPr>
       <p:sp>
         <p:nvSpPr>
-          <p:cNvPr id="4" name="Text Placeholder 3"/>
-          <p:cNvSpPr>
-            <a:spLocks noGrp="1"/>
-          </p:cNvSpPr>
-          <p:nvPr>
-            <p:ph type="body" sz="quarter" idx="11"/>
+          <p:cNvPr id="2" name="Title 1"/>
+          <p:cNvSpPr>
+            <a:spLocks noGrp="1"/>
+          </p:cNvSpPr>
+          <p:nvPr>
+            <p:ph type="title"/>
           </p:nvPr>
         </p:nvSpPr>
         <p:spPr/>
         <p:txBody>
+          <a:bodyPr/>
+          <a:lstStyle/>
+          <a:p>
+            <a:r>
+              <a:rPr lang="en-US" dirty="0" smtClean="0"/>
+              <a:t>For</a:t>
+            </a:r>
+            <a:endParaRPr lang="en-US" dirty="0"/>
+          </a:p>
+        </p:txBody>
+      </p:sp>
+      <p:sp>
+        <p:nvSpPr>
+          <p:cNvPr id="3" name="Content Placeholder 2"/>
+          <p:cNvSpPr>
+            <a:spLocks noGrp="1"/>
+          </p:cNvSpPr>
+          <p:nvPr>
+            <p:ph idx="1"/>
+          </p:nvPr>
+        </p:nvSpPr>
+        <p:spPr/>
+        <p:txBody>
           <a:bodyPr>
-            <a:normAutofit fontScale="92500" lnSpcReduction="20000"/>
+            <a:normAutofit fontScale="92500"/>
           </a:bodyPr>
           <a:lstStyle/>
           <a:p>
             <a:r>
+              <a:rPr lang="en-US" dirty="0"/>
+              <a:t>Go has only one looping construct, the for loop.</a:t>
+            </a:r>
+          </a:p>
+          <a:p>
+            <a:r>
               <a:rPr lang="en-US" dirty="0" smtClean="0"/>
-              <a:t>Flow control statements</a:t>
-            </a:r>
-            <a:endParaRPr lang="en-US" dirty="0"/>
-          </a:p>
-        </p:txBody>
-      </p:sp>
-      <p:sp>
-        <p:nvSpPr>
-          <p:cNvPr id="5" name="Text Placeholder 4"/>
-          <p:cNvSpPr>
-            <a:spLocks noGrp="1"/>
-          </p:cNvSpPr>
-          <p:nvPr>
-            <p:ph type="body" sz="quarter" idx="12"/>
-          </p:nvPr>
-        </p:nvSpPr>
-        <p:spPr/>
-        <p:txBody>
-          <a:bodyPr>
-            <a:normAutofit lnSpcReduction="10000"/>
-          </a:bodyPr>
-          <a:lstStyle/>
-          <a:p>
-            <a:endParaRPr lang="en-US"/>
+              <a:t>The </a:t>
+            </a:r>
+            <a:r>
+              <a:rPr lang="en-US" dirty="0"/>
+              <a:t>basic for loop has three components separated by semicolons:</a:t>
+            </a:r>
+          </a:p>
+          <a:p>
+            <a:pPr lvl="1"/>
+            <a:r>
+              <a:rPr lang="en-US" dirty="0" smtClean="0"/>
+              <a:t>the </a:t>
+            </a:r>
+            <a:r>
+              <a:rPr lang="en-US" dirty="0" err="1"/>
+              <a:t>init</a:t>
+            </a:r>
+            <a:r>
+              <a:rPr lang="en-US" dirty="0"/>
+              <a:t> statement: executed before the first iteration</a:t>
+            </a:r>
+          </a:p>
+          <a:p>
+            <a:pPr lvl="1"/>
+            <a:r>
+              <a:rPr lang="en-US" dirty="0"/>
+              <a:t>the condition expression: evaluated before every iteration</a:t>
+            </a:r>
+          </a:p>
+          <a:p>
+            <a:pPr lvl="1"/>
+            <a:r>
+              <a:rPr lang="en-US" dirty="0"/>
+              <a:t>the post statement: executed at the end of every iteration</a:t>
+            </a:r>
+          </a:p>
+          <a:p>
+            <a:r>
+              <a:rPr lang="en-US" dirty="0"/>
+              <a:t>The </a:t>
+            </a:r>
+            <a:r>
+              <a:rPr lang="en-US" dirty="0" err="1"/>
+              <a:t>init</a:t>
+            </a:r>
+            <a:r>
+              <a:rPr lang="en-US" dirty="0"/>
+              <a:t> statement will often be a short variable declaration, and the variables declared there are visible only in the scope of the for statement.</a:t>
+            </a:r>
+          </a:p>
+          <a:p>
+            <a:r>
+              <a:rPr lang="en-US" dirty="0" smtClean="0"/>
+              <a:t>The </a:t>
+            </a:r>
+            <a:r>
+              <a:rPr lang="en-US" dirty="0"/>
+              <a:t>loop will stop iterating once the </a:t>
+            </a:r>
+            <a:r>
+              <a:rPr lang="en-US" dirty="0" err="1"/>
+              <a:t>boolean</a:t>
+            </a:r>
+            <a:r>
+              <a:rPr lang="en-US" dirty="0"/>
+              <a:t> condition evaluates to false.</a:t>
+            </a:r>
           </a:p>
         </p:txBody>
       </p:sp>
     </p:spTree>
     <p:extLst>
       <p:ext uri="{BB962C8B-B14F-4D97-AF65-F5344CB8AC3E}">
-        <p14:creationId xmlns:p14="http://schemas.microsoft.com/office/powerpoint/2010/main" val="707752395"/>
+        <p14:creationId xmlns:p14="http://schemas.microsoft.com/office/powerpoint/2010/main" val="3200743104"/>
       </p:ext>
     </p:extLst>
   </p:cSld>
@@ -12327,7 +12366,7 @@
           <a:p>
             <a:r>
               <a:rPr lang="en-US" dirty="0" smtClean="0"/>
-              <a:t>For</a:t>
+              <a:t>Switch…case…default</a:t>
             </a:r>
             <a:endParaRPr lang="en-US" dirty="0"/>
           </a:p>
@@ -12345,85 +12384,19 @@
         </p:nvSpPr>
         <p:spPr/>
         <p:txBody>
-          <a:bodyPr>
-            <a:normAutofit fontScale="92500"/>
-          </a:bodyPr>
+          <a:bodyPr/>
           <a:lstStyle/>
           <a:p>
             <a:r>
               <a:rPr lang="en-US" dirty="0"/>
-              <a:t>Go has only one looping construct, the for loop.</a:t>
-            </a:r>
-          </a:p>
-          <a:p>
-            <a:r>
-              <a:rPr lang="en-US" dirty="0" smtClean="0"/>
-              <a:t>The </a:t>
-            </a:r>
+              <a:t>Switch evaluation order</a:t>
+            </a:r>
+          </a:p>
+          <a:p>
+            <a:pPr lvl="1"/>
             <a:r>
               <a:rPr lang="en-US" dirty="0"/>
-              <a:t>basic for loop has three components separated by semicolons:</a:t>
-            </a:r>
-          </a:p>
-          <a:p>
-            <a:pPr lvl="1"/>
-            <a:r>
-              <a:rPr lang="en-US" dirty="0" smtClean="0"/>
-              <a:t>the </a:t>
-            </a:r>
-            <a:r>
-              <a:rPr lang="en-US" dirty="0" err="1"/>
-              <a:t>init</a:t>
-            </a:r>
-            <a:r>
-              <a:rPr lang="en-US" dirty="0"/>
-              <a:t> statement: executed before the first iteration</a:t>
-            </a:r>
-          </a:p>
-          <a:p>
-            <a:pPr lvl="1"/>
-            <a:r>
-              <a:rPr lang="en-US" dirty="0"/>
-              <a:t>the condition expression: evaluated before every iteration</a:t>
-            </a:r>
-          </a:p>
-          <a:p>
-            <a:pPr lvl="1"/>
-            <a:r>
-              <a:rPr lang="en-US" dirty="0"/>
-              <a:t>the post statement: executed at the end of every iteration</a:t>
-            </a:r>
-          </a:p>
-          <a:p>
-            <a:r>
-              <a:rPr lang="en-US" dirty="0"/>
-              <a:t>The </a:t>
-            </a:r>
-            <a:r>
-              <a:rPr lang="en-US" dirty="0" err="1"/>
-              <a:t>init</a:t>
-            </a:r>
-            <a:r>
-              <a:rPr lang="en-US" dirty="0"/>
-              <a:t> statement will often be a short variable declaration, and the variables declared there are visible only in the scope of the for statement.</a:t>
-            </a:r>
-          </a:p>
-          <a:p>
-            <a:r>
-              <a:rPr lang="en-US" dirty="0" smtClean="0"/>
-              <a:t>The </a:t>
-            </a:r>
-            <a:r>
-              <a:rPr lang="en-US" dirty="0"/>
-              <a:t>loop will stop iterating once the </a:t>
-            </a:r>
-            <a:r>
-              <a:rPr lang="en-US" dirty="0" err="1"/>
-              <a:t>boolean</a:t>
-            </a:r>
-            <a:r>
-              <a:rPr lang="en-US" dirty="0"/>
-              <a:t> condition evaluates to false.</a:t>
+              <a:t>Switch cases evaluate cases from top to bottom, stopping when a case succeeds.</a:t>
             </a:r>
           </a:p>
         </p:txBody>
@@ -12431,7 +12404,7 @@
     </p:spTree>
     <p:extLst>
       <p:ext uri="{BB962C8B-B14F-4D97-AF65-F5344CB8AC3E}">
-        <p14:creationId xmlns:p14="http://schemas.microsoft.com/office/powerpoint/2010/main" val="3200743104"/>
+        <p14:creationId xmlns:p14="http://schemas.microsoft.com/office/powerpoint/2010/main" val="2315901959"/>
       </p:ext>
     </p:extLst>
   </p:cSld>
@@ -12475,7 +12448,7 @@
           <a:p>
             <a:r>
               <a:rPr lang="en-US" dirty="0" smtClean="0"/>
-              <a:t>Switch…case…default</a:t>
+              <a:t>Defer</a:t>
             </a:r>
             <a:endParaRPr lang="en-US" dirty="0"/>
           </a:p>
@@ -12498,14 +12471,16 @@
           <a:p>
             <a:r>
               <a:rPr lang="en-US" dirty="0"/>
-              <a:t>Switch evaluation order</a:t>
-            </a:r>
-          </a:p>
-          <a:p>
-            <a:pPr lvl="1"/>
+              <a:t>A defer statement defers the execution of a function until the surrounding function returns.</a:t>
+            </a:r>
+          </a:p>
+          <a:p>
+            <a:endParaRPr lang="en-US" dirty="0"/>
+          </a:p>
+          <a:p>
             <a:r>
               <a:rPr lang="en-US" dirty="0"/>
-              <a:t>Switch cases evaluate cases from top to bottom, stopping when a case succeeds.</a:t>
+              <a:t>The deferred call's arguments are evaluated immediately, but the function call is not executed until the surrounding function returns.</a:t>
             </a:r>
           </a:p>
         </p:txBody>
@@ -12513,7 +12488,7 @@
     </p:spTree>
     <p:extLst>
       <p:ext uri="{BB962C8B-B14F-4D97-AF65-F5344CB8AC3E}">
-        <p14:creationId xmlns:p14="http://schemas.microsoft.com/office/powerpoint/2010/main" val="2315901959"/>
+        <p14:creationId xmlns:p14="http://schemas.microsoft.com/office/powerpoint/2010/main" val="1058348243"/>
       </p:ext>
     </p:extLst>
   </p:cSld>
@@ -12557,90 +12532,6 @@
           <a:p>
             <a:r>
               <a:rPr lang="en-US" dirty="0" smtClean="0"/>
-              <a:t>Defer</a:t>
-            </a:r>
-            <a:endParaRPr lang="en-US" dirty="0"/>
-          </a:p>
-        </p:txBody>
-      </p:sp>
-      <p:sp>
-        <p:nvSpPr>
-          <p:cNvPr id="3" name="Content Placeholder 2"/>
-          <p:cNvSpPr>
-            <a:spLocks noGrp="1"/>
-          </p:cNvSpPr>
-          <p:nvPr>
-            <p:ph idx="1"/>
-          </p:nvPr>
-        </p:nvSpPr>
-        <p:spPr/>
-        <p:txBody>
-          <a:bodyPr/>
-          <a:lstStyle/>
-          <a:p>
-            <a:r>
-              <a:rPr lang="en-US" dirty="0"/>
-              <a:t>A defer statement defers the execution of a function until the surrounding function returns.</a:t>
-            </a:r>
-          </a:p>
-          <a:p>
-            <a:endParaRPr lang="en-US" dirty="0"/>
-          </a:p>
-          <a:p>
-            <a:r>
-              <a:rPr lang="en-US" dirty="0"/>
-              <a:t>The deferred call's arguments are evaluated immediately, but the function call is not executed until the surrounding function returns.</a:t>
-            </a:r>
-          </a:p>
-        </p:txBody>
-      </p:sp>
-    </p:spTree>
-    <p:extLst>
-      <p:ext uri="{BB962C8B-B14F-4D97-AF65-F5344CB8AC3E}">
-        <p14:creationId xmlns:p14="http://schemas.microsoft.com/office/powerpoint/2010/main" val="1058348243"/>
-      </p:ext>
-    </p:extLst>
-  </p:cSld>
-  <p:clrMapOvr>
-    <a:masterClrMapping/>
-  </p:clrMapOvr>
-</p:sld>
-</file>
-
-<file path=ppt/slides/slide17.xml><?xml version="1.0" encoding="utf-8"?>
-<p:sld xmlns:a="http://schemas.openxmlformats.org/drawingml/2006/main" xmlns:r="http://schemas.openxmlformats.org/officeDocument/2006/relationships" xmlns:p="http://schemas.openxmlformats.org/presentationml/2006/main">
-  <p:cSld>
-    <p:spTree>
-      <p:nvGrpSpPr>
-        <p:cNvPr id="1" name=""/>
-        <p:cNvGrpSpPr/>
-        <p:nvPr/>
-      </p:nvGrpSpPr>
-      <p:grpSpPr>
-        <a:xfrm>
-          <a:off x="0" y="0"/>
-          <a:ext cx="0" cy="0"/>
-          <a:chOff x="0" y="0"/>
-          <a:chExt cx="0" cy="0"/>
-        </a:xfrm>
-      </p:grpSpPr>
-      <p:sp>
-        <p:nvSpPr>
-          <p:cNvPr id="2" name="Title 1"/>
-          <p:cNvSpPr>
-            <a:spLocks noGrp="1"/>
-          </p:cNvSpPr>
-          <p:nvPr>
-            <p:ph type="title"/>
-          </p:nvPr>
-        </p:nvSpPr>
-        <p:spPr/>
-        <p:txBody>
-          <a:bodyPr/>
-          <a:lstStyle/>
-          <a:p>
-            <a:r>
-              <a:rPr lang="en-US" dirty="0" smtClean="0"/>
               <a:t>Methods</a:t>
             </a:r>
             <a:endParaRPr lang="en-US" dirty="0"/>
@@ -12712,7 +12603,7 @@
 </p:sld>
 </file>
 
-<file path=ppt/slides/slide18.xml><?xml version="1.0" encoding="utf-8"?>
+<file path=ppt/slides/slide17.xml><?xml version="1.0" encoding="utf-8"?>
 <p:sld xmlns:a="http://schemas.openxmlformats.org/drawingml/2006/main" xmlns:r="http://schemas.openxmlformats.org/officeDocument/2006/relationships" xmlns:p="http://schemas.openxmlformats.org/presentationml/2006/main">
   <p:cSld>
     <p:spTree>
@@ -13058,44 +12949,12 @@
       </p:grpSpPr>
       <p:sp>
         <p:nvSpPr>
-          <p:cNvPr id="2" name="object 2"/>
-          <p:cNvSpPr txBox="1">
+          <p:cNvPr id="4" name="Title 3"/>
+          <p:cNvSpPr>
             <a:spLocks noGrp="1"/>
           </p:cNvSpPr>
           <p:nvPr>
             <p:ph type="title"/>
-          </p:nvPr>
-        </p:nvSpPr>
-        <p:spPr>
-          <a:prstGeom prst="rect">
-            <a:avLst/>
-          </a:prstGeom>
-        </p:spPr>
-        <p:txBody>
-          <a:bodyPr vert="horz" wrap="square" lIns="0" tIns="0" rIns="0" bIns="0" numCol="1" rtlCol="0" anchor="ctr" anchorCtr="0" compatLnSpc="1">
-            <a:prstTxWarp prst="textNoShape">
-              <a:avLst/>
-            </a:prstTxWarp>
-            <a:spAutoFit/>
-          </a:bodyPr>
-          <a:lstStyle/>
-          <a:p>
-            <a:pPr marL="9525"/>
-            <a:r>
-              <a:rPr spc="-4" dirty="0"/>
-              <a:t>Why Go!</a:t>
-            </a:r>
-          </a:p>
-        </p:txBody>
-      </p:sp>
-      <p:sp>
-        <p:nvSpPr>
-          <p:cNvPr id="6" name="Content Placeholder 5"/>
-          <p:cNvSpPr>
-            <a:spLocks noGrp="1"/>
-          </p:cNvSpPr>
-          <p:nvPr>
-            <p:ph idx="1"/>
           </p:nvPr>
         </p:nvSpPr>
         <p:spPr/>
@@ -13104,54 +12963,74 @@
           <a:lstStyle/>
           <a:p>
             <a:r>
+              <a:rPr lang="en-US" dirty="0" smtClean="0"/>
+              <a:t>Go and Java</a:t>
+            </a:r>
+            <a:endParaRPr lang="en-US" dirty="0"/>
+          </a:p>
+        </p:txBody>
+      </p:sp>
+      <p:sp>
+        <p:nvSpPr>
+          <p:cNvPr id="2" name="Content Placeholder 1"/>
+          <p:cNvSpPr>
+            <a:spLocks noGrp="1"/>
+          </p:cNvSpPr>
+          <p:nvPr>
+            <p:ph idx="1"/>
+          </p:nvPr>
+        </p:nvSpPr>
+        <p:spPr/>
+        <p:txBody>
+          <a:bodyPr/>
+          <a:lstStyle/>
+          <a:p>
+            <a:r>
               <a:rPr lang="en-US" dirty="0"/>
-              <a:t>Almost as fast as C</a:t>
+              <a:t>Go compiles code to binaries</a:t>
             </a:r>
           </a:p>
           <a:p>
             <a:r>
               <a:rPr lang="en-US" dirty="0"/>
-              <a:t>Faster than C in some cases</a:t>
+              <a:t>No Runtime is required so faster than JAVA</a:t>
             </a:r>
           </a:p>
           <a:p>
             <a:r>
               <a:rPr lang="en-US" dirty="0"/>
-              <a:t>A small language</a:t>
+              <a:t>Deployment is easier since all dependencies are checked during compile time and only single binary gets generated.</a:t>
             </a:r>
           </a:p>
           <a:p>
             <a:r>
               <a:rPr lang="en-US" dirty="0"/>
-              <a:t>Statically-typed</a:t>
-            </a:r>
+              <a:t>Most of the common tools are inbuilt in the language like go get, go test, http package </a:t>
+            </a:r>
+            <a:r>
+              <a:rPr lang="en-US" dirty="0" err="1"/>
+              <a:t>etc</a:t>
+            </a:r>
+            <a:endParaRPr lang="en-US" dirty="0"/>
           </a:p>
           <a:p>
             <a:r>
               <a:rPr lang="en-US" dirty="0"/>
-              <a:t>Garbage Collected</a:t>
+              <a:t>Go is statically typed but it feels more like dynamic language</a:t>
             </a:r>
           </a:p>
           <a:p>
             <a:r>
               <a:rPr lang="en-US" dirty="0"/>
-              <a:t>Easy to write/learn</a:t>
-            </a:r>
-          </a:p>
-          <a:p>
-            <a:r>
-              <a:rPr lang="en-US" dirty="0"/>
-              <a:t>Less compile time</a:t>
-            </a:r>
-          </a:p>
-          <a:p>
-            <a:r>
-              <a:rPr lang="en-US" dirty="0"/>
-              <a:t>Easy to </a:t>
-            </a:r>
-            <a:r>
-              <a:rPr lang="en-US" dirty="0" smtClean="0"/>
-              <a:t>test</a:t>
+              <a:t>Concurrency </a:t>
+            </a:r>
+            <a:r>
+              <a:rPr lang="en-US"/>
+              <a:t>easy </a:t>
+            </a:r>
+            <a:r>
+              <a:rPr lang="en-US" smtClean="0"/>
+              <a:t>implementation</a:t>
             </a:r>
             <a:endParaRPr lang="en-US" dirty="0"/>
           </a:p>
@@ -13160,13 +13039,20 @@
     </p:spTree>
     <p:extLst>
       <p:ext uri="{BB962C8B-B14F-4D97-AF65-F5344CB8AC3E}">
-        <p14:creationId xmlns:p14="http://schemas.microsoft.com/office/powerpoint/2010/main" val="699024623"/>
+        <p14:creationId xmlns:p14="http://schemas.microsoft.com/office/powerpoint/2010/main" val="450226875"/>
       </p:ext>
     </p:extLst>
   </p:cSld>
   <p:clrMapOvr>
     <a:masterClrMapping/>
   </p:clrMapOvr>
+  <p:timing>
+    <p:tnLst>
+      <p:par>
+        <p:cTn id="1" dur="indefinite" restart="never" nodeType="tmRoot"/>
+      </p:par>
+    </p:tnLst>
+  </p:timing>
 </p:sld>
 </file>
 
@@ -13189,103 +13075,114 @@
       </p:grpSpPr>
       <p:sp>
         <p:nvSpPr>
-          <p:cNvPr id="4" name="Title 3"/>
-          <p:cNvSpPr>
+          <p:cNvPr id="2" name="object 2"/>
+          <p:cNvSpPr txBox="1">
             <a:spLocks noGrp="1"/>
           </p:cNvSpPr>
           <p:nvPr>
             <p:ph type="title"/>
           </p:nvPr>
         </p:nvSpPr>
+        <p:spPr>
+          <a:prstGeom prst="rect">
+            <a:avLst/>
+          </a:prstGeom>
+        </p:spPr>
+        <p:txBody>
+          <a:bodyPr vert="horz" wrap="square" lIns="0" tIns="0" rIns="0" bIns="0" numCol="1" rtlCol="0" anchor="ctr" anchorCtr="0" compatLnSpc="1">
+            <a:prstTxWarp prst="textNoShape">
+              <a:avLst/>
+            </a:prstTxWarp>
+            <a:spAutoFit/>
+          </a:bodyPr>
+          <a:lstStyle/>
+          <a:p>
+            <a:pPr marL="9525"/>
+            <a:r>
+              <a:rPr spc="-4" dirty="0"/>
+              <a:t>Who use</a:t>
+            </a:r>
+            <a:r>
+              <a:rPr lang="en-US" spc="-4" dirty="0"/>
+              <a:t>s</a:t>
+            </a:r>
+            <a:r>
+              <a:rPr spc="-4" dirty="0"/>
+              <a:t> Go?</a:t>
+            </a:r>
+          </a:p>
+        </p:txBody>
+      </p:sp>
+      <p:sp>
+        <p:nvSpPr>
+          <p:cNvPr id="4" name="Content Placeholder 3"/>
+          <p:cNvSpPr>
+            <a:spLocks noGrp="1"/>
+          </p:cNvSpPr>
+          <p:nvPr>
+            <p:ph idx="1"/>
+          </p:nvPr>
+        </p:nvSpPr>
         <p:spPr/>
         <p:txBody>
-          <a:bodyPr/>
+          <a:bodyPr>
+            <a:normAutofit/>
+          </a:bodyPr>
           <a:lstStyle/>
           <a:p>
             <a:r>
+              <a:rPr lang="en-US" dirty="0"/>
+              <a:t>Google, of course</a:t>
+            </a:r>
+          </a:p>
+          <a:p>
+            <a:r>
+              <a:rPr lang="en-US" dirty="0"/>
+              <a:t>Dropbox</a:t>
+            </a:r>
+          </a:p>
+          <a:p>
+            <a:r>
+              <a:rPr lang="en-US" dirty="0" err="1"/>
+              <a:t>Exotel</a:t>
+            </a:r>
+            <a:endParaRPr lang="en-US" dirty="0"/>
+          </a:p>
+          <a:p>
+            <a:r>
+              <a:rPr lang="en-US" dirty="0"/>
+              <a:t>Tumblr</a:t>
+            </a:r>
+          </a:p>
+          <a:p>
+            <a:r>
+              <a:rPr lang="en-US" dirty="0"/>
+              <a:t>Parse (Acquired by Facebook)</a:t>
+            </a:r>
+          </a:p>
+          <a:p>
+            <a:r>
+              <a:rPr lang="en-US" dirty="0"/>
+              <a:t>Docker</a:t>
+            </a:r>
+          </a:p>
+          <a:p>
+            <a:r>
+              <a:rPr lang="en-US" dirty="0"/>
+              <a:t>Check below link for comprehensive list for all companies who uses Go</a:t>
+            </a:r>
+            <a:r>
               <a:rPr lang="en-US" dirty="0" smtClean="0"/>
-              <a:t>Go and Java</a:t>
-            </a:r>
-            <a:endParaRPr lang="en-US" dirty="0"/>
-          </a:p>
-        </p:txBody>
-      </p:sp>
-      <p:sp>
-        <p:nvSpPr>
-          <p:cNvPr id="5" name="Text Placeholder 4"/>
-          <p:cNvSpPr>
-            <a:spLocks noGrp="1"/>
-          </p:cNvSpPr>
-          <p:nvPr>
-            <p:ph type="body" idx="1"/>
-          </p:nvPr>
-        </p:nvSpPr>
-        <p:spPr/>
-        <p:txBody>
-          <a:bodyPr/>
-          <a:lstStyle/>
-          <a:p>
+              <a:t>! https</a:t>
+            </a:r>
             <a:r>
               <a:rPr lang="en-US" dirty="0"/>
-              <a:t>Go compiles code to binaries</a:t>
-            </a:r>
-          </a:p>
-          <a:p>
+              <a:t>://</a:t>
+            </a:r>
             <a:r>
               <a:rPr lang="en-US" dirty="0" smtClean="0"/>
-              <a:t>No </a:t>
-            </a:r>
-            <a:r>
-              <a:rPr lang="en-US" dirty="0"/>
-              <a:t>Runtime is required so faster than JAVA</a:t>
-            </a:r>
-          </a:p>
-          <a:p>
-            <a:r>
-              <a:rPr lang="en-US" dirty="0" smtClean="0"/>
-              <a:t>Deployment </a:t>
-            </a:r>
-            <a:r>
-              <a:rPr lang="en-US" dirty="0"/>
-              <a:t>is easier since all dependencies are checked during compile time and only single binary gets generated.</a:t>
-            </a:r>
-          </a:p>
-          <a:p>
-            <a:r>
-              <a:rPr lang="en-US" dirty="0" smtClean="0"/>
-              <a:t>Most </a:t>
-            </a:r>
-            <a:r>
-              <a:rPr lang="en-US" dirty="0"/>
-              <a:t>of the common tools are inbuilt in the language like go get, go test, http package </a:t>
-            </a:r>
-            <a:r>
-              <a:rPr lang="en-US" dirty="0" err="1"/>
-              <a:t>etc</a:t>
-            </a:r>
-            <a:endParaRPr lang="en-US" dirty="0"/>
-          </a:p>
-          <a:p>
-            <a:r>
-              <a:rPr lang="en-US" dirty="0" smtClean="0"/>
-              <a:t>Go </a:t>
-            </a:r>
-            <a:r>
-              <a:rPr lang="en-US" dirty="0"/>
-              <a:t>is statically typed but it feels more like dynamic language</a:t>
-            </a:r>
-          </a:p>
-          <a:p>
-            <a:r>
-              <a:rPr lang="en-US" dirty="0" smtClean="0"/>
-              <a:t>Concurrency </a:t>
-            </a:r>
-            <a:r>
-              <a:rPr lang="en-US" dirty="0"/>
-              <a:t>easy implementation</a:t>
-            </a:r>
-          </a:p>
-          <a:p>
+              <a:t>github.com/golang/go/wiki/GoUsers</a:t>
+            </a:r>
             <a:endParaRPr lang="en-US" dirty="0"/>
           </a:p>
         </p:txBody>
@@ -13293,7 +13190,7 @@
     </p:spTree>
     <p:extLst>
       <p:ext uri="{BB962C8B-B14F-4D97-AF65-F5344CB8AC3E}">
-        <p14:creationId xmlns:p14="http://schemas.microsoft.com/office/powerpoint/2010/main" val="450226875"/>
+        <p14:creationId xmlns:p14="http://schemas.microsoft.com/office/powerpoint/2010/main" val="1508284884"/>
       </p:ext>
     </p:extLst>
   </p:cSld>
@@ -13329,122 +13226,54 @@
       </p:grpSpPr>
       <p:sp>
         <p:nvSpPr>
-          <p:cNvPr id="2" name="object 2"/>
-          <p:cNvSpPr txBox="1">
-            <a:spLocks noGrp="1"/>
-          </p:cNvSpPr>
-          <p:nvPr>
-            <p:ph type="title"/>
-          </p:nvPr>
-        </p:nvSpPr>
-        <p:spPr>
-          <a:prstGeom prst="rect">
-            <a:avLst/>
-          </a:prstGeom>
-        </p:spPr>
-        <p:txBody>
-          <a:bodyPr vert="horz" wrap="square" lIns="0" tIns="0" rIns="0" bIns="0" numCol="1" rtlCol="0" anchor="ctr" anchorCtr="0" compatLnSpc="1">
-            <a:prstTxWarp prst="textNoShape">
-              <a:avLst/>
-            </a:prstTxWarp>
-            <a:spAutoFit/>
+          <p:cNvPr id="4" name="Text Placeholder 3"/>
+          <p:cNvSpPr>
+            <a:spLocks noGrp="1"/>
+          </p:cNvSpPr>
+          <p:nvPr>
+            <p:ph type="body" sz="quarter" idx="11"/>
+          </p:nvPr>
+        </p:nvSpPr>
+        <p:spPr/>
+        <p:txBody>
+          <a:bodyPr>
+            <a:normAutofit fontScale="92500" lnSpcReduction="20000"/>
           </a:bodyPr>
           <a:lstStyle/>
           <a:p>
-            <a:pPr marL="9525"/>
-            <a:r>
-              <a:rPr spc="-4" dirty="0"/>
-              <a:t>Who use</a:t>
-            </a:r>
-            <a:r>
-              <a:rPr lang="en-US" spc="-4" dirty="0"/>
-              <a:t>s</a:t>
-            </a:r>
-            <a:r>
-              <a:rPr spc="-4" dirty="0"/>
-              <a:t> Go?</a:t>
-            </a:r>
-          </a:p>
-        </p:txBody>
-      </p:sp>
-      <p:sp>
-        <p:nvSpPr>
-          <p:cNvPr id="4" name="Content Placeholder 3"/>
-          <p:cNvSpPr>
-            <a:spLocks noGrp="1"/>
-          </p:cNvSpPr>
-          <p:nvPr>
-            <p:ph idx="1"/>
+            <a:r>
+              <a:rPr lang="en-US" dirty="0" smtClean="0"/>
+              <a:t>Packages, Variables, Constants</a:t>
+            </a:r>
+            <a:endParaRPr lang="en-US" dirty="0"/>
+          </a:p>
+        </p:txBody>
+      </p:sp>
+      <p:sp>
+        <p:nvSpPr>
+          <p:cNvPr id="5" name="Text Placeholder 4"/>
+          <p:cNvSpPr>
+            <a:spLocks noGrp="1"/>
+          </p:cNvSpPr>
+          <p:nvPr>
+            <p:ph type="body" sz="quarter" idx="12"/>
           </p:nvPr>
         </p:nvSpPr>
         <p:spPr/>
         <p:txBody>
           <a:bodyPr>
-            <a:normAutofit/>
+            <a:normAutofit lnSpcReduction="10000"/>
           </a:bodyPr>
           <a:lstStyle/>
           <a:p>
-            <a:r>
-              <a:rPr lang="en-US" dirty="0"/>
-              <a:t>Google, of course</a:t>
-            </a:r>
-          </a:p>
-          <a:p>
-            <a:r>
-              <a:rPr lang="en-US" dirty="0"/>
-              <a:t>Dropbox</a:t>
-            </a:r>
-          </a:p>
-          <a:p>
-            <a:r>
-              <a:rPr lang="en-US" dirty="0" err="1"/>
-              <a:t>Exotel</a:t>
-            </a:r>
-            <a:endParaRPr lang="en-US" dirty="0"/>
-          </a:p>
-          <a:p>
-            <a:r>
-              <a:rPr lang="en-US" dirty="0"/>
-              <a:t>Tumblr</a:t>
-            </a:r>
-          </a:p>
-          <a:p>
-            <a:r>
-              <a:rPr lang="en-US" dirty="0"/>
-              <a:t>Parse (Acquired by Facebook)</a:t>
-            </a:r>
-          </a:p>
-          <a:p>
-            <a:r>
-              <a:rPr lang="en-US" dirty="0"/>
-              <a:t>Docker</a:t>
-            </a:r>
-          </a:p>
-          <a:p>
-            <a:r>
-              <a:rPr lang="en-US" dirty="0"/>
-              <a:t>Check below link for comprehensive list for all companies who uses Go</a:t>
-            </a:r>
-            <a:r>
-              <a:rPr lang="en-US" dirty="0" smtClean="0"/>
-              <a:t>! https</a:t>
-            </a:r>
-            <a:r>
-              <a:rPr lang="en-US" dirty="0"/>
-              <a:t>://</a:t>
-            </a:r>
-            <a:r>
-              <a:rPr lang="en-US" dirty="0" smtClean="0"/>
-              <a:t>github.com/golang/go/wiki/GoUsers</a:t>
-            </a:r>
-            <a:endParaRPr lang="en-US" dirty="0"/>
+            <a:endParaRPr lang="en-US"/>
           </a:p>
         </p:txBody>
       </p:sp>
     </p:spTree>
     <p:extLst>
       <p:ext uri="{BB962C8B-B14F-4D97-AF65-F5344CB8AC3E}">
-        <p14:creationId xmlns:p14="http://schemas.microsoft.com/office/powerpoint/2010/main" val="1508284884"/>
+        <p14:creationId xmlns:p14="http://schemas.microsoft.com/office/powerpoint/2010/main" val="1798359152"/>
       </p:ext>
     </p:extLst>
   </p:cSld>
@@ -13480,24 +13309,22 @@
       </p:grpSpPr>
       <p:sp>
         <p:nvSpPr>
-          <p:cNvPr id="4" name="Text Placeholder 3"/>
-          <p:cNvSpPr>
-            <a:spLocks noGrp="1"/>
-          </p:cNvSpPr>
-          <p:nvPr>
-            <p:ph type="body" sz="quarter" idx="11"/>
+          <p:cNvPr id="2" name="Title 1"/>
+          <p:cNvSpPr>
+            <a:spLocks noGrp="1"/>
+          </p:cNvSpPr>
+          <p:nvPr>
+            <p:ph type="title"/>
           </p:nvPr>
         </p:nvSpPr>
         <p:spPr/>
         <p:txBody>
-          <a:bodyPr>
-            <a:normAutofit fontScale="92500" lnSpcReduction="20000"/>
-          </a:bodyPr>
+          <a:bodyPr/>
           <a:lstStyle/>
           <a:p>
             <a:r>
               <a:rPr lang="en-US" dirty="0" smtClean="0"/>
-              <a:t>Packages, Variables, Constants</a:t>
+              <a:t>Packages</a:t>
             </a:r>
             <a:endParaRPr lang="en-US" dirty="0"/>
           </a:p>
@@ -13505,42 +13332,53 @@
       </p:sp>
       <p:sp>
         <p:nvSpPr>
-          <p:cNvPr id="5" name="Text Placeholder 4"/>
-          <p:cNvSpPr>
-            <a:spLocks noGrp="1"/>
-          </p:cNvSpPr>
-          <p:nvPr>
-            <p:ph type="body" sz="quarter" idx="12"/>
+          <p:cNvPr id="3" name="Content Placeholder 2"/>
+          <p:cNvSpPr>
+            <a:spLocks noGrp="1"/>
+          </p:cNvSpPr>
+          <p:nvPr>
+            <p:ph idx="1"/>
           </p:nvPr>
         </p:nvSpPr>
         <p:spPr/>
         <p:txBody>
-          <a:bodyPr>
-            <a:normAutofit lnSpcReduction="10000"/>
-          </a:bodyPr>
+          <a:bodyPr/>
           <a:lstStyle/>
           <a:p>
-            <a:endParaRPr lang="en-US"/>
+            <a:r>
+              <a:rPr lang="en-US" dirty="0"/>
+              <a:t>Every Go program is made up of packages.</a:t>
+            </a:r>
+          </a:p>
+          <a:p>
+            <a:endParaRPr lang="en-US" dirty="0"/>
+          </a:p>
+          <a:p>
+            <a:r>
+              <a:rPr lang="en-US" dirty="0"/>
+              <a:t>Programs start running in package </a:t>
+            </a:r>
+            <a:r>
+              <a:rPr lang="en-US" b="1" dirty="0"/>
+              <a:t>main</a:t>
+            </a:r>
+            <a:r>
+              <a:rPr lang="en-US" dirty="0"/>
+              <a:t>.</a:t>
+            </a:r>
           </a:p>
         </p:txBody>
       </p:sp>
     </p:spTree>
     <p:extLst>
       <p:ext uri="{BB962C8B-B14F-4D97-AF65-F5344CB8AC3E}">
-        <p14:creationId xmlns:p14="http://schemas.microsoft.com/office/powerpoint/2010/main" val="1798359152"/>
+        <p14:creationId xmlns:p14="http://schemas.microsoft.com/office/powerpoint/2010/main" val="2179189596"/>
       </p:ext>
     </p:extLst>
   </p:cSld>
   <p:clrMapOvr>
     <a:masterClrMapping/>
   </p:clrMapOvr>
-  <p:timing>
-    <p:tnLst>
-      <p:par>
-        <p:cTn id="1" dur="indefinite" restart="never" nodeType="tmRoot"/>
-      </p:par>
-    </p:tnLst>
-  </p:timing>
 </p:sld>
 </file>
 
@@ -13578,7 +13416,7 @@
           <a:p>
             <a:r>
               <a:rPr lang="en-US" dirty="0" smtClean="0"/>
-              <a:t>Packages</a:t>
+              <a:t>Exported names</a:t>
             </a:r>
             <a:endParaRPr lang="en-US" dirty="0"/>
           </a:p>
@@ -13601,7 +13439,7 @@
           <a:p>
             <a:r>
               <a:rPr lang="en-US" dirty="0"/>
-              <a:t>Every Go program is made up of packages.</a:t>
+              <a:t>In Go, a name is exported if it begins with a capital letter.</a:t>
             </a:r>
           </a:p>
           <a:p>
@@ -13610,15 +13448,24 @@
           <a:p>
             <a:r>
               <a:rPr lang="en-US" dirty="0"/>
-              <a:t>Programs start running in package </a:t>
-            </a:r>
-            <a:r>
-              <a:rPr lang="en-US" b="1" dirty="0"/>
-              <a:t>main</a:t>
+              <a:t>When importing a package, you can refer only to its exported names. Any "</a:t>
+            </a:r>
+            <a:r>
+              <a:rPr lang="en-US" dirty="0" err="1"/>
+              <a:t>unexported</a:t>
             </a:r>
             <a:r>
               <a:rPr lang="en-US" dirty="0"/>
-              <a:t>.</a:t>
+              <a:t>" names are not accessible from outside the package.</a:t>
+            </a:r>
+          </a:p>
+          <a:p>
+            <a:endParaRPr lang="en-US" dirty="0"/>
+          </a:p>
+          <a:p>
+            <a:r>
+              <a:rPr lang="en-US" dirty="0"/>
+              <a:t>Foo is an exported name, as is FOO. The name foo is not exported.</a:t>
             </a:r>
           </a:p>
         </p:txBody>
@@ -13626,7 +13473,7 @@
     </p:spTree>
     <p:extLst>
       <p:ext uri="{BB962C8B-B14F-4D97-AF65-F5344CB8AC3E}">
-        <p14:creationId xmlns:p14="http://schemas.microsoft.com/office/powerpoint/2010/main" val="2179189596"/>
+        <p14:creationId xmlns:p14="http://schemas.microsoft.com/office/powerpoint/2010/main" val="480797736"/>
       </p:ext>
     </p:extLst>
   </p:cSld>
@@ -13670,7 +13517,7 @@
           <a:p>
             <a:r>
               <a:rPr lang="en-US" dirty="0" smtClean="0"/>
-              <a:t>Exported names</a:t>
+              <a:t>Variables</a:t>
             </a:r>
             <a:endParaRPr lang="en-US" dirty="0"/>
           </a:p>
@@ -13693,7 +13540,15 @@
           <a:p>
             <a:r>
               <a:rPr lang="en-US" dirty="0"/>
-              <a:t>In Go, a name is exported if it begins with a capital letter.</a:t>
+              <a:t>The </a:t>
+            </a:r>
+            <a:r>
+              <a:rPr lang="en-US" dirty="0" err="1"/>
+              <a:t>var</a:t>
+            </a:r>
+            <a:r>
+              <a:rPr lang="en-US" dirty="0"/>
+              <a:t> statement declares a list of variables; as in function argument lists, the type is last.</a:t>
             </a:r>
           </a:p>
           <a:p>
@@ -13702,24 +13557,15 @@
           <a:p>
             <a:r>
               <a:rPr lang="en-US" dirty="0"/>
-              <a:t>When importing a package, you can refer only to its exported names. Any "</a:t>
+              <a:t>A </a:t>
             </a:r>
             <a:r>
               <a:rPr lang="en-US" dirty="0" err="1"/>
-              <a:t>unexported</a:t>
+              <a:t>var</a:t>
             </a:r>
             <a:r>
               <a:rPr lang="en-US" dirty="0"/>
-              <a:t>" names are not accessible from outside the package.</a:t>
-            </a:r>
-          </a:p>
-          <a:p>
-            <a:endParaRPr lang="en-US" dirty="0"/>
-          </a:p>
-          <a:p>
-            <a:r>
-              <a:rPr lang="en-US" dirty="0"/>
-              <a:t>Foo is an exported name, as is FOO. The name foo is not exported.</a:t>
+              <a:t> statement can be at package or function level. </a:t>
             </a:r>
           </a:p>
         </p:txBody>
@@ -13727,7 +13573,7 @@
     </p:spTree>
     <p:extLst>
       <p:ext uri="{BB962C8B-B14F-4D97-AF65-F5344CB8AC3E}">
-        <p14:creationId xmlns:p14="http://schemas.microsoft.com/office/powerpoint/2010/main" val="480797736"/>
+        <p14:creationId xmlns:p14="http://schemas.microsoft.com/office/powerpoint/2010/main" val="492609667"/>
       </p:ext>
     </p:extLst>
   </p:cSld>
@@ -13771,7 +13617,7 @@
           <a:p>
             <a:r>
               <a:rPr lang="en-US" dirty="0" smtClean="0"/>
-              <a:t>Variables</a:t>
+              <a:t>Short variable declaration</a:t>
             </a:r>
             <a:endParaRPr lang="en-US" dirty="0"/>
           </a:p>
@@ -13794,7 +13640,7 @@
           <a:p>
             <a:r>
               <a:rPr lang="en-US" dirty="0"/>
-              <a:t>The </a:t>
+              <a:t>Inside a function, the := short assignment statement can be used in place of a </a:t>
             </a:r>
             <a:r>
               <a:rPr lang="en-US" dirty="0" err="1"/>
@@ -13802,7 +13648,7 @@
             </a:r>
             <a:r>
               <a:rPr lang="en-US" dirty="0"/>
-              <a:t> statement declares a list of variables; as in function argument lists, the type is last.</a:t>
+              <a:t> declaration with implicit type.</a:t>
             </a:r>
           </a:p>
           <a:p>
@@ -13811,7 +13657,7 @@
           <a:p>
             <a:r>
               <a:rPr lang="en-US" dirty="0"/>
-              <a:t>A </a:t>
+              <a:t>Outside a function, every statement begins with a keyword (</a:t>
             </a:r>
             <a:r>
               <a:rPr lang="en-US" dirty="0" err="1"/>
@@ -13819,7 +13665,15 @@
             </a:r>
             <a:r>
               <a:rPr lang="en-US" dirty="0"/>
-              <a:t> statement can be at package or function level. </a:t>
+              <a:t>, </a:t>
+            </a:r>
+            <a:r>
+              <a:rPr lang="en-US" dirty="0" err="1"/>
+              <a:t>func</a:t>
+            </a:r>
+            <a:r>
+              <a:rPr lang="en-US" dirty="0"/>
+              <a:t>, and so on) and so the := construct is not available.</a:t>
             </a:r>
           </a:p>
         </p:txBody>
@@ -13827,7 +13681,7 @@
     </p:spTree>
     <p:extLst>
       <p:ext uri="{BB962C8B-B14F-4D97-AF65-F5344CB8AC3E}">
-        <p14:creationId xmlns:p14="http://schemas.microsoft.com/office/powerpoint/2010/main" val="492609667"/>
+        <p14:creationId xmlns:p14="http://schemas.microsoft.com/office/powerpoint/2010/main" val="1230287746"/>
       </p:ext>
     </p:extLst>
   </p:cSld>
@@ -14397,6 +14251,21 @@
 </file>
 
 <file path=customXml/item1.xml><?xml version="1.0" encoding="utf-8"?>
+<?mso-contentType ?>
+<FormTemplates xmlns="http://schemas.microsoft.com/sharepoint/v3/contenttype/forms">
+  <Display>DocumentLibraryForm</Display>
+  <Edit>DocumentLibraryForm</Edit>
+  <New>DocumentLibraryForm</New>
+</FormTemplates>
+</file>
+
+<file path=customXml/item2.xml><?xml version="1.0" encoding="utf-8"?>
+<p:properties xmlns:p="http://schemas.microsoft.com/office/2006/metadata/properties" xmlns:xsi="http://www.w3.org/2001/XMLSchema-instance" xmlns:pc="http://schemas.microsoft.com/office/infopath/2007/PartnerControls">
+  <documentManagement/>
+</p:properties>
+</file>
+
+<file path=customXml/item3.xml><?xml version="1.0" encoding="utf-8"?>
 <ct:contentTypeSchema xmlns:ct="http://schemas.microsoft.com/office/2006/metadata/contentType" xmlns:ma="http://schemas.microsoft.com/office/2006/metadata/properties/metaAttributes" ct:_="" ma:_="" ma:contentTypeName="Document" ma:contentTypeID="0x010100045942E58BAAE443A917BD23F90BB461" ma:contentTypeVersion="0" ma:contentTypeDescription="Create a new document." ma:contentTypeScope="" ma:versionID="4ccd8ca7c382e5aa3edc5420ff5317fb">
   <xsd:schema xmlns:xsd="http://www.w3.org/2001/XMLSchema" xmlns:xs="http://www.w3.org/2001/XMLSchema" xmlns:p="http://schemas.microsoft.com/office/2006/metadata/properties" targetNamespace="http://schemas.microsoft.com/office/2006/metadata/properties" ma:root="true" ma:fieldsID="06e0e3112098b4d1518554ee266199a9">
     <xsd:element name="properties">
@@ -14510,33 +14379,10 @@
 </ct:contentTypeSchema>
 </file>
 
-<file path=customXml/item2.xml><?xml version="1.0" encoding="utf-8"?>
-<p:properties xmlns:p="http://schemas.microsoft.com/office/2006/metadata/properties" xmlns:xsi="http://www.w3.org/2001/XMLSchema-instance" xmlns:pc="http://schemas.microsoft.com/office/infopath/2007/PartnerControls">
-  <documentManagement/>
-</p:properties>
-</file>
-
-<file path=customXml/item3.xml><?xml version="1.0" encoding="utf-8"?>
-<?mso-contentType ?>
-<FormTemplates xmlns="http://schemas.microsoft.com/sharepoint/v3/contenttype/forms">
-  <Display>DocumentLibraryForm</Display>
-  <Edit>DocumentLibraryForm</Edit>
-  <New>DocumentLibraryForm</New>
-</FormTemplates>
-</file>
-
 <file path=customXml/itemProps1.xml><?xml version="1.0" encoding="utf-8"?>
-<ds:datastoreItem xmlns:ds="http://schemas.openxmlformats.org/officeDocument/2006/customXml" ds:itemID="{B7014F99-208B-45EA-9A90-8426599A5225}">
+<ds:datastoreItem xmlns:ds="http://schemas.openxmlformats.org/officeDocument/2006/customXml" ds:itemID="{D7900DE2-572D-4B07-A4D8-5AF0F1C66077}">
   <ds:schemaRefs>
-    <ds:schemaRef ds:uri="http://schemas.microsoft.com/office/2006/metadata/contentType"/>
-    <ds:schemaRef ds:uri="http://schemas.microsoft.com/office/2006/metadata/properties/metaAttributes"/>
-    <ds:schemaRef ds:uri="http://www.w3.org/2001/XMLSchema"/>
-    <ds:schemaRef ds:uri="http://schemas.microsoft.com/office/2006/metadata/properties"/>
-    <ds:schemaRef ds:uri="http://schemas.openxmlformats.org/package/2006/metadata/core-properties"/>
-    <ds:schemaRef ds:uri="http://purl.org/dc/elements/1.1/"/>
-    <ds:schemaRef ds:uri="http://purl.org/dc/terms/"/>
-    <ds:schemaRef ds:uri="http://schemas.microsoft.com/internal/obd"/>
-    <ds:schemaRef ds:uri="http://schemas.microsoft.com/office/infopath/2007/PartnerControls"/>
+    <ds:schemaRef ds:uri="http://schemas.microsoft.com/sharepoint/v3/contenttype/forms"/>
   </ds:schemaRefs>
 </ds:datastoreItem>
 </file>
@@ -14557,9 +14403,17 @@
 </file>
 
 <file path=customXml/itemProps3.xml><?xml version="1.0" encoding="utf-8"?>
-<ds:datastoreItem xmlns:ds="http://schemas.openxmlformats.org/officeDocument/2006/customXml" ds:itemID="{D7900DE2-572D-4B07-A4D8-5AF0F1C66077}">
+<ds:datastoreItem xmlns:ds="http://schemas.openxmlformats.org/officeDocument/2006/customXml" ds:itemID="{B7014F99-208B-45EA-9A90-8426599A5225}">
   <ds:schemaRefs>
-    <ds:schemaRef ds:uri="http://schemas.microsoft.com/sharepoint/v3/contenttype/forms"/>
+    <ds:schemaRef ds:uri="http://schemas.microsoft.com/office/2006/metadata/contentType"/>
+    <ds:schemaRef ds:uri="http://schemas.microsoft.com/office/2006/metadata/properties/metaAttributes"/>
+    <ds:schemaRef ds:uri="http://www.w3.org/2001/XMLSchema"/>
+    <ds:schemaRef ds:uri="http://schemas.microsoft.com/office/2006/metadata/properties"/>
+    <ds:schemaRef ds:uri="http://schemas.openxmlformats.org/package/2006/metadata/core-properties"/>
+    <ds:schemaRef ds:uri="http://purl.org/dc/elements/1.1/"/>
+    <ds:schemaRef ds:uri="http://purl.org/dc/terms/"/>
+    <ds:schemaRef ds:uri="http://schemas.microsoft.com/internal/obd"/>
+    <ds:schemaRef ds:uri="http://schemas.microsoft.com/office/infopath/2007/PartnerControls"/>
   </ds:schemaRefs>
 </ds:datastoreItem>
 </file>
</xml_diff>

<commit_message>
Added new version of PPT after plagiarism check
</commit_message>
<xml_diff>
--- a/go/Go.pptx
+++ b/go/Go.pptx
@@ -5,27 +5,32 @@
     <p:sldMasterId id="2147483707" r:id="rId4"/>
   </p:sldMasterIdLst>
   <p:notesMasterIdLst>
-    <p:notesMasterId r:id="rId23"/>
+    <p:notesMasterId r:id="rId28"/>
   </p:notesMasterIdLst>
   <p:sldIdLst>
     <p:sldId id="433" r:id="rId5"/>
     <p:sldId id="415" r:id="rId6"/>
-    <p:sldId id="417" r:id="rId7"/>
-    <p:sldId id="418" r:id="rId8"/>
-    <p:sldId id="419" r:id="rId9"/>
-    <p:sldId id="427" r:id="rId10"/>
-    <p:sldId id="426" r:id="rId11"/>
-    <p:sldId id="420" r:id="rId12"/>
-    <p:sldId id="422" r:id="rId13"/>
-    <p:sldId id="423" r:id="rId14"/>
-    <p:sldId id="424" r:id="rId15"/>
-    <p:sldId id="425" r:id="rId16"/>
-    <p:sldId id="428" r:id="rId17"/>
-    <p:sldId id="421" r:id="rId18"/>
-    <p:sldId id="430" r:id="rId19"/>
-    <p:sldId id="431" r:id="rId20"/>
-    <p:sldId id="432" r:id="rId21"/>
-    <p:sldId id="414" r:id="rId22"/>
+    <p:sldId id="439" r:id="rId7"/>
+    <p:sldId id="434" r:id="rId8"/>
+    <p:sldId id="436" r:id="rId9"/>
+    <p:sldId id="437" r:id="rId10"/>
+    <p:sldId id="438" r:id="rId11"/>
+    <p:sldId id="440" r:id="rId12"/>
+    <p:sldId id="441" r:id="rId13"/>
+    <p:sldId id="427" r:id="rId14"/>
+    <p:sldId id="426" r:id="rId15"/>
+    <p:sldId id="422" r:id="rId16"/>
+    <p:sldId id="423" r:id="rId17"/>
+    <p:sldId id="424" r:id="rId18"/>
+    <p:sldId id="425" r:id="rId19"/>
+    <p:sldId id="428" r:id="rId20"/>
+    <p:sldId id="421" r:id="rId21"/>
+    <p:sldId id="430" r:id="rId22"/>
+    <p:sldId id="431" r:id="rId23"/>
+    <p:sldId id="432" r:id="rId24"/>
+    <p:sldId id="442" r:id="rId25"/>
+    <p:sldId id="444" r:id="rId26"/>
+    <p:sldId id="414" r:id="rId27"/>
   </p:sldIdLst>
   <p:sldSz cx="9144000" cy="5143500" type="screen16x9"/>
   <p:notesSz cx="6858000" cy="9144000"/>
@@ -231,7 +236,7 @@
             <a:fld id="{6C5D2418-5498-496B-9B3E-912B9D6443B9}" type="datetimeFigureOut">
               <a:rPr lang="en-US" smtClean="0"/>
               <a:pPr/>
-              <a:t>2/15/2016</a:t>
+              <a:t>2/22/2016</a:t>
             </a:fld>
             <a:endParaRPr lang="en-US"/>
           </a:p>
@@ -527,6 +532,261 @@
             <p:ph type="sldImg"/>
           </p:nvPr>
         </p:nvSpPr>
+        <p:spPr/>
+      </p:sp>
+      <p:sp>
+        <p:nvSpPr>
+          <p:cNvPr id="3" name="Notes Placeholder 2"/>
+          <p:cNvSpPr>
+            <a:spLocks noGrp="1"/>
+          </p:cNvSpPr>
+          <p:nvPr>
+            <p:ph type="body" idx="1"/>
+          </p:nvPr>
+        </p:nvSpPr>
+        <p:spPr/>
+        <p:txBody>
+          <a:bodyPr/>
+          <a:lstStyle/>
+          <a:p>
+            <a:endParaRPr lang="en-US" dirty="0"/>
+          </a:p>
+        </p:txBody>
+      </p:sp>
+      <p:sp>
+        <p:nvSpPr>
+          <p:cNvPr id="4" name="Slide Number Placeholder 3"/>
+          <p:cNvSpPr>
+            <a:spLocks noGrp="1"/>
+          </p:cNvSpPr>
+          <p:nvPr>
+            <p:ph type="sldNum" sz="quarter" idx="10"/>
+          </p:nvPr>
+        </p:nvSpPr>
+        <p:spPr/>
+        <p:txBody>
+          <a:bodyPr/>
+          <a:lstStyle/>
+          <a:p>
+            <a:fld id="{DBDA5EBE-E194-4A8A-BBBE-6B90DE9885F5}" type="slidenum">
+              <a:rPr lang="en-US" smtClean="0"/>
+              <a:pPr/>
+              <a:t>1</a:t>
+            </a:fld>
+            <a:endParaRPr lang="en-US"/>
+          </a:p>
+        </p:txBody>
+      </p:sp>
+    </p:spTree>
+    <p:extLst>
+      <p:ext uri="{BB962C8B-B14F-4D97-AF65-F5344CB8AC3E}">
+        <p14:creationId xmlns:p14="http://schemas.microsoft.com/office/powerpoint/2010/main" val="9980255"/>
+      </p:ext>
+    </p:extLst>
+  </p:cSld>
+  <p:clrMapOvr>
+    <a:masterClrMapping/>
+  </p:clrMapOvr>
+</p:notes>
+</file>
+
+<file path=ppt/notesSlides/notesSlide2.xml><?xml version="1.0" encoding="utf-8"?>
+<p:notes xmlns:a="http://schemas.openxmlformats.org/drawingml/2006/main" xmlns:r="http://schemas.openxmlformats.org/officeDocument/2006/relationships" xmlns:p="http://schemas.openxmlformats.org/presentationml/2006/main">
+  <p:cSld>
+    <p:spTree>
+      <p:nvGrpSpPr>
+        <p:cNvPr id="1" name=""/>
+        <p:cNvGrpSpPr/>
+        <p:nvPr/>
+      </p:nvGrpSpPr>
+      <p:grpSpPr>
+        <a:xfrm>
+          <a:off x="0" y="0"/>
+          <a:ext cx="0" cy="0"/>
+          <a:chOff x="0" y="0"/>
+          <a:chExt cx="0" cy="0"/>
+        </a:xfrm>
+      </p:grpSpPr>
+      <p:sp>
+        <p:nvSpPr>
+          <p:cNvPr id="2" name="Slide Image Placeholder 1"/>
+          <p:cNvSpPr>
+            <a:spLocks noGrp="1" noRot="1" noChangeAspect="1"/>
+          </p:cNvSpPr>
+          <p:nvPr>
+            <p:ph type="sldImg"/>
+          </p:nvPr>
+        </p:nvSpPr>
+        <p:spPr/>
+      </p:sp>
+      <p:sp>
+        <p:nvSpPr>
+          <p:cNvPr id="3" name="Notes Placeholder 2"/>
+          <p:cNvSpPr>
+            <a:spLocks noGrp="1"/>
+          </p:cNvSpPr>
+          <p:nvPr>
+            <p:ph type="body" idx="1"/>
+          </p:nvPr>
+        </p:nvSpPr>
+        <p:spPr/>
+        <p:txBody>
+          <a:bodyPr/>
+          <a:lstStyle/>
+          <a:p>
+            <a:endParaRPr lang="en-US" dirty="0"/>
+          </a:p>
+        </p:txBody>
+      </p:sp>
+      <p:sp>
+        <p:nvSpPr>
+          <p:cNvPr id="4" name="Slide Number Placeholder 3"/>
+          <p:cNvSpPr>
+            <a:spLocks noGrp="1"/>
+          </p:cNvSpPr>
+          <p:nvPr>
+            <p:ph type="sldNum" sz="quarter" idx="10"/>
+          </p:nvPr>
+        </p:nvSpPr>
+        <p:spPr/>
+        <p:txBody>
+          <a:bodyPr/>
+          <a:lstStyle/>
+          <a:p>
+            <a:fld id="{DBDA5EBE-E194-4A8A-BBBE-6B90DE9885F5}" type="slidenum">
+              <a:rPr lang="en-US" smtClean="0"/>
+              <a:pPr/>
+              <a:t>20</a:t>
+            </a:fld>
+            <a:endParaRPr lang="en-US"/>
+          </a:p>
+        </p:txBody>
+      </p:sp>
+    </p:spTree>
+    <p:extLst>
+      <p:ext uri="{BB962C8B-B14F-4D97-AF65-F5344CB8AC3E}">
+        <p14:creationId xmlns:p14="http://schemas.microsoft.com/office/powerpoint/2010/main" val="3906010114"/>
+      </p:ext>
+    </p:extLst>
+  </p:cSld>
+  <p:clrMapOvr>
+    <a:masterClrMapping/>
+  </p:clrMapOvr>
+</p:notes>
+</file>
+
+<file path=ppt/notesSlides/notesSlide3.xml><?xml version="1.0" encoding="utf-8"?>
+<p:notes xmlns:a="http://schemas.openxmlformats.org/drawingml/2006/main" xmlns:r="http://schemas.openxmlformats.org/officeDocument/2006/relationships" xmlns:p="http://schemas.openxmlformats.org/presentationml/2006/main">
+  <p:cSld>
+    <p:spTree>
+      <p:nvGrpSpPr>
+        <p:cNvPr id="1" name=""/>
+        <p:cNvGrpSpPr/>
+        <p:nvPr/>
+      </p:nvGrpSpPr>
+      <p:grpSpPr>
+        <a:xfrm>
+          <a:off x="0" y="0"/>
+          <a:ext cx="0" cy="0"/>
+          <a:chOff x="0" y="0"/>
+          <a:chExt cx="0" cy="0"/>
+        </a:xfrm>
+      </p:grpSpPr>
+      <p:sp>
+        <p:nvSpPr>
+          <p:cNvPr id="2" name="Slide Image Placeholder 1"/>
+          <p:cNvSpPr>
+            <a:spLocks noGrp="1" noRot="1" noChangeAspect="1"/>
+          </p:cNvSpPr>
+          <p:nvPr>
+            <p:ph type="sldImg"/>
+          </p:nvPr>
+        </p:nvSpPr>
+        <p:spPr/>
+      </p:sp>
+      <p:sp>
+        <p:nvSpPr>
+          <p:cNvPr id="3" name="Notes Placeholder 2"/>
+          <p:cNvSpPr>
+            <a:spLocks noGrp="1"/>
+          </p:cNvSpPr>
+          <p:nvPr>
+            <p:ph type="body" idx="1"/>
+          </p:nvPr>
+        </p:nvSpPr>
+        <p:spPr/>
+        <p:txBody>
+          <a:bodyPr/>
+          <a:lstStyle/>
+          <a:p>
+            <a:endParaRPr lang="en-US" dirty="0"/>
+          </a:p>
+        </p:txBody>
+      </p:sp>
+      <p:sp>
+        <p:nvSpPr>
+          <p:cNvPr id="4" name="Slide Number Placeholder 3"/>
+          <p:cNvSpPr>
+            <a:spLocks noGrp="1"/>
+          </p:cNvSpPr>
+          <p:nvPr>
+            <p:ph type="sldNum" sz="quarter" idx="10"/>
+          </p:nvPr>
+        </p:nvSpPr>
+        <p:spPr/>
+        <p:txBody>
+          <a:bodyPr/>
+          <a:lstStyle/>
+          <a:p>
+            <a:fld id="{DBDA5EBE-E194-4A8A-BBBE-6B90DE9885F5}" type="slidenum">
+              <a:rPr lang="en-US" smtClean="0"/>
+              <a:pPr/>
+              <a:t>21</a:t>
+            </a:fld>
+            <a:endParaRPr lang="en-US"/>
+          </a:p>
+        </p:txBody>
+      </p:sp>
+    </p:spTree>
+    <p:extLst>
+      <p:ext uri="{BB962C8B-B14F-4D97-AF65-F5344CB8AC3E}">
+        <p14:creationId xmlns:p14="http://schemas.microsoft.com/office/powerpoint/2010/main" val="1616262821"/>
+      </p:ext>
+    </p:extLst>
+  </p:cSld>
+  <p:clrMapOvr>
+    <a:masterClrMapping/>
+  </p:clrMapOvr>
+</p:notes>
+</file>
+
+<file path=ppt/notesSlides/notesSlide4.xml><?xml version="1.0" encoding="utf-8"?>
+<p:notes xmlns:a="http://schemas.openxmlformats.org/drawingml/2006/main" xmlns:r="http://schemas.openxmlformats.org/officeDocument/2006/relationships" xmlns:p="http://schemas.openxmlformats.org/presentationml/2006/main">
+  <p:cSld>
+    <p:spTree>
+      <p:nvGrpSpPr>
+        <p:cNvPr id="1" name=""/>
+        <p:cNvGrpSpPr/>
+        <p:nvPr/>
+      </p:nvGrpSpPr>
+      <p:grpSpPr>
+        <a:xfrm>
+          <a:off x="0" y="0"/>
+          <a:ext cx="0" cy="0"/>
+          <a:chOff x="0" y="0"/>
+          <a:chExt cx="0" cy="0"/>
+        </a:xfrm>
+      </p:grpSpPr>
+      <p:sp>
+        <p:nvSpPr>
+          <p:cNvPr id="2" name="Slide Image Placeholder 1"/>
+          <p:cNvSpPr>
+            <a:spLocks noGrp="1" noRot="1" noChangeAspect="1"/>
+          </p:cNvSpPr>
+          <p:nvPr>
+            <p:ph type="sldImg"/>
+          </p:nvPr>
+        </p:nvSpPr>
         <p:spPr>
           <a:xfrm>
             <a:off x="685800" y="1143000"/>
@@ -549,28 +809,6 @@
           <a:bodyPr/>
           <a:lstStyle/>
           <a:p>
-            <a:r>
-              <a:rPr lang="en-US" b="1" dirty="0" smtClean="0"/>
-              <a:t>Thank you slide</a:t>
-            </a:r>
-          </a:p>
-          <a:p>
-            <a:r>
-              <a:rPr lang="en-US" dirty="0" smtClean="0"/>
-              <a:t>Thank You– font size 30, Arial Headings</a:t>
-            </a:r>
-          </a:p>
-          <a:p>
-            <a:r>
-              <a:rPr lang="en-US" dirty="0" smtClean="0"/>
-              <a:t>Name &amp; Designation – font size 18, Arial Headings</a:t>
-            </a:r>
-          </a:p>
-          <a:p>
-            <a:r>
-              <a:rPr lang="en-US" dirty="0" smtClean="0"/>
-              <a:t>Your/contact email id – font size 18, Arial Headings</a:t>
-            </a:r>
             <a:endParaRPr lang="en-US" dirty="0"/>
           </a:p>
         </p:txBody>
@@ -593,7 +831,7 @@
             <a:fld id="{DBDA5EBE-E194-4A8A-BBBE-6B90DE9885F5}" type="slidenum">
               <a:rPr lang="en-US" smtClean="0"/>
               <a:pPr/>
-              <a:t>18</a:t>
+              <a:t>23</a:t>
             </a:fld>
             <a:endParaRPr lang="en-US"/>
           </a:p>
@@ -7207,7 +7445,7 @@
             <a:fld id="{1D8BD707-D9CF-40AE-B4C6-C98DA3205C09}" type="datetimeFigureOut">
               <a:rPr lang="en-US"/>
               <a:pPr/>
-              <a:t>2/15/2016</a:t>
+              <a:t>2/22/2016</a:t>
             </a:fld>
             <a:endParaRPr lang="en-US"/>
           </a:p>
@@ -11755,22 +11993,24 @@
       </p:grpSpPr>
       <p:sp>
         <p:nvSpPr>
-          <p:cNvPr id="2" name="Title 1"/>
-          <p:cNvSpPr>
-            <a:spLocks noGrp="1"/>
-          </p:cNvSpPr>
-          <p:nvPr>
-            <p:ph type="title"/>
+          <p:cNvPr id="4" name="Text Placeholder 3"/>
+          <p:cNvSpPr>
+            <a:spLocks noGrp="1"/>
+          </p:cNvSpPr>
+          <p:nvPr>
+            <p:ph type="body" sz="quarter" idx="11"/>
           </p:nvPr>
         </p:nvSpPr>
         <p:spPr/>
         <p:txBody>
-          <a:bodyPr/>
+          <a:bodyPr>
+            <a:normAutofit fontScale="92500" lnSpcReduction="20000"/>
+          </a:bodyPr>
           <a:lstStyle/>
           <a:p>
             <a:r>
               <a:rPr lang="en-US" dirty="0" smtClean="0"/>
-              <a:t>Short variable declaration</a:t>
+              <a:t>Packages, Variables, Constants</a:t>
             </a:r>
             <a:endParaRPr lang="en-US" dirty="0"/>
           </a:p>
@@ -11778,69 +12018,42 @@
       </p:sp>
       <p:sp>
         <p:nvSpPr>
-          <p:cNvPr id="3" name="Content Placeholder 2"/>
-          <p:cNvSpPr>
-            <a:spLocks noGrp="1"/>
-          </p:cNvSpPr>
-          <p:nvPr>
-            <p:ph idx="1"/>
+          <p:cNvPr id="5" name="Text Placeholder 4"/>
+          <p:cNvSpPr>
+            <a:spLocks noGrp="1"/>
+          </p:cNvSpPr>
+          <p:nvPr>
+            <p:ph type="body" sz="quarter" idx="12"/>
           </p:nvPr>
         </p:nvSpPr>
         <p:spPr/>
         <p:txBody>
-          <a:bodyPr/>
+          <a:bodyPr>
+            <a:normAutofit lnSpcReduction="10000"/>
+          </a:bodyPr>
           <a:lstStyle/>
           <a:p>
-            <a:r>
-              <a:rPr lang="en-US" dirty="0"/>
-              <a:t>Inside a function, the := short assignment statement can be used in place of a </a:t>
-            </a:r>
-            <a:r>
-              <a:rPr lang="en-US" dirty="0" err="1"/>
-              <a:t>var</a:t>
-            </a:r>
-            <a:r>
-              <a:rPr lang="en-US" dirty="0"/>
-              <a:t> declaration with implicit type.</a:t>
-            </a:r>
-          </a:p>
-          <a:p>
-            <a:endParaRPr lang="en-US" dirty="0"/>
-          </a:p>
-          <a:p>
-            <a:r>
-              <a:rPr lang="en-US" dirty="0"/>
-              <a:t>Outside a function, every statement begins with a keyword (</a:t>
-            </a:r>
-            <a:r>
-              <a:rPr lang="en-US" dirty="0" err="1"/>
-              <a:t>var</a:t>
-            </a:r>
-            <a:r>
-              <a:rPr lang="en-US" dirty="0"/>
-              <a:t>, </a:t>
-            </a:r>
-            <a:r>
-              <a:rPr lang="en-US" dirty="0" err="1"/>
-              <a:t>func</a:t>
-            </a:r>
-            <a:r>
-              <a:rPr lang="en-US" dirty="0"/>
-              <a:t>, and so on) and so the := construct is not available.</a:t>
-            </a:r>
+            <a:endParaRPr lang="en-US"/>
           </a:p>
         </p:txBody>
       </p:sp>
     </p:spTree>
     <p:extLst>
       <p:ext uri="{BB962C8B-B14F-4D97-AF65-F5344CB8AC3E}">
-        <p14:creationId xmlns:p14="http://schemas.microsoft.com/office/powerpoint/2010/main" val="1230287746"/>
+        <p14:creationId xmlns:p14="http://schemas.microsoft.com/office/powerpoint/2010/main" val="1798359152"/>
       </p:ext>
     </p:extLst>
   </p:cSld>
   <p:clrMapOvr>
     <a:masterClrMapping/>
   </p:clrMapOvr>
+  <p:timing>
+    <p:tnLst>
+      <p:par>
+        <p:cTn id="1" dur="indefinite" restart="never" nodeType="tmRoot"/>
+      </p:par>
+    </p:tnLst>
+  </p:timing>
 </p:sld>
 </file>
 
@@ -11878,7 +12091,7 @@
           <a:p>
             <a:r>
               <a:rPr lang="en-US" dirty="0" smtClean="0"/>
-              <a:t>Basic data types</a:t>
+              <a:t>Packages</a:t>
             </a:r>
             <a:endParaRPr lang="en-US" dirty="0"/>
           </a:p>
@@ -11896,100 +12109,107 @@
         </p:nvSpPr>
         <p:spPr/>
         <p:txBody>
-          <a:bodyPr>
-            <a:normAutofit fontScale="92500" lnSpcReduction="10000"/>
+          <a:bodyPr/>
+          <a:lstStyle/>
+          <a:p>
+            <a:r>
+              <a:rPr lang="en-US" dirty="0"/>
+              <a:t>Every Go program is made up of packages.</a:t>
+            </a:r>
+          </a:p>
+          <a:p>
+            <a:r>
+              <a:rPr lang="en-US" dirty="0" smtClean="0"/>
+              <a:t>Programs </a:t>
+            </a:r>
+            <a:r>
+              <a:rPr lang="en-US" dirty="0"/>
+              <a:t>start running in package </a:t>
+            </a:r>
+            <a:r>
+              <a:rPr lang="en-US" b="1" dirty="0"/>
+              <a:t>main</a:t>
+            </a:r>
+            <a:r>
+              <a:rPr lang="en-US" dirty="0" smtClean="0"/>
+              <a:t>.</a:t>
+            </a:r>
+          </a:p>
+          <a:p>
+            <a:endParaRPr lang="en-US" dirty="0"/>
+          </a:p>
+          <a:p>
+            <a:r>
+              <a:rPr lang="en-US" dirty="0" smtClean="0"/>
+              <a:t>It is possible to import remote packages into Go </a:t>
+            </a:r>
+          </a:p>
+          <a:p>
+            <a:pPr lvl="1"/>
+            <a:r>
+              <a:rPr lang="en-US" dirty="0" smtClean="0"/>
+              <a:t>E.g. </a:t>
+            </a:r>
+            <a:endParaRPr lang="en-US" dirty="0"/>
+          </a:p>
+        </p:txBody>
+      </p:sp>
+      <p:pic>
+        <p:nvPicPr>
+          <p:cNvPr id="4" name="Picture 3"/>
+          <p:cNvPicPr>
+            <a:picLocks noChangeAspect="1"/>
+          </p:cNvPicPr>
+          <p:nvPr/>
+        </p:nvPicPr>
+        <p:blipFill>
+          <a:blip r:embed="rId2"/>
+          <a:stretch>
+            <a:fillRect/>
+          </a:stretch>
+        </p:blipFill>
+        <p:spPr>
+          <a:xfrm>
+            <a:off x="1776716" y="2707937"/>
+            <a:ext cx="5162550" cy="914400"/>
+          </a:xfrm>
+          <a:prstGeom prst="rect">
+            <a:avLst/>
+          </a:prstGeom>
+        </p:spPr>
+      </p:pic>
+      <p:sp>
+        <p:nvSpPr>
+          <p:cNvPr id="5" name="Rectangle 4"/>
+          <p:cNvSpPr/>
+          <p:nvPr/>
+        </p:nvSpPr>
+        <p:spPr>
+          <a:xfrm>
+            <a:off x="457200" y="4429892"/>
+            <a:ext cx="2876108" cy="246221"/>
+          </a:xfrm>
+          <a:prstGeom prst="rect">
+            <a:avLst/>
+          </a:prstGeom>
+        </p:spPr>
+        <p:txBody>
+          <a:bodyPr wrap="none">
+            <a:spAutoFit/>
           </a:bodyPr>
           <a:lstStyle/>
           <a:p>
             <a:r>
-              <a:rPr lang="en-US" dirty="0"/>
-              <a:t>bool</a:t>
-            </a:r>
-          </a:p>
-          <a:p>
-            <a:r>
-              <a:rPr lang="en-US" dirty="0" smtClean="0"/>
-              <a:t>string</a:t>
-            </a:r>
-            <a:endParaRPr lang="en-US" dirty="0"/>
-          </a:p>
-          <a:p>
-            <a:r>
-              <a:rPr lang="en-US" dirty="0" err="1" smtClean="0"/>
-              <a:t>int</a:t>
-            </a:r>
-            <a:r>
-              <a:rPr lang="en-US" dirty="0" smtClean="0"/>
-              <a:t>  </a:t>
-            </a:r>
-            <a:r>
-              <a:rPr lang="en-US" dirty="0"/>
-              <a:t>int8  int16  int32  int64</a:t>
-            </a:r>
-          </a:p>
-          <a:p>
-            <a:r>
-              <a:rPr lang="en-US" dirty="0" err="1"/>
-              <a:t>uint</a:t>
-            </a:r>
-            <a:r>
-              <a:rPr lang="en-US" dirty="0"/>
-              <a:t> uint8 uint16 uint32 uint64 </a:t>
-            </a:r>
-            <a:r>
-              <a:rPr lang="en-US" dirty="0" err="1" smtClean="0"/>
-              <a:t>uintptr</a:t>
-            </a:r>
-            <a:r>
-              <a:rPr lang="en-US" dirty="0" smtClean="0"/>
-              <a:t> //unsigned integer – only positive integers</a:t>
-            </a:r>
-            <a:endParaRPr lang="en-US" dirty="0"/>
-          </a:p>
-          <a:p>
-            <a:r>
-              <a:rPr lang="en-US" dirty="0" smtClean="0"/>
-              <a:t>byte </a:t>
-            </a:r>
-            <a:r>
-              <a:rPr lang="en-US" dirty="0"/>
-              <a:t>// alias for uint8</a:t>
-            </a:r>
-          </a:p>
-          <a:p>
-            <a:r>
-              <a:rPr lang="en-US" dirty="0" smtClean="0"/>
-              <a:t>rune </a:t>
-            </a:r>
-            <a:r>
-              <a:rPr lang="en-US" dirty="0"/>
-              <a:t>// alias for int32</a:t>
-            </a:r>
-          </a:p>
-          <a:p>
-            <a:r>
-              <a:rPr lang="en-US" dirty="0"/>
-              <a:t>     // represents a Unicode code point</a:t>
-            </a:r>
-          </a:p>
-          <a:p>
-            <a:r>
-              <a:rPr lang="en-US" dirty="0" smtClean="0"/>
-              <a:t>float32 </a:t>
-            </a:r>
-            <a:r>
-              <a:rPr lang="en-US" dirty="0"/>
-              <a:t>float64</a:t>
-            </a:r>
-          </a:p>
-          <a:p>
-            <a:r>
-              <a:rPr lang="en-US" dirty="0" smtClean="0"/>
-              <a:t>complex64 </a:t>
-            </a:r>
-            <a:r>
-              <a:rPr lang="en-US" dirty="0"/>
-              <a:t>complex128</a:t>
+              <a:rPr lang="en-US" sz="1000" dirty="0" smtClean="0">
+                <a:latin typeface="Calibri" panose="020F0502020204030204" pitchFamily="34" charset="0"/>
+              </a:rPr>
+              <a:t>Source: https</a:t>
+            </a:r>
+            <a:r>
+              <a:rPr lang="en-US" sz="1000" dirty="0">
+                <a:latin typeface="Calibri" panose="020F0502020204030204" pitchFamily="34" charset="0"/>
+              </a:rPr>
+              <a:t>://talks.golang.org/2012/splash.article</a:t>
             </a:r>
           </a:p>
         </p:txBody>
@@ -11997,13 +12217,20 @@
     </p:spTree>
     <p:extLst>
       <p:ext uri="{BB962C8B-B14F-4D97-AF65-F5344CB8AC3E}">
-        <p14:creationId xmlns:p14="http://schemas.microsoft.com/office/powerpoint/2010/main" val="553510561"/>
+        <p14:creationId xmlns:p14="http://schemas.microsoft.com/office/powerpoint/2010/main" val="2179189596"/>
       </p:ext>
     </p:extLst>
   </p:cSld>
   <p:clrMapOvr>
     <a:masterClrMapping/>
   </p:clrMapOvr>
+  <p:timing>
+    <p:tnLst>
+      <p:par>
+        <p:cTn id="1" dur="indefinite" restart="never" nodeType="tmRoot"/>
+      </p:par>
+    </p:tnLst>
+  </p:timing>
 </p:sld>
 </file>
 
@@ -12041,7 +12268,7 @@
           <a:p>
             <a:r>
               <a:rPr lang="en-US" dirty="0" smtClean="0"/>
-              <a:t>Constants</a:t>
+              <a:t>Variables</a:t>
             </a:r>
             <a:endParaRPr lang="en-US" dirty="0"/>
           </a:p>
@@ -12063,56 +12290,92 @@
           <a:lstStyle/>
           <a:p>
             <a:r>
+              <a:rPr lang="en-US" b="1" dirty="0" err="1" smtClean="0"/>
+              <a:t>var</a:t>
+            </a:r>
+            <a:r>
+              <a:rPr lang="en-US" dirty="0" smtClean="0"/>
+              <a:t> </a:t>
+            </a:r>
+            <a:r>
               <a:rPr lang="en-US" dirty="0"/>
-              <a:t>Constants are declared like variables, but with the </a:t>
-            </a:r>
-            <a:r>
-              <a:rPr lang="en-US" dirty="0" err="1"/>
-              <a:t>const</a:t>
+              <a:t>statement declares a list of </a:t>
+            </a:r>
+            <a:r>
+              <a:rPr lang="en-US" dirty="0" smtClean="0"/>
+              <a:t>variables</a:t>
+            </a:r>
+            <a:endParaRPr lang="en-US" dirty="0"/>
+          </a:p>
+          <a:p>
+            <a:endParaRPr lang="en-US" dirty="0"/>
+          </a:p>
+          <a:p>
+            <a:r>
+              <a:rPr lang="en-US" dirty="0" err="1" smtClean="0"/>
+              <a:t>var</a:t>
+            </a:r>
+            <a:r>
+              <a:rPr lang="en-US" dirty="0" smtClean="0"/>
+              <a:t> </a:t>
             </a:r>
             <a:r>
               <a:rPr lang="en-US" dirty="0"/>
-              <a:t> keyword.</a:t>
-            </a:r>
-          </a:p>
-          <a:p>
-            <a:endParaRPr lang="en-US" dirty="0"/>
-          </a:p>
-          <a:p>
-            <a:r>
-              <a:rPr lang="en-US" dirty="0"/>
-              <a:t>Constants can be character, string, </a:t>
-            </a:r>
-            <a:r>
-              <a:rPr lang="en-US" dirty="0" err="1"/>
-              <a:t>boolean</a:t>
-            </a:r>
-            <a:r>
-              <a:rPr lang="en-US" dirty="0"/>
-              <a:t>, or numeric values.</a:t>
-            </a:r>
-          </a:p>
-          <a:p>
-            <a:endParaRPr lang="en-US" dirty="0"/>
-          </a:p>
-          <a:p>
-            <a:r>
-              <a:rPr lang="en-US" dirty="0"/>
-              <a:t>Constants cannot be declared using the := syntax.</a:t>
-            </a:r>
+              <a:t>statement can be at package or function level. </a:t>
+            </a:r>
+          </a:p>
+        </p:txBody>
+      </p:sp>
+      <p:sp>
+        <p:nvSpPr>
+          <p:cNvPr id="5" name="Rectangle 4"/>
+          <p:cNvSpPr/>
+          <p:nvPr/>
+        </p:nvSpPr>
+        <p:spPr>
+          <a:xfrm>
+            <a:off x="457200" y="4429892"/>
+            <a:ext cx="1560042" cy="246221"/>
+          </a:xfrm>
+          <a:prstGeom prst="rect">
+            <a:avLst/>
+          </a:prstGeom>
+        </p:spPr>
+        <p:txBody>
+          <a:bodyPr wrap="none">
+            <a:spAutoFit/>
+          </a:bodyPr>
+          <a:lstStyle/>
+          <a:p>
+            <a:r>
+              <a:rPr lang="en-US" sz="1000" dirty="0" smtClean="0">
+                <a:latin typeface="Calibri" panose="020F0502020204030204" pitchFamily="34" charset="0"/>
+              </a:rPr>
+              <a:t>Source: https://golang.org</a:t>
+            </a:r>
+            <a:endParaRPr lang="en-US" sz="1000" dirty="0">
+              <a:latin typeface="Calibri" panose="020F0502020204030204" pitchFamily="34" charset="0"/>
+            </a:endParaRPr>
           </a:p>
         </p:txBody>
       </p:sp>
     </p:spTree>
     <p:extLst>
       <p:ext uri="{BB962C8B-B14F-4D97-AF65-F5344CB8AC3E}">
-        <p14:creationId xmlns:p14="http://schemas.microsoft.com/office/powerpoint/2010/main" val="2892542115"/>
+        <p14:creationId xmlns:p14="http://schemas.microsoft.com/office/powerpoint/2010/main" val="492609667"/>
       </p:ext>
     </p:extLst>
   </p:cSld>
   <p:clrMapOvr>
     <a:masterClrMapping/>
   </p:clrMapOvr>
+  <p:timing>
+    <p:tnLst>
+      <p:par>
+        <p:cTn id="1" dur="indefinite" restart="never" nodeType="tmRoot"/>
+      </p:par>
+    </p:tnLst>
+  </p:timing>
 </p:sld>
 </file>
 
@@ -12135,54 +12398,119 @@
       </p:grpSpPr>
       <p:sp>
         <p:nvSpPr>
-          <p:cNvPr id="4" name="Text Placeholder 3"/>
-          <p:cNvSpPr>
-            <a:spLocks noGrp="1"/>
-          </p:cNvSpPr>
-          <p:nvPr>
-            <p:ph type="body" sz="quarter" idx="11"/>
+          <p:cNvPr id="2" name="Title 1"/>
+          <p:cNvSpPr>
+            <a:spLocks noGrp="1"/>
+          </p:cNvSpPr>
+          <p:nvPr>
+            <p:ph type="title"/>
           </p:nvPr>
         </p:nvSpPr>
         <p:spPr/>
         <p:txBody>
-          <a:bodyPr>
-            <a:normAutofit fontScale="92500" lnSpcReduction="20000"/>
+          <a:bodyPr/>
+          <a:lstStyle/>
+          <a:p>
+            <a:r>
+              <a:rPr lang="en-US" dirty="0" smtClean="0"/>
+              <a:t>Short variable declaration</a:t>
+            </a:r>
+            <a:endParaRPr lang="en-US" dirty="0"/>
+          </a:p>
+        </p:txBody>
+      </p:sp>
+      <p:sp>
+        <p:nvSpPr>
+          <p:cNvPr id="3" name="Content Placeholder 2"/>
+          <p:cNvSpPr>
+            <a:spLocks noGrp="1"/>
+          </p:cNvSpPr>
+          <p:nvPr>
+            <p:ph idx="1"/>
+          </p:nvPr>
+        </p:nvSpPr>
+        <p:spPr/>
+        <p:txBody>
+          <a:bodyPr/>
+          <a:lstStyle/>
+          <a:p>
+            <a:r>
+              <a:rPr lang="en-US" dirty="0"/>
+              <a:t>Inside a function, the := short assignment statement can be used in place of a </a:t>
+            </a:r>
+            <a:r>
+              <a:rPr lang="en-US" dirty="0" err="1"/>
+              <a:t>var</a:t>
+            </a:r>
+            <a:r>
+              <a:rPr lang="en-US" dirty="0"/>
+              <a:t> declaration with implicit type.</a:t>
+            </a:r>
+          </a:p>
+          <a:p>
+            <a:endParaRPr lang="en-US" dirty="0"/>
+          </a:p>
+          <a:p>
+            <a:r>
+              <a:rPr lang="en-US" dirty="0"/>
+              <a:t>Outside a function, every statement begins with a keyword (</a:t>
+            </a:r>
+            <a:r>
+              <a:rPr lang="en-US" dirty="0" err="1"/>
+              <a:t>var</a:t>
+            </a:r>
+            <a:r>
+              <a:rPr lang="en-US" dirty="0"/>
+              <a:t>, </a:t>
+            </a:r>
+            <a:r>
+              <a:rPr lang="en-US" dirty="0" err="1"/>
+              <a:t>func</a:t>
+            </a:r>
+            <a:r>
+              <a:rPr lang="en-US" dirty="0"/>
+              <a:t>, and so on) and so the := construct is not available.</a:t>
+            </a:r>
+          </a:p>
+        </p:txBody>
+      </p:sp>
+      <p:sp>
+        <p:nvSpPr>
+          <p:cNvPr id="4" name="Rectangle 3"/>
+          <p:cNvSpPr/>
+          <p:nvPr/>
+        </p:nvSpPr>
+        <p:spPr>
+          <a:xfrm>
+            <a:off x="457200" y="4429892"/>
+            <a:ext cx="1560042" cy="246221"/>
+          </a:xfrm>
+          <a:prstGeom prst="rect">
+            <a:avLst/>
+          </a:prstGeom>
+        </p:spPr>
+        <p:txBody>
+          <a:bodyPr wrap="none">
+            <a:spAutoFit/>
           </a:bodyPr>
           <a:lstStyle/>
           <a:p>
             <a:r>
-              <a:rPr lang="en-US" dirty="0" smtClean="0"/>
-              <a:t>Flow control statements</a:t>
-            </a:r>
-            <a:endParaRPr lang="en-US" dirty="0"/>
-          </a:p>
-        </p:txBody>
-      </p:sp>
-      <p:sp>
-        <p:nvSpPr>
-          <p:cNvPr id="5" name="Text Placeholder 4"/>
-          <p:cNvSpPr>
-            <a:spLocks noGrp="1"/>
-          </p:cNvSpPr>
-          <p:nvPr>
-            <p:ph type="body" sz="quarter" idx="12"/>
-          </p:nvPr>
-        </p:nvSpPr>
-        <p:spPr/>
-        <p:txBody>
-          <a:bodyPr>
-            <a:normAutofit lnSpcReduction="10000"/>
-          </a:bodyPr>
-          <a:lstStyle/>
-          <a:p>
-            <a:endParaRPr lang="en-US"/>
+              <a:rPr lang="en-US" sz="1000" dirty="0" smtClean="0">
+                <a:latin typeface="Calibri" panose="020F0502020204030204" pitchFamily="34" charset="0"/>
+              </a:rPr>
+              <a:t>Source: https://golang.org</a:t>
+            </a:r>
+            <a:endParaRPr lang="en-US" sz="1000" dirty="0">
+              <a:latin typeface="Calibri" panose="020F0502020204030204" pitchFamily="34" charset="0"/>
+            </a:endParaRPr>
           </a:p>
         </p:txBody>
       </p:sp>
     </p:spTree>
     <p:extLst>
       <p:ext uri="{BB962C8B-B14F-4D97-AF65-F5344CB8AC3E}">
-        <p14:creationId xmlns:p14="http://schemas.microsoft.com/office/powerpoint/2010/main" val="707752395"/>
+        <p14:creationId xmlns:p14="http://schemas.microsoft.com/office/powerpoint/2010/main" val="1230287746"/>
       </p:ext>
     </p:extLst>
   </p:cSld>
@@ -12226,7 +12554,7 @@
           <a:p>
             <a:r>
               <a:rPr lang="en-US" dirty="0" smtClean="0"/>
-              <a:t>For</a:t>
+              <a:t>Basic data types</a:t>
             </a:r>
             <a:endParaRPr lang="en-US" dirty="0"/>
           </a:p>
@@ -12245,92 +12573,157 @@
         <p:spPr/>
         <p:txBody>
           <a:bodyPr>
-            <a:normAutofit fontScale="92500"/>
+            <a:normAutofit/>
           </a:bodyPr>
           <a:lstStyle/>
           <a:p>
             <a:r>
+              <a:rPr lang="en-US" dirty="0" smtClean="0"/>
+              <a:t>bool, string, </a:t>
+            </a:r>
+            <a:r>
+              <a:rPr lang="en-US" dirty="0" err="1" smtClean="0"/>
+              <a:t>int</a:t>
+            </a:r>
+            <a:r>
+              <a:rPr lang="en-US" dirty="0" smtClean="0"/>
+              <a:t> , int8,  </a:t>
+            </a:r>
+            <a:r>
               <a:rPr lang="en-US" dirty="0"/>
-              <a:t>Go has only one looping construct, the for loop.</a:t>
-            </a:r>
-          </a:p>
-          <a:p>
-            <a:r>
-              <a:rPr lang="en-US" dirty="0" smtClean="0"/>
-              <a:t>The </a:t>
+              <a:t>int16 </a:t>
+            </a:r>
+            <a:r>
+              <a:rPr lang="en-US" dirty="0" smtClean="0"/>
+              <a:t>, </a:t>
             </a:r>
             <a:r>
               <a:rPr lang="en-US" dirty="0"/>
-              <a:t>basic for loop has three components separated by semicolons:</a:t>
-            </a:r>
-          </a:p>
-          <a:p>
-            <a:pPr lvl="1"/>
-            <a:r>
-              <a:rPr lang="en-US" dirty="0" smtClean="0"/>
-              <a:t>the </a:t>
-            </a:r>
+              <a:t>int32  </a:t>
+            </a:r>
+            <a:r>
+              <a:rPr lang="en-US" dirty="0" smtClean="0"/>
+              <a:t>, int64</a:t>
+            </a:r>
+            <a:endParaRPr lang="en-US" dirty="0"/>
+          </a:p>
+          <a:p>
             <a:r>
               <a:rPr lang="en-US" dirty="0" err="1"/>
-              <a:t>init</a:t>
+              <a:t>uint</a:t>
             </a:r>
             <a:r>
               <a:rPr lang="en-US" dirty="0"/>
-              <a:t> statement: executed before the first iteration</a:t>
-            </a:r>
-          </a:p>
-          <a:p>
-            <a:pPr lvl="1"/>
+              <a:t> uint8 uint16 uint32 uint64 </a:t>
+            </a:r>
+            <a:r>
+              <a:rPr lang="en-US" dirty="0" err="1" smtClean="0"/>
+              <a:t>uintptr</a:t>
+            </a:r>
+            <a:r>
+              <a:rPr lang="en-US" dirty="0" smtClean="0"/>
+              <a:t> </a:t>
+            </a:r>
+            <a:r>
+              <a:rPr lang="en-US" dirty="0" smtClean="0"/>
+              <a:t>– denoted unsigned integer</a:t>
+            </a:r>
+            <a:endParaRPr lang="en-US" dirty="0"/>
+          </a:p>
+          <a:p>
+            <a:r>
+              <a:rPr lang="en-US" dirty="0" smtClean="0"/>
+              <a:t>byte </a:t>
+            </a:r>
             <a:r>
               <a:rPr lang="en-US" dirty="0"/>
-              <a:t>the condition expression: evaluated before every iteration</a:t>
-            </a:r>
-          </a:p>
-          <a:p>
-            <a:pPr lvl="1"/>
+              <a:t>// </a:t>
+            </a:r>
+            <a:r>
+              <a:rPr lang="en-US" dirty="0" smtClean="0"/>
+              <a:t>same as </a:t>
+            </a:r>
             <a:r>
               <a:rPr lang="en-US" dirty="0"/>
-              <a:t>the post statement: executed at the end of every iteration</a:t>
-            </a:r>
-          </a:p>
-          <a:p>
+              <a:t>uint8</a:t>
+            </a:r>
+          </a:p>
+          <a:p>
+            <a:r>
+              <a:rPr lang="en-US" dirty="0" smtClean="0"/>
+              <a:t>rune </a:t>
+            </a:r>
             <a:r>
               <a:rPr lang="en-US" dirty="0"/>
-              <a:t>The </a:t>
-            </a:r>
-            <a:r>
-              <a:rPr lang="en-US" dirty="0" err="1"/>
-              <a:t>init</a:t>
-            </a:r>
+              <a:t>// </a:t>
+            </a:r>
+            <a:r>
+              <a:rPr lang="en-US" dirty="0" smtClean="0"/>
+              <a:t>same as int32</a:t>
+            </a:r>
+            <a:endParaRPr lang="en-US" dirty="0"/>
+          </a:p>
+          <a:p>
             <a:r>
               <a:rPr lang="en-US" dirty="0"/>
-              <a:t> statement will often be a short variable declaration, and the variables declared there are visible only in the scope of the for statement.</a:t>
-            </a:r>
-          </a:p>
-          <a:p>
-            <a:r>
-              <a:rPr lang="en-US" dirty="0" smtClean="0"/>
-              <a:t>The </a:t>
+              <a:t> </a:t>
+            </a:r>
+            <a:r>
+              <a:rPr lang="en-US" dirty="0" smtClean="0"/>
+              <a:t>float32, float64, </a:t>
+            </a:r>
+            <a:r>
+              <a:rPr lang="en-US" dirty="0" smtClean="0"/>
+              <a:t>c</a:t>
+            </a:r>
+            <a:r>
+              <a:rPr lang="en-US" dirty="0" smtClean="0"/>
+              <a:t>omplex64, </a:t>
             </a:r>
             <a:r>
               <a:rPr lang="en-US" dirty="0"/>
-              <a:t>loop will stop iterating once the </a:t>
-            </a:r>
-            <a:r>
-              <a:rPr lang="en-US" dirty="0" err="1"/>
-              <a:t>boolean</a:t>
-            </a:r>
-            <a:r>
-              <a:rPr lang="en-US" dirty="0"/>
-              <a:t> condition evaluates to false.</a:t>
-            </a:r>
+              <a:t>complex128</a:t>
+            </a:r>
+          </a:p>
+        </p:txBody>
+      </p:sp>
+      <p:sp>
+        <p:nvSpPr>
+          <p:cNvPr id="4" name="Rectangle 3"/>
+          <p:cNvSpPr/>
+          <p:nvPr/>
+        </p:nvSpPr>
+        <p:spPr>
+          <a:xfrm>
+            <a:off x="457200" y="4696557"/>
+            <a:ext cx="1560042" cy="246221"/>
+          </a:xfrm>
+          <a:prstGeom prst="rect">
+            <a:avLst/>
+          </a:prstGeom>
+        </p:spPr>
+        <p:txBody>
+          <a:bodyPr wrap="none">
+            <a:spAutoFit/>
+          </a:bodyPr>
+          <a:lstStyle/>
+          <a:p>
+            <a:r>
+              <a:rPr lang="en-US" sz="1000" dirty="0" smtClean="0">
+                <a:latin typeface="Calibri" panose="020F0502020204030204" pitchFamily="34" charset="0"/>
+              </a:rPr>
+              <a:t>Source: https://golang.org</a:t>
+            </a:r>
+            <a:endParaRPr lang="en-US" sz="1000" dirty="0">
+              <a:latin typeface="Calibri" panose="020F0502020204030204" pitchFamily="34" charset="0"/>
+            </a:endParaRPr>
           </a:p>
         </p:txBody>
       </p:sp>
     </p:spTree>
     <p:extLst>
       <p:ext uri="{BB962C8B-B14F-4D97-AF65-F5344CB8AC3E}">
-        <p14:creationId xmlns:p14="http://schemas.microsoft.com/office/powerpoint/2010/main" val="3200743104"/>
+        <p14:creationId xmlns:p14="http://schemas.microsoft.com/office/powerpoint/2010/main" val="553510561"/>
       </p:ext>
     </p:extLst>
   </p:cSld>
@@ -12374,7 +12767,7 @@
           <a:p>
             <a:r>
               <a:rPr lang="en-US" dirty="0" smtClean="0"/>
-              <a:t>Switch…case…default</a:t>
+              <a:t>Constants</a:t>
             </a:r>
             <a:endParaRPr lang="en-US" dirty="0"/>
           </a:p>
@@ -12397,22 +12790,112 @@
           <a:p>
             <a:r>
               <a:rPr lang="en-US" dirty="0"/>
-              <a:t>Switch evaluation order</a:t>
-            </a:r>
-          </a:p>
-          <a:p>
-            <a:pPr lvl="1"/>
+              <a:t>Constants are declared like </a:t>
+            </a:r>
+            <a:r>
+              <a:rPr lang="en-US" dirty="0" smtClean="0"/>
+              <a:t>variables using </a:t>
+            </a:r>
             <a:r>
               <a:rPr lang="en-US" dirty="0"/>
-              <a:t>Switch cases evaluate cases from top to bottom, stopping when a case succeeds.</a:t>
-            </a:r>
+              <a:t>the </a:t>
+            </a:r>
+            <a:r>
+              <a:rPr lang="en-US" b="1" dirty="0" err="1"/>
+              <a:t>const</a:t>
+            </a:r>
+            <a:r>
+              <a:rPr lang="en-US" b="1" dirty="0"/>
+              <a:t> </a:t>
+            </a:r>
+            <a:r>
+              <a:rPr lang="en-US" dirty="0" smtClean="0"/>
+              <a:t>keyword</a:t>
+            </a:r>
+            <a:endParaRPr lang="en-US" dirty="0"/>
+          </a:p>
+          <a:p>
+            <a:endParaRPr lang="en-US" dirty="0"/>
+          </a:p>
+          <a:p>
+            <a:r>
+              <a:rPr lang="en-US" dirty="0"/>
+              <a:t>Constants can be </a:t>
+            </a:r>
+            <a:r>
+              <a:rPr lang="en-US" dirty="0"/>
+              <a:t>string, character</a:t>
+            </a:r>
+            <a:r>
+              <a:rPr lang="en-US" dirty="0"/>
+              <a:t>, </a:t>
+            </a:r>
+            <a:r>
+              <a:rPr lang="en-US" dirty="0" err="1" smtClean="0"/>
+              <a:t>boolean</a:t>
+            </a:r>
+            <a:r>
+              <a:rPr lang="en-US" dirty="0" smtClean="0"/>
+              <a:t> or numeric</a:t>
+            </a:r>
+            <a:endParaRPr lang="en-US" dirty="0"/>
+          </a:p>
+          <a:p>
+            <a:endParaRPr lang="en-US" dirty="0"/>
+          </a:p>
+          <a:p>
+            <a:r>
+              <a:rPr lang="en-US" dirty="0"/>
+              <a:t>Constants cannot be declared using </a:t>
+            </a:r>
+            <a:r>
+              <a:rPr lang="en-US" dirty="0" smtClean="0"/>
+              <a:t>:= </a:t>
+            </a:r>
+            <a:r>
+              <a:rPr lang="en-US" dirty="0"/>
+              <a:t>syntax.</a:t>
+            </a:r>
+          </a:p>
+        </p:txBody>
+      </p:sp>
+      <p:sp>
+        <p:nvSpPr>
+          <p:cNvPr id="4" name="Rectangle 3"/>
+          <p:cNvSpPr/>
+          <p:nvPr/>
+        </p:nvSpPr>
+        <p:spPr>
+          <a:xfrm>
+            <a:off x="457200" y="4696557"/>
+            <a:ext cx="1560042" cy="246221"/>
+          </a:xfrm>
+          <a:prstGeom prst="rect">
+            <a:avLst/>
+          </a:prstGeom>
+        </p:spPr>
+        <p:txBody>
+          <a:bodyPr wrap="none">
+            <a:spAutoFit/>
+          </a:bodyPr>
+          <a:lstStyle/>
+          <a:p>
+            <a:r>
+              <a:rPr lang="en-US" sz="1000" dirty="0" smtClean="0">
+                <a:latin typeface="Calibri" panose="020F0502020204030204" pitchFamily="34" charset="0"/>
+              </a:rPr>
+              <a:t>Source: https://golang.org</a:t>
+            </a:r>
+            <a:endParaRPr lang="en-US" sz="1000" dirty="0">
+              <a:latin typeface="Calibri" panose="020F0502020204030204" pitchFamily="34" charset="0"/>
+            </a:endParaRPr>
           </a:p>
         </p:txBody>
       </p:sp>
     </p:spTree>
     <p:extLst>
       <p:ext uri="{BB962C8B-B14F-4D97-AF65-F5344CB8AC3E}">
-        <p14:creationId xmlns:p14="http://schemas.microsoft.com/office/powerpoint/2010/main" val="996903421"/>
+        <p14:creationId xmlns:p14="http://schemas.microsoft.com/office/powerpoint/2010/main" val="2892542115"/>
       </p:ext>
     </p:extLst>
   </p:cSld>
@@ -12441,22 +12924,24 @@
       </p:grpSpPr>
       <p:sp>
         <p:nvSpPr>
-          <p:cNvPr id="2" name="Title 1"/>
-          <p:cNvSpPr>
-            <a:spLocks noGrp="1"/>
-          </p:cNvSpPr>
-          <p:nvPr>
-            <p:ph type="title"/>
+          <p:cNvPr id="4" name="Text Placeholder 3"/>
+          <p:cNvSpPr>
+            <a:spLocks noGrp="1"/>
+          </p:cNvSpPr>
+          <p:nvPr>
+            <p:ph type="body" sz="quarter" idx="11"/>
           </p:nvPr>
         </p:nvSpPr>
         <p:spPr/>
         <p:txBody>
-          <a:bodyPr/>
+          <a:bodyPr>
+            <a:normAutofit fontScale="92500" lnSpcReduction="20000"/>
+          </a:bodyPr>
           <a:lstStyle/>
           <a:p>
             <a:r>
               <a:rPr lang="en-US" dirty="0" smtClean="0"/>
-              <a:t>Defer</a:t>
+              <a:t>Flow control statements</a:t>
             </a:r>
             <a:endParaRPr lang="en-US" dirty="0"/>
           </a:p>
@@ -12464,39 +12949,29 @@
       </p:sp>
       <p:sp>
         <p:nvSpPr>
-          <p:cNvPr id="3" name="Content Placeholder 2"/>
-          <p:cNvSpPr>
-            <a:spLocks noGrp="1"/>
-          </p:cNvSpPr>
-          <p:nvPr>
-            <p:ph idx="1"/>
+          <p:cNvPr id="5" name="Text Placeholder 4"/>
+          <p:cNvSpPr>
+            <a:spLocks noGrp="1"/>
+          </p:cNvSpPr>
+          <p:nvPr>
+            <p:ph type="body" sz="quarter" idx="12"/>
           </p:nvPr>
         </p:nvSpPr>
         <p:spPr/>
         <p:txBody>
-          <a:bodyPr/>
+          <a:bodyPr>
+            <a:normAutofit lnSpcReduction="10000"/>
+          </a:bodyPr>
           <a:lstStyle/>
           <a:p>
-            <a:r>
-              <a:rPr lang="en-US" dirty="0"/>
-              <a:t>A defer statement defers the execution of a function until the surrounding function returns.</a:t>
-            </a:r>
-          </a:p>
-          <a:p>
-            <a:endParaRPr lang="en-US" dirty="0"/>
-          </a:p>
-          <a:p>
-            <a:r>
-              <a:rPr lang="en-US" dirty="0"/>
-              <a:t>The deferred call's arguments are evaluated immediately, but the function call is not executed until the surrounding function returns.</a:t>
-            </a:r>
+            <a:endParaRPr lang="en-US"/>
           </a:p>
         </p:txBody>
       </p:sp>
     </p:spTree>
     <p:extLst>
       <p:ext uri="{BB962C8B-B14F-4D97-AF65-F5344CB8AC3E}">
-        <p14:creationId xmlns:p14="http://schemas.microsoft.com/office/powerpoint/2010/main" val="1297094682"/>
+        <p14:creationId xmlns:p14="http://schemas.microsoft.com/office/powerpoint/2010/main" val="707752395"/>
       </p:ext>
     </p:extLst>
   </p:cSld>
@@ -12540,7 +13015,7 @@
           <a:p>
             <a:r>
               <a:rPr lang="en-US" dirty="0" smtClean="0"/>
-              <a:t>Methods</a:t>
+              <a:t>For</a:t>
             </a:r>
             <a:endParaRPr lang="en-US" dirty="0"/>
           </a:p>
@@ -12554,6 +13029,257 @@
           </p:cNvSpPr>
           <p:nvPr>
             <p:ph idx="1"/>
+          </p:nvPr>
+        </p:nvSpPr>
+        <p:spPr/>
+        <p:txBody>
+          <a:bodyPr>
+            <a:normAutofit/>
+          </a:bodyPr>
+          <a:lstStyle/>
+          <a:p>
+            <a:r>
+              <a:rPr lang="en-US" dirty="0"/>
+              <a:t>Go has only one looping </a:t>
+            </a:r>
+            <a:r>
+              <a:rPr lang="en-US" dirty="0" smtClean="0"/>
+              <a:t>construct - </a:t>
+            </a:r>
+            <a:r>
+              <a:rPr lang="en-US" b="1" dirty="0" smtClean="0"/>
+              <a:t>for </a:t>
+            </a:r>
+            <a:r>
+              <a:rPr lang="en-US" dirty="0" smtClean="0"/>
+              <a:t>loop</a:t>
+            </a:r>
+            <a:endParaRPr lang="en-US" dirty="0"/>
+          </a:p>
+          <a:p>
+            <a:r>
+              <a:rPr lang="en-US" dirty="0" smtClean="0"/>
+              <a:t>Loop </a:t>
+            </a:r>
+            <a:r>
+              <a:rPr lang="en-US" dirty="0"/>
+              <a:t>has three components separated by semicolons:</a:t>
+            </a:r>
+          </a:p>
+          <a:p>
+            <a:pPr lvl="1"/>
+            <a:r>
+              <a:rPr lang="en-US" dirty="0" err="1" smtClean="0"/>
+              <a:t>init</a:t>
+            </a:r>
+            <a:r>
+              <a:rPr lang="en-US" dirty="0" smtClean="0"/>
+              <a:t> </a:t>
+            </a:r>
+            <a:r>
+              <a:rPr lang="en-US" dirty="0"/>
+              <a:t>statement: executed before </a:t>
+            </a:r>
+            <a:r>
+              <a:rPr lang="en-US" dirty="0" smtClean="0"/>
+              <a:t>first </a:t>
+            </a:r>
+            <a:r>
+              <a:rPr lang="en-US" dirty="0"/>
+              <a:t>iteration</a:t>
+            </a:r>
+          </a:p>
+          <a:p>
+            <a:pPr lvl="1"/>
+            <a:r>
+              <a:rPr lang="en-US" dirty="0" smtClean="0"/>
+              <a:t>condition </a:t>
+            </a:r>
+            <a:r>
+              <a:rPr lang="en-US" dirty="0"/>
+              <a:t>expression: evaluated before every iteration</a:t>
+            </a:r>
+          </a:p>
+          <a:p>
+            <a:pPr lvl="1"/>
+            <a:r>
+              <a:rPr lang="en-US" dirty="0" smtClean="0"/>
+              <a:t>post </a:t>
+            </a:r>
+            <a:r>
+              <a:rPr lang="en-US" dirty="0"/>
+              <a:t>statement: executed at </a:t>
+            </a:r>
+            <a:r>
+              <a:rPr lang="en-US" dirty="0" smtClean="0"/>
+              <a:t>end </a:t>
+            </a:r>
+            <a:r>
+              <a:rPr lang="en-US" dirty="0"/>
+              <a:t>of every iteration</a:t>
+            </a:r>
+          </a:p>
+          <a:p>
+            <a:r>
+              <a:rPr lang="en-US" dirty="0" err="1" smtClean="0"/>
+              <a:t>init</a:t>
+            </a:r>
+            <a:r>
+              <a:rPr lang="en-US" dirty="0" smtClean="0"/>
+              <a:t> </a:t>
+            </a:r>
+            <a:r>
+              <a:rPr lang="en-US" dirty="0"/>
+              <a:t>statement </a:t>
+            </a:r>
+            <a:r>
+              <a:rPr lang="en-US" dirty="0" smtClean="0"/>
+              <a:t>is often a </a:t>
+            </a:r>
+            <a:r>
+              <a:rPr lang="en-US" dirty="0"/>
+              <a:t>short variable </a:t>
+            </a:r>
+            <a:r>
+              <a:rPr lang="en-US" dirty="0" smtClean="0"/>
+              <a:t>declaration</a:t>
+            </a:r>
+          </a:p>
+          <a:p>
+            <a:r>
+              <a:rPr lang="en-US" dirty="0" smtClean="0"/>
+              <a:t>Variables </a:t>
+            </a:r>
+            <a:r>
+              <a:rPr lang="en-US" dirty="0"/>
+              <a:t>declared </a:t>
+            </a:r>
+            <a:r>
+              <a:rPr lang="en-US" dirty="0" smtClean="0"/>
+              <a:t>visible </a:t>
+            </a:r>
+            <a:r>
+              <a:rPr lang="en-US" dirty="0"/>
+              <a:t>only </a:t>
+            </a:r>
+            <a:r>
+              <a:rPr lang="en-US" dirty="0" smtClean="0"/>
+              <a:t>within </a:t>
+            </a:r>
+            <a:r>
+              <a:rPr lang="en-US" dirty="0" smtClean="0"/>
+              <a:t>the </a:t>
+            </a:r>
+            <a:r>
+              <a:rPr lang="en-US" dirty="0"/>
+              <a:t>for </a:t>
+            </a:r>
+            <a:r>
+              <a:rPr lang="en-US" dirty="0" smtClean="0"/>
+              <a:t>statement</a:t>
+            </a:r>
+            <a:endParaRPr lang="en-US" dirty="0"/>
+          </a:p>
+          <a:p>
+            <a:r>
+              <a:rPr lang="en-US" dirty="0" smtClean="0"/>
+              <a:t>Loop stops </a:t>
+            </a:r>
+            <a:r>
+              <a:rPr lang="en-US" dirty="0"/>
+              <a:t>iterating once </a:t>
+            </a:r>
+            <a:r>
+              <a:rPr lang="en-US" dirty="0" err="1" smtClean="0"/>
+              <a:t>boolean</a:t>
+            </a:r>
+            <a:r>
+              <a:rPr lang="en-US" dirty="0" smtClean="0"/>
+              <a:t> </a:t>
+            </a:r>
+            <a:r>
+              <a:rPr lang="en-US" dirty="0"/>
+              <a:t>condition evaluates to </a:t>
+            </a:r>
+            <a:r>
+              <a:rPr lang="en-US" dirty="0" smtClean="0"/>
+              <a:t>false</a:t>
+            </a:r>
+            <a:endParaRPr lang="en-US" dirty="0"/>
+          </a:p>
+        </p:txBody>
+      </p:sp>
+      <p:sp>
+        <p:nvSpPr>
+          <p:cNvPr id="4" name="Rectangle 3"/>
+          <p:cNvSpPr/>
+          <p:nvPr/>
+        </p:nvSpPr>
+        <p:spPr>
+          <a:xfrm>
+            <a:off x="457200" y="4696557"/>
+            <a:ext cx="1560042" cy="246221"/>
+          </a:xfrm>
+          <a:prstGeom prst="rect">
+            <a:avLst/>
+          </a:prstGeom>
+        </p:spPr>
+        <p:txBody>
+          <a:bodyPr wrap="none">
+            <a:spAutoFit/>
+          </a:bodyPr>
+          <a:lstStyle/>
+          <a:p>
+            <a:r>
+              <a:rPr lang="en-US" sz="1000" dirty="0" smtClean="0">
+                <a:latin typeface="Calibri" panose="020F0502020204030204" pitchFamily="34" charset="0"/>
+              </a:rPr>
+              <a:t>Source: https://golang.org</a:t>
+            </a:r>
+            <a:endParaRPr lang="en-US" sz="1000" dirty="0">
+              <a:latin typeface="Calibri" panose="020F0502020204030204" pitchFamily="34" charset="0"/>
+            </a:endParaRPr>
+          </a:p>
+        </p:txBody>
+      </p:sp>
+    </p:spTree>
+    <p:extLst>
+      <p:ext uri="{BB962C8B-B14F-4D97-AF65-F5344CB8AC3E}">
+        <p14:creationId xmlns:p14="http://schemas.microsoft.com/office/powerpoint/2010/main" val="3200743104"/>
+      </p:ext>
+    </p:extLst>
+  </p:cSld>
+  <p:clrMapOvr>
+    <a:masterClrMapping/>
+  </p:clrMapOvr>
+</p:sld>
+</file>
+
+<file path=ppt/slides/slide18.xml><?xml version="1.0" encoding="utf-8"?>
+<p:sld xmlns:a="http://schemas.openxmlformats.org/drawingml/2006/main" xmlns:r="http://schemas.openxmlformats.org/officeDocument/2006/relationships" xmlns:p="http://schemas.openxmlformats.org/presentationml/2006/main">
+  <p:cSld>
+    <p:spTree>
+      <p:nvGrpSpPr>
+        <p:cNvPr id="1" name=""/>
+        <p:cNvGrpSpPr/>
+        <p:nvPr/>
+      </p:nvGrpSpPr>
+      <p:grpSpPr>
+        <a:xfrm>
+          <a:off x="0" y="0"/>
+          <a:ext cx="0" cy="0"/>
+          <a:chOff x="0" y="0"/>
+          <a:chExt cx="0" cy="0"/>
+        </a:xfrm>
+      </p:grpSpPr>
+      <p:sp>
+        <p:nvSpPr>
+          <p:cNvPr id="2" name="Title 1"/>
+          <p:cNvSpPr>
+            <a:spLocks noGrp="1"/>
+          </p:cNvSpPr>
+          <p:nvPr>
+            <p:ph type="title"/>
           </p:nvPr>
         </p:nvSpPr>
         <p:spPr/>
@@ -12562,30 +13288,567 @@
           <a:lstStyle/>
           <a:p>
             <a:r>
+              <a:rPr lang="en-US" dirty="0" smtClean="0"/>
+              <a:t>Switch…case…default</a:t>
+            </a:r>
+            <a:endParaRPr lang="en-US" dirty="0"/>
+          </a:p>
+        </p:txBody>
+      </p:sp>
+      <p:sp>
+        <p:nvSpPr>
+          <p:cNvPr id="3" name="Content Placeholder 2"/>
+          <p:cNvSpPr>
+            <a:spLocks noGrp="1"/>
+          </p:cNvSpPr>
+          <p:nvPr>
+            <p:ph idx="1"/>
+          </p:nvPr>
+        </p:nvSpPr>
+        <p:spPr/>
+        <p:txBody>
+          <a:bodyPr/>
+          <a:lstStyle/>
+          <a:p>
+            <a:r>
               <a:rPr lang="en-US" dirty="0"/>
-              <a:t>Go does not have classes. However, you can define methods on types.</a:t>
-            </a:r>
-          </a:p>
-          <a:p>
-            <a:endParaRPr lang="en-US" dirty="0" smtClean="0"/>
-          </a:p>
-          <a:p>
-            <a:r>
-              <a:rPr lang="en-US" dirty="0" smtClean="0"/>
-              <a:t>A </a:t>
-            </a:r>
+              <a:t>Switch evaluation order</a:t>
+            </a:r>
+          </a:p>
+          <a:p>
+            <a:pPr lvl="1"/>
             <a:r>
               <a:rPr lang="en-US" dirty="0"/>
-              <a:t>method is a function with a special receiver argument.</a:t>
-            </a:r>
-          </a:p>
-          <a:p>
+              <a:t>Switch cases evaluate cases from top to bottom, stopping when a case succeeds.</a:t>
+            </a:r>
+          </a:p>
+        </p:txBody>
+      </p:sp>
+      <p:sp>
+        <p:nvSpPr>
+          <p:cNvPr id="4" name="Rectangle 3"/>
+          <p:cNvSpPr/>
+          <p:nvPr/>
+        </p:nvSpPr>
+        <p:spPr>
+          <a:xfrm>
+            <a:off x="457200" y="4696557"/>
+            <a:ext cx="1560042" cy="246221"/>
+          </a:xfrm>
+          <a:prstGeom prst="rect">
+            <a:avLst/>
+          </a:prstGeom>
+        </p:spPr>
+        <p:txBody>
+          <a:bodyPr wrap="none">
+            <a:spAutoFit/>
+          </a:bodyPr>
+          <a:lstStyle/>
+          <a:p>
+            <a:r>
+              <a:rPr lang="en-US" sz="1000" dirty="0" smtClean="0">
+                <a:latin typeface="Calibri" panose="020F0502020204030204" pitchFamily="34" charset="0"/>
+              </a:rPr>
+              <a:t>Source: https://golang.org</a:t>
+            </a:r>
+            <a:endParaRPr lang="en-US" sz="1000" dirty="0">
+              <a:latin typeface="Calibri" panose="020F0502020204030204" pitchFamily="34" charset="0"/>
+            </a:endParaRPr>
+          </a:p>
+        </p:txBody>
+      </p:sp>
+    </p:spTree>
+    <p:extLst>
+      <p:ext uri="{BB962C8B-B14F-4D97-AF65-F5344CB8AC3E}">
+        <p14:creationId xmlns:p14="http://schemas.microsoft.com/office/powerpoint/2010/main" val="996903421"/>
+      </p:ext>
+    </p:extLst>
+  </p:cSld>
+  <p:clrMapOvr>
+    <a:masterClrMapping/>
+  </p:clrMapOvr>
+</p:sld>
+</file>
+
+<file path=ppt/slides/slide19.xml><?xml version="1.0" encoding="utf-8"?>
+<p:sld xmlns:a="http://schemas.openxmlformats.org/drawingml/2006/main" xmlns:r="http://schemas.openxmlformats.org/officeDocument/2006/relationships" xmlns:p="http://schemas.openxmlformats.org/presentationml/2006/main">
+  <p:cSld>
+    <p:spTree>
+      <p:nvGrpSpPr>
+        <p:cNvPr id="1" name=""/>
+        <p:cNvGrpSpPr/>
+        <p:nvPr/>
+      </p:nvGrpSpPr>
+      <p:grpSpPr>
+        <a:xfrm>
+          <a:off x="0" y="0"/>
+          <a:ext cx="0" cy="0"/>
+          <a:chOff x="0" y="0"/>
+          <a:chExt cx="0" cy="0"/>
+        </a:xfrm>
+      </p:grpSpPr>
+      <p:sp>
+        <p:nvSpPr>
+          <p:cNvPr id="2" name="Title 1"/>
+          <p:cNvSpPr>
+            <a:spLocks noGrp="1"/>
+          </p:cNvSpPr>
+          <p:nvPr>
+            <p:ph type="title"/>
+          </p:nvPr>
+        </p:nvSpPr>
+        <p:spPr/>
+        <p:txBody>
+          <a:bodyPr/>
+          <a:lstStyle/>
+          <a:p>
+            <a:r>
+              <a:rPr lang="en-US" dirty="0" smtClean="0"/>
+              <a:t>Defer</a:t>
+            </a:r>
             <a:endParaRPr lang="en-US" dirty="0"/>
           </a:p>
-          <a:p>
+        </p:txBody>
+      </p:sp>
+      <p:sp>
+        <p:nvSpPr>
+          <p:cNvPr id="3" name="Content Placeholder 2"/>
+          <p:cNvSpPr>
+            <a:spLocks noGrp="1"/>
+          </p:cNvSpPr>
+          <p:nvPr>
+            <p:ph idx="1"/>
+          </p:nvPr>
+        </p:nvSpPr>
+        <p:spPr/>
+        <p:txBody>
+          <a:bodyPr/>
+          <a:lstStyle/>
+          <a:p>
+            <a:r>
+              <a:rPr lang="en-US" dirty="0" smtClean="0"/>
+              <a:t>Defer </a:t>
+            </a:r>
             <a:r>
               <a:rPr lang="en-US" dirty="0"/>
-              <a:t>The receiver appears in its own argument list between the </a:t>
+              <a:t>statement defers the execution of a function until the surrounding function </a:t>
+            </a:r>
+            <a:r>
+              <a:rPr lang="en-US" dirty="0" smtClean="0"/>
+              <a:t>returns</a:t>
+            </a:r>
+            <a:endParaRPr lang="en-US" dirty="0"/>
+          </a:p>
+          <a:p>
+            <a:r>
+              <a:rPr lang="en-US" dirty="0" smtClean="0"/>
+              <a:t>Deferred </a:t>
+            </a:r>
+            <a:r>
+              <a:rPr lang="en-US" dirty="0"/>
+              <a:t>call's arguments are evaluated </a:t>
+            </a:r>
+            <a:r>
+              <a:rPr lang="en-US" dirty="0" smtClean="0"/>
+              <a:t>immediately</a:t>
+            </a:r>
+          </a:p>
+          <a:p>
+            <a:r>
+              <a:rPr lang="en-US" dirty="0" smtClean="0"/>
+              <a:t>The </a:t>
+            </a:r>
+            <a:r>
+              <a:rPr lang="en-US" dirty="0"/>
+              <a:t>function call is not executed until the surrounding function </a:t>
+            </a:r>
+            <a:r>
+              <a:rPr lang="en-US" dirty="0" smtClean="0"/>
+              <a:t>returns</a:t>
+            </a:r>
+            <a:endParaRPr lang="en-US" dirty="0"/>
+          </a:p>
+        </p:txBody>
+      </p:sp>
+      <p:sp>
+        <p:nvSpPr>
+          <p:cNvPr id="4" name="Rectangle 3"/>
+          <p:cNvSpPr/>
+          <p:nvPr/>
+        </p:nvSpPr>
+        <p:spPr>
+          <a:xfrm>
+            <a:off x="457200" y="4696557"/>
+            <a:ext cx="1560042" cy="246221"/>
+          </a:xfrm>
+          <a:prstGeom prst="rect">
+            <a:avLst/>
+          </a:prstGeom>
+        </p:spPr>
+        <p:txBody>
+          <a:bodyPr wrap="none">
+            <a:spAutoFit/>
+          </a:bodyPr>
+          <a:lstStyle/>
+          <a:p>
+            <a:r>
+              <a:rPr lang="en-US" sz="1000" dirty="0" smtClean="0">
+                <a:latin typeface="Calibri" panose="020F0502020204030204" pitchFamily="34" charset="0"/>
+              </a:rPr>
+              <a:t>Source: https://golang.org</a:t>
+            </a:r>
+            <a:endParaRPr lang="en-US" sz="1000" dirty="0">
+              <a:latin typeface="Calibri" panose="020F0502020204030204" pitchFamily="34" charset="0"/>
+            </a:endParaRPr>
+          </a:p>
+        </p:txBody>
+      </p:sp>
+    </p:spTree>
+    <p:extLst>
+      <p:ext uri="{BB962C8B-B14F-4D97-AF65-F5344CB8AC3E}">
+        <p14:creationId xmlns:p14="http://schemas.microsoft.com/office/powerpoint/2010/main" val="1297094682"/>
+      </p:ext>
+    </p:extLst>
+  </p:cSld>
+  <p:clrMapOvr>
+    <a:masterClrMapping/>
+  </p:clrMapOvr>
+</p:sld>
+</file>
+
+<file path=ppt/slides/slide2.xml><?xml version="1.0" encoding="utf-8"?>
+<p:sld xmlns:a="http://schemas.openxmlformats.org/drawingml/2006/main" xmlns:r="http://schemas.openxmlformats.org/officeDocument/2006/relationships" xmlns:p="http://schemas.openxmlformats.org/presentationml/2006/main">
+  <p:cSld>
+    <p:spTree>
+      <p:nvGrpSpPr>
+        <p:cNvPr id="1" name=""/>
+        <p:cNvGrpSpPr/>
+        <p:nvPr/>
+      </p:nvGrpSpPr>
+      <p:grpSpPr>
+        <a:xfrm>
+          <a:off x="0" y="0"/>
+          <a:ext cx="0" cy="0"/>
+          <a:chOff x="0" y="0"/>
+          <a:chExt cx="0" cy="0"/>
+        </a:xfrm>
+      </p:grpSpPr>
+      <p:sp>
+        <p:nvSpPr>
+          <p:cNvPr id="6" name="Title 5"/>
+          <p:cNvSpPr>
+            <a:spLocks noGrp="1"/>
+          </p:cNvSpPr>
+          <p:nvPr>
+            <p:ph type="title"/>
+          </p:nvPr>
+        </p:nvSpPr>
+        <p:spPr/>
+        <p:txBody>
+          <a:bodyPr/>
+          <a:lstStyle/>
+          <a:p>
+            <a:r>
+              <a:rPr lang="en-US" dirty="0" smtClean="0"/>
+              <a:t>About Go</a:t>
+            </a:r>
+            <a:endParaRPr lang="en-US" dirty="0"/>
+          </a:p>
+        </p:txBody>
+      </p:sp>
+      <p:sp>
+        <p:nvSpPr>
+          <p:cNvPr id="7" name="Content Placeholder 6"/>
+          <p:cNvSpPr>
+            <a:spLocks noGrp="1"/>
+          </p:cNvSpPr>
+          <p:nvPr>
+            <p:ph idx="1"/>
+          </p:nvPr>
+        </p:nvSpPr>
+        <p:spPr/>
+        <p:txBody>
+          <a:bodyPr>
+            <a:normAutofit fontScale="92500" lnSpcReduction="10000"/>
+          </a:bodyPr>
+          <a:lstStyle/>
+          <a:p>
+            <a:r>
+              <a:rPr lang="en-US" dirty="0" smtClean="0"/>
+              <a:t>Developed by Google</a:t>
+            </a:r>
+            <a:endParaRPr lang="en-US" dirty="0"/>
+          </a:p>
+          <a:p>
+            <a:pPr lvl="1"/>
+            <a:r>
+              <a:rPr lang="en-US" dirty="0"/>
+              <a:t>By Robert </a:t>
+            </a:r>
+            <a:r>
+              <a:rPr lang="en-US" dirty="0" err="1"/>
+              <a:t>Griesemer</a:t>
+            </a:r>
+            <a:r>
+              <a:rPr lang="en-US" dirty="0"/>
+              <a:t>, Rob Pike &amp; Ken Thompson</a:t>
+            </a:r>
+          </a:p>
+          <a:p>
+            <a:pPr lvl="1"/>
+            <a:r>
+              <a:rPr lang="en-US" dirty="0"/>
+              <a:t>Started in 2007</a:t>
+            </a:r>
+          </a:p>
+          <a:p>
+            <a:pPr lvl="1"/>
+            <a:r>
+              <a:rPr lang="en-US" dirty="0"/>
+              <a:t>Current Version </a:t>
+            </a:r>
+            <a:r>
+              <a:rPr lang="en-US" dirty="0" smtClean="0"/>
+              <a:t>1.5.3, </a:t>
+            </a:r>
+            <a:r>
+              <a:rPr lang="en-US" dirty="0"/>
+              <a:t>still being actively developed</a:t>
+            </a:r>
+          </a:p>
+          <a:p>
+            <a:r>
+              <a:rPr lang="en-US" dirty="0" smtClean="0"/>
+              <a:t>Compiled, concurrent, garbage-collected, statically typed</a:t>
+            </a:r>
+          </a:p>
+          <a:p>
+            <a:r>
+              <a:rPr lang="en-US" dirty="0" smtClean="0"/>
+              <a:t>Small language – only 25 keywords </a:t>
+            </a:r>
+          </a:p>
+          <a:p>
+            <a:r>
+              <a:rPr lang="en-US" dirty="0" smtClean="0"/>
+              <a:t>Getting started</a:t>
+            </a:r>
+          </a:p>
+          <a:p>
+            <a:pPr lvl="1"/>
+            <a:r>
+              <a:rPr lang="en-US" dirty="0" smtClean="0"/>
+              <a:t>Download </a:t>
+            </a:r>
+            <a:r>
+              <a:rPr lang="en-US" dirty="0"/>
+              <a:t>and install Go </a:t>
+            </a:r>
+          </a:p>
+          <a:p>
+            <a:pPr lvl="2"/>
+            <a:r>
+              <a:rPr lang="en-US" dirty="0">
+                <a:hlinkClick r:id="rId2"/>
+              </a:rPr>
+              <a:t>https://golang.org/doc/install?download=go1.5.3.windows-amd64.msi</a:t>
+            </a:r>
+            <a:r>
+              <a:rPr lang="en-US" dirty="0"/>
+              <a:t> </a:t>
+            </a:r>
+          </a:p>
+          <a:p>
+            <a:pPr lvl="1"/>
+            <a:r>
+              <a:rPr lang="en-US" dirty="0"/>
+              <a:t>Install </a:t>
+            </a:r>
+            <a:r>
+              <a:rPr lang="en-US" dirty="0" err="1"/>
+              <a:t>LiteIDE</a:t>
+            </a:r>
+            <a:endParaRPr lang="en-US" dirty="0"/>
+          </a:p>
+          <a:p>
+            <a:pPr lvl="2"/>
+            <a:r>
+              <a:rPr lang="en-US" dirty="0">
+                <a:hlinkClick r:id="rId3"/>
+              </a:rPr>
+              <a:t>http://sourceforge.net/projects/liteide/</a:t>
+            </a:r>
+            <a:r>
+              <a:rPr lang="en-US" dirty="0"/>
+              <a:t> </a:t>
+            </a:r>
+          </a:p>
+          <a:p>
+            <a:endParaRPr lang="en-US" dirty="0"/>
+          </a:p>
+        </p:txBody>
+      </p:sp>
+      <p:sp>
+        <p:nvSpPr>
+          <p:cNvPr id="8" name="object 3"/>
+          <p:cNvSpPr/>
+          <p:nvPr/>
+        </p:nvSpPr>
+        <p:spPr>
+          <a:xfrm>
+            <a:off x="7784598" y="858723"/>
+            <a:ext cx="1048117" cy="1671560"/>
+          </a:xfrm>
+          <a:prstGeom prst="rect">
+            <a:avLst/>
+          </a:prstGeom>
+          <a:blipFill>
+            <a:blip r:embed="rId4" cstate="print"/>
+            <a:stretch>
+              <a:fillRect/>
+            </a:stretch>
+          </a:blipFill>
+        </p:spPr>
+        <p:txBody>
+          <a:bodyPr wrap="square" lIns="0" tIns="0" rIns="0" bIns="0" rtlCol="0"/>
+          <a:lstStyle/>
+          <a:p>
+            <a:endParaRPr/>
+          </a:p>
+        </p:txBody>
+      </p:sp>
+    </p:spTree>
+    <p:extLst>
+      <p:ext uri="{BB962C8B-B14F-4D97-AF65-F5344CB8AC3E}">
+        <p14:creationId xmlns:p14="http://schemas.microsoft.com/office/powerpoint/2010/main" val="3635426264"/>
+      </p:ext>
+    </p:extLst>
+  </p:cSld>
+  <p:clrMapOvr>
+    <a:masterClrMapping/>
+  </p:clrMapOvr>
+  <p:timing>
+    <p:tnLst>
+      <p:par>
+        <p:cTn id="1" dur="indefinite" restart="never" nodeType="tmRoot"/>
+      </p:par>
+    </p:tnLst>
+  </p:timing>
+</p:sld>
+</file>
+
+<file path=ppt/slides/slide20.xml><?xml version="1.0" encoding="utf-8"?>
+<p:sld xmlns:a="http://schemas.openxmlformats.org/drawingml/2006/main" xmlns:r="http://schemas.openxmlformats.org/officeDocument/2006/relationships" xmlns:p="http://schemas.openxmlformats.org/presentationml/2006/main">
+  <p:cSld>
+    <p:spTree>
+      <p:nvGrpSpPr>
+        <p:cNvPr id="1" name=""/>
+        <p:cNvGrpSpPr/>
+        <p:nvPr/>
+      </p:nvGrpSpPr>
+      <p:grpSpPr>
+        <a:xfrm>
+          <a:off x="0" y="0"/>
+          <a:ext cx="0" cy="0"/>
+          <a:chOff x="0" y="0"/>
+          <a:chExt cx="0" cy="0"/>
+        </a:xfrm>
+      </p:grpSpPr>
+      <p:sp>
+        <p:nvSpPr>
+          <p:cNvPr id="2" name="Title 1"/>
+          <p:cNvSpPr>
+            <a:spLocks noGrp="1"/>
+          </p:cNvSpPr>
+          <p:nvPr>
+            <p:ph type="title"/>
+          </p:nvPr>
+        </p:nvSpPr>
+        <p:spPr/>
+        <p:txBody>
+          <a:bodyPr/>
+          <a:lstStyle/>
+          <a:p>
+            <a:r>
+              <a:rPr lang="en-US" dirty="0" smtClean="0"/>
+              <a:t>Methods and Interfaces</a:t>
+            </a:r>
+            <a:endParaRPr lang="en-US" dirty="0"/>
+          </a:p>
+        </p:txBody>
+      </p:sp>
+      <p:sp>
+        <p:nvSpPr>
+          <p:cNvPr id="3" name="Content Placeholder 2"/>
+          <p:cNvSpPr>
+            <a:spLocks noGrp="1"/>
+          </p:cNvSpPr>
+          <p:nvPr>
+            <p:ph idx="1"/>
+          </p:nvPr>
+        </p:nvSpPr>
+        <p:spPr/>
+        <p:txBody>
+          <a:bodyPr>
+            <a:normAutofit fontScale="92500" lnSpcReduction="10000"/>
+          </a:bodyPr>
+          <a:lstStyle/>
+          <a:p>
+            <a:r>
+              <a:rPr lang="en-US" dirty="0"/>
+              <a:t>Go does not have </a:t>
+            </a:r>
+            <a:r>
+              <a:rPr lang="en-US" dirty="0" smtClean="0"/>
+              <a:t>classes</a:t>
+            </a:r>
+          </a:p>
+          <a:p>
+            <a:r>
+              <a:rPr lang="en-US" dirty="0" smtClean="0"/>
+              <a:t>OOP can be achieved by defining </a:t>
+            </a:r>
+            <a:r>
+              <a:rPr lang="en-US" dirty="0"/>
+              <a:t>methods on </a:t>
+            </a:r>
+            <a:r>
+              <a:rPr lang="en-US" dirty="0" smtClean="0"/>
+              <a:t>types</a:t>
+            </a:r>
+            <a:endParaRPr lang="en-US" dirty="0"/>
+          </a:p>
+          <a:p>
+            <a:r>
+              <a:rPr lang="en-US" dirty="0" smtClean="0"/>
+              <a:t>Method are functions </a:t>
+            </a:r>
+            <a:r>
+              <a:rPr lang="en-US" dirty="0"/>
+              <a:t>with </a:t>
+            </a:r>
+            <a:r>
+              <a:rPr lang="en-US" dirty="0" smtClean="0"/>
+              <a:t>special </a:t>
+            </a:r>
+            <a:r>
+              <a:rPr lang="en-US" dirty="0"/>
+              <a:t>receiver </a:t>
+            </a:r>
+            <a:r>
+              <a:rPr lang="en-US" dirty="0" smtClean="0"/>
+              <a:t>argument</a:t>
+            </a:r>
+            <a:endParaRPr lang="en-US" dirty="0"/>
+          </a:p>
+          <a:p>
+            <a:r>
+              <a:rPr lang="en-US" dirty="0" smtClean="0"/>
+              <a:t>Receiver </a:t>
+            </a:r>
+            <a:r>
+              <a:rPr lang="en-US" dirty="0"/>
+              <a:t>appears in its own argument list between the </a:t>
             </a:r>
             <a:r>
               <a:rPr lang="en-US" dirty="0" err="1"/>
@@ -12593,8 +13856,105 @@
             </a:r>
             <a:r>
               <a:rPr lang="en-US" dirty="0"/>
-              <a:t> keyword and the method name.</a:t>
-            </a:r>
+              <a:t> keyword and </a:t>
+            </a:r>
+            <a:r>
+              <a:rPr lang="en-US" dirty="0" smtClean="0"/>
+              <a:t>method name</a:t>
+            </a:r>
+            <a:endParaRPr lang="en-US" dirty="0" smtClean="0"/>
+          </a:p>
+          <a:p>
+            <a:r>
+              <a:rPr lang="en-US" dirty="0" smtClean="0"/>
+              <a:t>Declare </a:t>
+            </a:r>
+            <a:r>
+              <a:rPr lang="en-US" dirty="0"/>
+              <a:t>a method with a receiver whose type is defined in the same package as the </a:t>
+            </a:r>
+            <a:r>
+              <a:rPr lang="en-US" dirty="0" smtClean="0"/>
+              <a:t>method</a:t>
+            </a:r>
+          </a:p>
+          <a:p>
+            <a:r>
+              <a:rPr lang="en-US" dirty="0" smtClean="0"/>
+              <a:t>Method </a:t>
+            </a:r>
+            <a:r>
+              <a:rPr lang="en-US" dirty="0" smtClean="0"/>
+              <a:t>cannot be declared with </a:t>
+            </a:r>
+            <a:r>
+              <a:rPr lang="en-US" dirty="0"/>
+              <a:t>a receiver whose type is defined in another </a:t>
+            </a:r>
+            <a:r>
+              <a:rPr lang="en-US" dirty="0" smtClean="0"/>
+              <a:t>package. This </a:t>
+            </a:r>
+            <a:r>
+              <a:rPr lang="en-US" dirty="0"/>
+              <a:t>includes the built-in types such as </a:t>
+            </a:r>
+            <a:r>
+              <a:rPr lang="en-US" dirty="0" err="1" smtClean="0"/>
+              <a:t>int</a:t>
+            </a:r>
+            <a:endParaRPr lang="en-US" dirty="0"/>
+          </a:p>
+          <a:p>
+            <a:r>
+              <a:rPr lang="en-US" dirty="0" smtClean="0"/>
+              <a:t>An </a:t>
+            </a:r>
+            <a:r>
+              <a:rPr lang="en-US" dirty="0"/>
+              <a:t>interface is </a:t>
+            </a:r>
+            <a:r>
+              <a:rPr lang="en-US" i="1" dirty="0" smtClean="0"/>
+              <a:t>just</a:t>
+            </a:r>
+            <a:r>
+              <a:rPr lang="en-US" dirty="0"/>
+              <a:t> a set of methods</a:t>
+            </a:r>
+          </a:p>
+        </p:txBody>
+      </p:sp>
+      <p:sp>
+        <p:nvSpPr>
+          <p:cNvPr id="4" name="Rectangle 3"/>
+          <p:cNvSpPr/>
+          <p:nvPr/>
+        </p:nvSpPr>
+        <p:spPr>
+          <a:xfrm>
+            <a:off x="457200" y="4696557"/>
+            <a:ext cx="1560042" cy="246221"/>
+          </a:xfrm>
+          <a:prstGeom prst="rect">
+            <a:avLst/>
+          </a:prstGeom>
+        </p:spPr>
+        <p:txBody>
+          <a:bodyPr wrap="none">
+            <a:spAutoFit/>
+          </a:bodyPr>
+          <a:lstStyle/>
+          <a:p>
+            <a:r>
+              <a:rPr lang="en-US" sz="1000" dirty="0" smtClean="0">
+                <a:latin typeface="Calibri" panose="020F0502020204030204" pitchFamily="34" charset="0"/>
+              </a:rPr>
+              <a:t>Source: https://golang.org</a:t>
+            </a:r>
+            <a:endParaRPr lang="en-US" sz="1000" dirty="0">
+              <a:latin typeface="Calibri" panose="020F0502020204030204" pitchFamily="34" charset="0"/>
+            </a:endParaRPr>
           </a:p>
         </p:txBody>
       </p:sp>
@@ -12618,7 +13978,7 @@
 </p:sld>
 </file>
 
-<file path=ppt/slides/slide18.xml><?xml version="1.0" encoding="utf-8"?>
+<file path=ppt/slides/slide21.xml><?xml version="1.0" encoding="utf-8"?>
 <p:sld xmlns:a="http://schemas.openxmlformats.org/drawingml/2006/main" xmlns:r="http://schemas.openxmlformats.org/officeDocument/2006/relationships" xmlns:p="http://schemas.openxmlformats.org/presentationml/2006/main">
   <p:cSld>
     <p:spTree>
@@ -12637,115 +13997,166 @@
       </p:grpSpPr>
       <p:sp>
         <p:nvSpPr>
-          <p:cNvPr id="13" name="Title 12"/>
-          <p:cNvSpPr>
-            <a:spLocks noGrp="1"/>
-          </p:cNvSpPr>
-          <p:nvPr>
-            <p:ph type="ctrTitle"/>
+          <p:cNvPr id="2" name="Title 1"/>
+          <p:cNvSpPr>
+            <a:spLocks noGrp="1"/>
+          </p:cNvSpPr>
+          <p:nvPr>
+            <p:ph type="title"/>
           </p:nvPr>
         </p:nvSpPr>
         <p:spPr/>
         <p:txBody>
+          <a:bodyPr/>
+          <a:lstStyle/>
+          <a:p>
+            <a:r>
+              <a:rPr lang="en-US" dirty="0" smtClean="0"/>
+              <a:t>Interfaces and Error handling</a:t>
+            </a:r>
+            <a:endParaRPr lang="en-US" dirty="0"/>
+          </a:p>
+        </p:txBody>
+      </p:sp>
+      <p:sp>
+        <p:nvSpPr>
+          <p:cNvPr id="3" name="Content Placeholder 2"/>
+          <p:cNvSpPr>
+            <a:spLocks noGrp="1"/>
+          </p:cNvSpPr>
+          <p:nvPr>
+            <p:ph idx="1"/>
+          </p:nvPr>
+        </p:nvSpPr>
+        <p:spPr/>
+        <p:txBody>
           <a:bodyPr>
-            <a:normAutofit fontScale="90000"/>
+            <a:normAutofit/>
           </a:bodyPr>
           <a:lstStyle/>
           <a:p>
+            <a:r>
+              <a:rPr lang="en-US" dirty="0" smtClean="0"/>
+              <a:t>Go </a:t>
+            </a:r>
+            <a:r>
+              <a:rPr lang="en-US" dirty="0"/>
+              <a:t>does not have an exception </a:t>
+            </a:r>
+            <a:r>
+              <a:rPr lang="en-US" dirty="0" smtClean="0"/>
+              <a:t>handling </a:t>
+            </a:r>
+            <a:r>
+              <a:rPr lang="en-US" dirty="0" smtClean="0"/>
+              <a:t>facility </a:t>
+            </a:r>
+          </a:p>
+          <a:p>
+            <a:r>
+              <a:rPr lang="en-US" dirty="0" smtClean="0"/>
+              <a:t>For </a:t>
+            </a:r>
+            <a:r>
+              <a:rPr lang="en-US" dirty="0"/>
+              <a:t>error </a:t>
+            </a:r>
+            <a:r>
+              <a:rPr lang="en-US" dirty="0" smtClean="0"/>
+              <a:t>handling, Go has a </a:t>
+            </a:r>
+            <a:r>
+              <a:rPr lang="en-US" dirty="0"/>
+              <a:t>pre-defined interface type called error that represents a value that has an Error method returning a string:</a:t>
+            </a:r>
+          </a:p>
+          <a:p>
+            <a:pPr marL="457200" lvl="1" indent="0">
+              <a:buNone/>
+            </a:pPr>
+            <a:r>
+              <a:rPr lang="en-US" dirty="0"/>
+              <a:t>type error interface { </a:t>
+            </a:r>
+            <a:endParaRPr lang="en-US" dirty="0" smtClean="0"/>
+          </a:p>
+          <a:p>
+            <a:pPr marL="457200" lvl="1" indent="0">
+              <a:buNone/>
+            </a:pPr>
+            <a:r>
+              <a:rPr lang="en-US" dirty="0" smtClean="0"/>
+              <a:t>	Error</a:t>
+            </a:r>
+            <a:r>
+              <a:rPr lang="en-US" dirty="0"/>
+              <a:t>() string </a:t>
+            </a:r>
+            <a:endParaRPr lang="en-US" dirty="0" smtClean="0"/>
+          </a:p>
+          <a:p>
+            <a:pPr marL="457200" lvl="1" indent="0">
+              <a:buNone/>
+            </a:pPr>
+            <a:r>
+              <a:rPr lang="en-US" dirty="0" smtClean="0"/>
+              <a:t>}</a:t>
+            </a:r>
             <a:endParaRPr lang="en-US" dirty="0"/>
           </a:p>
-        </p:txBody>
-      </p:sp>
-      <p:sp>
-        <p:nvSpPr>
-          <p:cNvPr id="14" name="Text Placeholder 13"/>
-          <p:cNvSpPr>
-            <a:spLocks noGrp="1"/>
-          </p:cNvSpPr>
-          <p:nvPr>
-            <p:ph type="body" sz="quarter" idx="19"/>
-          </p:nvPr>
-        </p:nvSpPr>
-        <p:spPr/>
-        <p:txBody>
-          <a:bodyPr/>
+          <a:p>
+            <a:pPr lvl="1"/>
+            <a:endParaRPr lang="en-US" dirty="0"/>
+          </a:p>
+        </p:txBody>
+      </p:sp>
+      <p:sp>
+        <p:nvSpPr>
+          <p:cNvPr id="4" name="Rectangle 3"/>
+          <p:cNvSpPr/>
+          <p:nvPr/>
+        </p:nvSpPr>
+        <p:spPr>
+          <a:xfrm>
+            <a:off x="457200" y="4696557"/>
+            <a:ext cx="1560042" cy="246221"/>
+          </a:xfrm>
+          <a:prstGeom prst="rect">
+            <a:avLst/>
+          </a:prstGeom>
+        </p:spPr>
+        <p:txBody>
+          <a:bodyPr wrap="none">
+            <a:spAutoFit/>
+          </a:bodyPr>
           <a:lstStyle/>
           <a:p>
             <a:r>
-              <a:rPr lang="en-US" dirty="0" smtClean="0"/>
-              <a:t>Anand Hariharan</a:t>
-            </a:r>
-            <a:endParaRPr lang="en-US" dirty="0"/>
-          </a:p>
-        </p:txBody>
-      </p:sp>
-      <p:sp>
-        <p:nvSpPr>
-          <p:cNvPr id="15" name="Text Placeholder 14"/>
-          <p:cNvSpPr>
-            <a:spLocks noGrp="1"/>
-          </p:cNvSpPr>
-          <p:nvPr>
-            <p:ph type="body" sz="quarter" idx="20"/>
-          </p:nvPr>
-        </p:nvSpPr>
-        <p:spPr/>
-        <p:txBody>
-          <a:bodyPr/>
-          <a:lstStyle/>
-          <a:p>
-            <a:r>
-              <a:rPr lang="en-US" dirty="0" smtClean="0"/>
-              <a:t>anand.hariharan@wipro.com</a:t>
-            </a:r>
-            <a:endParaRPr lang="en-US" dirty="0"/>
-          </a:p>
-        </p:txBody>
-      </p:sp>
-      <p:sp>
-        <p:nvSpPr>
-          <p:cNvPr id="16" name="Text Placeholder 15"/>
-          <p:cNvSpPr>
-            <a:spLocks noGrp="1"/>
-          </p:cNvSpPr>
-          <p:nvPr>
-            <p:ph type="body" sz="quarter" idx="21"/>
-          </p:nvPr>
-        </p:nvSpPr>
-        <p:spPr/>
-        <p:txBody>
-          <a:bodyPr/>
-          <a:lstStyle/>
-          <a:p>
-            <a:r>
-              <a:rPr lang="en-US" dirty="0" smtClean="0"/>
-              <a:t>Practice Head </a:t>
-            </a:r>
-            <a:endParaRPr lang="en-US" dirty="0"/>
+              <a:rPr lang="en-US" sz="1000" dirty="0" smtClean="0">
+                <a:latin typeface="Calibri" panose="020F0502020204030204" pitchFamily="34" charset="0"/>
+              </a:rPr>
+              <a:t>Source: https://golang.org</a:t>
+            </a:r>
+            <a:endParaRPr lang="en-US" sz="1000" dirty="0">
+              <a:latin typeface="Calibri" panose="020F0502020204030204" pitchFamily="34" charset="0"/>
+            </a:endParaRPr>
           </a:p>
         </p:txBody>
       </p:sp>
     </p:spTree>
     <p:extLst>
       <p:ext uri="{BB962C8B-B14F-4D97-AF65-F5344CB8AC3E}">
-        <p14:creationId xmlns:p14="http://schemas.microsoft.com/office/powerpoint/2010/main" val="3733348884"/>
+        <p14:creationId xmlns:p14="http://schemas.microsoft.com/office/powerpoint/2010/main" val="50702135"/>
       </p:ext>
     </p:extLst>
   </p:cSld>
   <p:clrMapOvr>
     <a:masterClrMapping/>
   </p:clrMapOvr>
-  <p:timing>
-    <p:tnLst>
-      <p:par>
-        <p:cTn id="1" dur="indefinite" restart="never" nodeType="tmRoot"/>
-      </p:par>
-    </p:tnLst>
-  </p:timing>
 </p:sld>
 </file>
 
-<file path=ppt/slides/slide2.xml><?xml version="1.0" encoding="utf-8"?>
+<file path=ppt/slides/slide22.xml><?xml version="1.0" encoding="utf-8"?>
 <p:sld xmlns:a="http://schemas.openxmlformats.org/drawingml/2006/main" xmlns:r="http://schemas.openxmlformats.org/officeDocument/2006/relationships" xmlns:p="http://schemas.openxmlformats.org/presentationml/2006/main">
   <p:cSld>
     <p:spTree>
@@ -12764,7 +14175,7 @@
       </p:grpSpPr>
       <p:sp>
         <p:nvSpPr>
-          <p:cNvPr id="6" name="Title 5"/>
+          <p:cNvPr id="2" name="Title 1"/>
           <p:cNvSpPr>
             <a:spLocks noGrp="1"/>
           </p:cNvSpPr>
@@ -12779,7 +14190,7 @@
           <a:p>
             <a:r>
               <a:rPr lang="en-US" dirty="0" smtClean="0"/>
-              <a:t>About Go</a:t>
+              <a:t>Tools</a:t>
             </a:r>
             <a:endParaRPr lang="en-US" dirty="0"/>
           </a:p>
@@ -12787,7 +14198,7 @@
       </p:sp>
       <p:sp>
         <p:nvSpPr>
-          <p:cNvPr id="7" name="Content Placeholder 6"/>
+          <p:cNvPr id="3" name="Content Placeholder 2"/>
           <p:cNvSpPr>
             <a:spLocks noGrp="1"/>
           </p:cNvSpPr>
@@ -12801,141 +14212,192 @@
           <a:lstStyle/>
           <a:p>
             <a:r>
-              <a:rPr lang="en-US" dirty="0" smtClean="0"/>
-              <a:t>Developed by Google</a:t>
+              <a:rPr lang="en-US" dirty="0" err="1" smtClean="0"/>
+              <a:t>gofmt</a:t>
+            </a:r>
+            <a:endParaRPr lang="en-US" dirty="0" smtClean="0"/>
+          </a:p>
+          <a:p>
+            <a:pPr lvl="1"/>
+            <a:r>
+              <a:rPr lang="en-US" dirty="0" smtClean="0"/>
+              <a:t>A formatter for Go code</a:t>
+            </a:r>
+          </a:p>
+          <a:p>
+            <a:r>
+              <a:rPr lang="en-US" dirty="0" err="1" smtClean="0"/>
+              <a:t>gofix</a:t>
+            </a:r>
+            <a:endParaRPr lang="en-US" dirty="0" smtClean="0"/>
+          </a:p>
+          <a:p>
+            <a:pPr lvl="1"/>
+            <a:r>
+              <a:rPr lang="en-US" dirty="0" smtClean="0"/>
+              <a:t>Helps in code updates/refactoring (e.g. update of APIs)</a:t>
             </a:r>
             <a:endParaRPr lang="en-US" dirty="0"/>
           </a:p>
-          <a:p>
-            <a:pPr lvl="1"/>
-            <a:r>
-              <a:rPr lang="en-US" dirty="0"/>
-              <a:t>By Robert </a:t>
-            </a:r>
-            <a:r>
-              <a:rPr lang="en-US" dirty="0" err="1"/>
-              <a:t>Griesemer</a:t>
-            </a:r>
-            <a:r>
-              <a:rPr lang="en-US" dirty="0"/>
-              <a:t>, Rob Pike &amp; Ken Thompson</a:t>
-            </a:r>
-          </a:p>
-          <a:p>
-            <a:pPr lvl="1"/>
-            <a:r>
-              <a:rPr lang="en-US" dirty="0"/>
-              <a:t>Started in 2007</a:t>
-            </a:r>
-          </a:p>
-          <a:p>
-            <a:pPr lvl="1"/>
-            <a:r>
-              <a:rPr lang="en-US" dirty="0"/>
-              <a:t>Current Version </a:t>
-            </a:r>
-            <a:r>
-              <a:rPr lang="en-US" dirty="0" smtClean="0"/>
-              <a:t>1.5.3, </a:t>
-            </a:r>
-            <a:r>
-              <a:rPr lang="en-US" dirty="0"/>
-              <a:t>still being actively developed</a:t>
-            </a:r>
-          </a:p>
-          <a:p>
-            <a:r>
-              <a:rPr lang="en-US" dirty="0" smtClean="0"/>
-              <a:t>Getting started</a:t>
-            </a:r>
-          </a:p>
-          <a:p>
-            <a:pPr lvl="1"/>
-            <a:r>
-              <a:rPr lang="en-US" dirty="0" smtClean="0"/>
-              <a:t>Download </a:t>
-            </a:r>
-            <a:r>
-              <a:rPr lang="en-US" dirty="0"/>
-              <a:t>and install Go </a:t>
-            </a:r>
-          </a:p>
-          <a:p>
-            <a:pPr lvl="2"/>
-            <a:r>
-              <a:rPr lang="en-US" dirty="0">
-                <a:hlinkClick r:id="rId2"/>
-              </a:rPr>
-              <a:t>https://golang.org/doc/install?download=go1.5.3.windows-amd64.msi</a:t>
-            </a:r>
-            <a:r>
-              <a:rPr lang="en-US" dirty="0"/>
-              <a:t> </a:t>
-            </a:r>
-          </a:p>
-          <a:p>
-            <a:pPr lvl="1"/>
-            <a:r>
-              <a:rPr lang="en-US" dirty="0"/>
-              <a:t>Install </a:t>
-            </a:r>
-            <a:r>
-              <a:rPr lang="en-US" dirty="0" err="1"/>
-              <a:t>LiteIDE</a:t>
-            </a:r>
-            <a:endParaRPr lang="en-US" dirty="0"/>
-          </a:p>
-          <a:p>
-            <a:pPr lvl="2"/>
-            <a:r>
-              <a:rPr lang="en-US" dirty="0">
-                <a:hlinkClick r:id="rId3"/>
-              </a:rPr>
-              <a:t>http://sourceforge.net/projects/liteide/</a:t>
-            </a:r>
-            <a:r>
-              <a:rPr lang="en-US" dirty="0"/>
-              <a:t> </a:t>
-            </a:r>
-          </a:p>
-          <a:p>
-            <a:endParaRPr lang="en-US" dirty="0"/>
-          </a:p>
-        </p:txBody>
-      </p:sp>
-      <p:sp>
-        <p:nvSpPr>
-          <p:cNvPr id="8" name="object 3"/>
+        </p:txBody>
+      </p:sp>
+      <p:sp>
+        <p:nvSpPr>
+          <p:cNvPr id="4" name="Rectangle 3"/>
           <p:cNvSpPr/>
           <p:nvPr/>
         </p:nvSpPr>
         <p:spPr>
           <a:xfrm>
-            <a:off x="7638683" y="934949"/>
-            <a:ext cx="1048117" cy="1671560"/>
+            <a:off x="457200" y="4696557"/>
+            <a:ext cx="1560042" cy="246221"/>
           </a:xfrm>
           <a:prstGeom prst="rect">
             <a:avLst/>
           </a:prstGeom>
-          <a:blipFill>
-            <a:blip r:embed="rId4" cstate="print"/>
-            <a:stretch>
-              <a:fillRect/>
-            </a:stretch>
-          </a:blipFill>
-        </p:spPr>
-        <p:txBody>
-          <a:bodyPr wrap="square" lIns="0" tIns="0" rIns="0" bIns="0" rtlCol="0"/>
+        </p:spPr>
+        <p:txBody>
+          <a:bodyPr wrap="none">
+            <a:spAutoFit/>
+          </a:bodyPr>
           <a:lstStyle/>
           <a:p>
-            <a:endParaRPr/>
+            <a:r>
+              <a:rPr lang="en-US" sz="1000" dirty="0" smtClean="0">
+                <a:latin typeface="Calibri" panose="020F0502020204030204" pitchFamily="34" charset="0"/>
+              </a:rPr>
+              <a:t>Source: https://golang.org</a:t>
+            </a:r>
+            <a:endParaRPr lang="en-US" sz="1000" dirty="0">
+              <a:latin typeface="Calibri" panose="020F0502020204030204" pitchFamily="34" charset="0"/>
+            </a:endParaRPr>
           </a:p>
         </p:txBody>
       </p:sp>
     </p:spTree>
     <p:extLst>
       <p:ext uri="{BB962C8B-B14F-4D97-AF65-F5344CB8AC3E}">
-        <p14:creationId xmlns:p14="http://schemas.microsoft.com/office/powerpoint/2010/main" val="3635426264"/>
+        <p14:creationId xmlns:p14="http://schemas.microsoft.com/office/powerpoint/2010/main" val="1672576236"/>
+      </p:ext>
+    </p:extLst>
+  </p:cSld>
+  <p:clrMapOvr>
+    <a:masterClrMapping/>
+  </p:clrMapOvr>
+</p:sld>
+</file>
+
+<file path=ppt/slides/slide23.xml><?xml version="1.0" encoding="utf-8"?>
+<p:sld xmlns:a="http://schemas.openxmlformats.org/drawingml/2006/main" xmlns:r="http://schemas.openxmlformats.org/officeDocument/2006/relationships" xmlns:p="http://schemas.openxmlformats.org/presentationml/2006/main">
+  <p:cSld>
+    <p:spTree>
+      <p:nvGrpSpPr>
+        <p:cNvPr id="1" name=""/>
+        <p:cNvGrpSpPr/>
+        <p:nvPr/>
+      </p:nvGrpSpPr>
+      <p:grpSpPr>
+        <a:xfrm>
+          <a:off x="0" y="0"/>
+          <a:ext cx="0" cy="0"/>
+          <a:chOff x="0" y="0"/>
+          <a:chExt cx="0" cy="0"/>
+        </a:xfrm>
+      </p:grpSpPr>
+      <p:sp>
+        <p:nvSpPr>
+          <p:cNvPr id="13" name="Title 12"/>
+          <p:cNvSpPr>
+            <a:spLocks noGrp="1"/>
+          </p:cNvSpPr>
+          <p:nvPr>
+            <p:ph type="ctrTitle"/>
+          </p:nvPr>
+        </p:nvSpPr>
+        <p:spPr/>
+        <p:txBody>
+          <a:bodyPr>
+            <a:normAutofit fontScale="90000"/>
+          </a:bodyPr>
+          <a:lstStyle/>
+          <a:p>
+            <a:endParaRPr lang="en-US" dirty="0"/>
+          </a:p>
+        </p:txBody>
+      </p:sp>
+      <p:sp>
+        <p:nvSpPr>
+          <p:cNvPr id="14" name="Text Placeholder 13"/>
+          <p:cNvSpPr>
+            <a:spLocks noGrp="1"/>
+          </p:cNvSpPr>
+          <p:nvPr>
+            <p:ph type="body" sz="quarter" idx="19"/>
+          </p:nvPr>
+        </p:nvSpPr>
+        <p:spPr/>
+        <p:txBody>
+          <a:bodyPr/>
+          <a:lstStyle/>
+          <a:p>
+            <a:r>
+              <a:rPr lang="en-US" dirty="0" smtClean="0"/>
+              <a:t>Anand Hariharan</a:t>
+            </a:r>
+            <a:endParaRPr lang="en-US" dirty="0"/>
+          </a:p>
+        </p:txBody>
+      </p:sp>
+      <p:sp>
+        <p:nvSpPr>
+          <p:cNvPr id="15" name="Text Placeholder 14"/>
+          <p:cNvSpPr>
+            <a:spLocks noGrp="1"/>
+          </p:cNvSpPr>
+          <p:nvPr>
+            <p:ph type="body" sz="quarter" idx="20"/>
+          </p:nvPr>
+        </p:nvSpPr>
+        <p:spPr/>
+        <p:txBody>
+          <a:bodyPr/>
+          <a:lstStyle/>
+          <a:p>
+            <a:r>
+              <a:rPr lang="en-US" dirty="0" smtClean="0"/>
+              <a:t>anand.hariharan@wipro.com</a:t>
+            </a:r>
+            <a:endParaRPr lang="en-US" dirty="0"/>
+          </a:p>
+        </p:txBody>
+      </p:sp>
+      <p:sp>
+        <p:nvSpPr>
+          <p:cNvPr id="16" name="Text Placeholder 15"/>
+          <p:cNvSpPr>
+            <a:spLocks noGrp="1"/>
+          </p:cNvSpPr>
+          <p:nvPr>
+            <p:ph type="body" sz="quarter" idx="21"/>
+          </p:nvPr>
+        </p:nvSpPr>
+        <p:spPr/>
+        <p:txBody>
+          <a:bodyPr/>
+          <a:lstStyle/>
+          <a:p>
+            <a:r>
+              <a:rPr lang="en-US" dirty="0" smtClean="0"/>
+              <a:t>Practice Head </a:t>
+            </a:r>
+            <a:endParaRPr lang="en-US" dirty="0"/>
+          </a:p>
+        </p:txBody>
+      </p:sp>
+    </p:spTree>
+    <p:extLst>
+      <p:ext uri="{BB962C8B-B14F-4D97-AF65-F5344CB8AC3E}">
+        <p14:creationId xmlns:p14="http://schemas.microsoft.com/office/powerpoint/2010/main" val="3733348884"/>
       </p:ext>
     </p:extLst>
   </p:cSld>
@@ -12996,14 +14458,22 @@
             <a:pPr marL="9525"/>
             <a:r>
               <a:rPr spc="-4" dirty="0"/>
-              <a:t>Why Go!</a:t>
-            </a:r>
-          </a:p>
-        </p:txBody>
-      </p:sp>
-      <p:sp>
-        <p:nvSpPr>
-          <p:cNvPr id="6" name="Content Placeholder 5"/>
+              <a:t>Who use</a:t>
+            </a:r>
+            <a:r>
+              <a:rPr lang="en-US" spc="-4" dirty="0"/>
+              <a:t>s</a:t>
+            </a:r>
+            <a:r>
+              <a:rPr spc="-4" dirty="0"/>
+              <a:t> Go?</a:t>
+            </a:r>
+          </a:p>
+        </p:txBody>
+      </p:sp>
+      <p:sp>
+        <p:nvSpPr>
+          <p:cNvPr id="4" name="Content Placeholder 3"/>
           <p:cNvSpPr>
             <a:spLocks noGrp="1"/>
           </p:cNvSpPr>
@@ -13013,58 +14483,53 @@
         </p:nvSpPr>
         <p:spPr/>
         <p:txBody>
-          <a:bodyPr/>
+          <a:bodyPr>
+            <a:normAutofit/>
+          </a:bodyPr>
           <a:lstStyle/>
           <a:p>
             <a:r>
               <a:rPr lang="en-US" dirty="0"/>
-              <a:t>Almost as fast as C</a:t>
-            </a:r>
+              <a:t>Google, of course</a:t>
+            </a:r>
+          </a:p>
+          <a:p>
+            <a:r>
+              <a:rPr lang="en-US" dirty="0" smtClean="0"/>
+              <a:t>Dropbox</a:t>
+            </a:r>
+            <a:endParaRPr lang="en-US" dirty="0"/>
+          </a:p>
+          <a:p>
+            <a:r>
+              <a:rPr lang="en-US" dirty="0" smtClean="0"/>
+              <a:t>Tumblr</a:t>
+            </a:r>
+            <a:endParaRPr lang="en-US" dirty="0"/>
+          </a:p>
+          <a:p>
+            <a:r>
+              <a:rPr lang="en-US" dirty="0" smtClean="0"/>
+              <a:t>Docker</a:t>
+            </a:r>
+            <a:endParaRPr lang="en-US" dirty="0"/>
           </a:p>
           <a:p>
             <a:r>
               <a:rPr lang="en-US" dirty="0"/>
-              <a:t>Faster than C in some cases</a:t>
-            </a:r>
-          </a:p>
-          <a:p>
+              <a:t>Check below link for comprehensive list for all companies who uses Go</a:t>
+            </a:r>
+            <a:r>
+              <a:rPr lang="en-US" dirty="0" smtClean="0"/>
+              <a:t>! https</a:t>
+            </a:r>
             <a:r>
               <a:rPr lang="en-US" dirty="0"/>
-              <a:t>A small language</a:t>
-            </a:r>
-          </a:p>
-          <a:p>
-            <a:r>
-              <a:rPr lang="en-US" dirty="0"/>
-              <a:t>Statically-typed</a:t>
-            </a:r>
-          </a:p>
-          <a:p>
-            <a:r>
-              <a:rPr lang="en-US" dirty="0"/>
-              <a:t>Garbage Collected</a:t>
-            </a:r>
-          </a:p>
-          <a:p>
-            <a:r>
-              <a:rPr lang="en-US" dirty="0"/>
-              <a:t>Easy to write/learn</a:t>
-            </a:r>
-          </a:p>
-          <a:p>
-            <a:r>
-              <a:rPr lang="en-US" dirty="0"/>
-              <a:t>Less compile time</a:t>
-            </a:r>
-          </a:p>
-          <a:p>
-            <a:r>
-              <a:rPr lang="en-US" dirty="0"/>
-              <a:t>Easy to </a:t>
-            </a:r>
-            <a:r>
-              <a:rPr lang="en-US" dirty="0" smtClean="0"/>
-              <a:t>test</a:t>
+              <a:t>://</a:t>
+            </a:r>
+            <a:r>
+              <a:rPr lang="en-US" dirty="0" smtClean="0"/>
+              <a:t>github.com/golang/go/wiki/GoUsers</a:t>
             </a:r>
             <a:endParaRPr lang="en-US" dirty="0"/>
           </a:p>
@@ -13073,7 +14538,7 @@
     </p:spTree>
     <p:extLst>
       <p:ext uri="{BB962C8B-B14F-4D97-AF65-F5344CB8AC3E}">
-        <p14:creationId xmlns:p14="http://schemas.microsoft.com/office/powerpoint/2010/main" val="699024623"/>
+        <p14:creationId xmlns:p14="http://schemas.microsoft.com/office/powerpoint/2010/main" val="2416215056"/>
       </p:ext>
     </p:extLst>
   </p:cSld>
@@ -13109,22 +14574,24 @@
       </p:grpSpPr>
       <p:sp>
         <p:nvSpPr>
-          <p:cNvPr id="4" name="Title 3"/>
-          <p:cNvSpPr>
-            <a:spLocks noGrp="1"/>
-          </p:cNvSpPr>
-          <p:nvPr>
-            <p:ph type="title"/>
+          <p:cNvPr id="4" name="Text Placeholder 3"/>
+          <p:cNvSpPr>
+            <a:spLocks noGrp="1"/>
+          </p:cNvSpPr>
+          <p:nvPr>
+            <p:ph type="body" sz="quarter" idx="11"/>
           </p:nvPr>
         </p:nvSpPr>
         <p:spPr/>
         <p:txBody>
-          <a:bodyPr/>
+          <a:bodyPr>
+            <a:normAutofit fontScale="92500" lnSpcReduction="20000"/>
+          </a:bodyPr>
           <a:lstStyle/>
           <a:p>
             <a:r>
               <a:rPr lang="en-US" dirty="0" smtClean="0"/>
-              <a:t>Go and Java</a:t>
+              <a:t>Key concepts</a:t>
             </a:r>
             <a:endParaRPr lang="en-US" dirty="0"/>
           </a:p>
@@ -13132,83 +14599,35 @@
       </p:sp>
       <p:sp>
         <p:nvSpPr>
-          <p:cNvPr id="2" name="Content Placeholder 1"/>
-          <p:cNvSpPr>
-            <a:spLocks noGrp="1"/>
-          </p:cNvSpPr>
-          <p:nvPr>
-            <p:ph idx="1"/>
+          <p:cNvPr id="5" name="Text Placeholder 4"/>
+          <p:cNvSpPr>
+            <a:spLocks noGrp="1"/>
+          </p:cNvSpPr>
+          <p:nvPr>
+            <p:ph type="body" sz="quarter" idx="12"/>
           </p:nvPr>
         </p:nvSpPr>
         <p:spPr/>
         <p:txBody>
-          <a:bodyPr/>
+          <a:bodyPr>
+            <a:normAutofit lnSpcReduction="10000"/>
+          </a:bodyPr>
           <a:lstStyle/>
           <a:p>
-            <a:r>
-              <a:rPr lang="en-US" dirty="0"/>
-              <a:t>Go compiles code to binaries</a:t>
-            </a:r>
-          </a:p>
-          <a:p>
-            <a:r>
-              <a:rPr lang="en-US" dirty="0"/>
-              <a:t>No Runtime is required so faster than JAVA</a:t>
-            </a:r>
-          </a:p>
-          <a:p>
-            <a:r>
-              <a:rPr lang="en-US" dirty="0"/>
-              <a:t>Deployment is easier since all dependencies are checked during compile time and only single binary gets generated.</a:t>
-            </a:r>
-          </a:p>
-          <a:p>
-            <a:r>
-              <a:rPr lang="en-US" dirty="0"/>
-              <a:t>Most of the common tools are inbuilt in the language like go get, go test, http package </a:t>
-            </a:r>
-            <a:r>
-              <a:rPr lang="en-US" dirty="0" err="1"/>
-              <a:t>etc</a:t>
-            </a:r>
-            <a:endParaRPr lang="en-US" dirty="0"/>
-          </a:p>
-          <a:p>
-            <a:r>
-              <a:rPr lang="en-US" dirty="0"/>
-              <a:t>Go is statically typed but it feels more like dynamic language</a:t>
-            </a:r>
-          </a:p>
-          <a:p>
-            <a:r>
-              <a:rPr lang="en-US" dirty="0"/>
-              <a:t>Concurrency easy </a:t>
-            </a:r>
-            <a:r>
-              <a:rPr lang="en-US" dirty="0" smtClean="0"/>
-              <a:t>implementation</a:t>
-            </a:r>
-            <a:endParaRPr lang="en-US" dirty="0"/>
+            <a:endParaRPr lang="en-US"/>
           </a:p>
         </p:txBody>
       </p:sp>
     </p:spTree>
     <p:extLst>
       <p:ext uri="{BB962C8B-B14F-4D97-AF65-F5344CB8AC3E}">
-        <p14:creationId xmlns:p14="http://schemas.microsoft.com/office/powerpoint/2010/main" val="450226875"/>
+        <p14:creationId xmlns:p14="http://schemas.microsoft.com/office/powerpoint/2010/main" val="1991604787"/>
       </p:ext>
     </p:extLst>
   </p:cSld>
   <p:clrMapOvr>
     <a:masterClrMapping/>
   </p:clrMapOvr>
-  <p:timing>
-    <p:tnLst>
-      <p:par>
-        <p:cTn id="1" dur="indefinite" restart="never" nodeType="tmRoot"/>
-      </p:par>
-    </p:tnLst>
-  </p:timing>
 </p:sld>
 </file>
 
@@ -13231,135 +14650,177 @@
       </p:grpSpPr>
       <p:sp>
         <p:nvSpPr>
-          <p:cNvPr id="2" name="object 2"/>
-          <p:cNvSpPr txBox="1">
+          <p:cNvPr id="2" name="Title 1"/>
+          <p:cNvSpPr>
             <a:spLocks noGrp="1"/>
           </p:cNvSpPr>
           <p:nvPr>
             <p:ph type="title"/>
           </p:nvPr>
         </p:nvSpPr>
+        <p:spPr/>
+        <p:txBody>
+          <a:bodyPr/>
+          <a:lstStyle/>
+          <a:p>
+            <a:r>
+              <a:rPr lang="en-US" dirty="0" smtClean="0"/>
+              <a:t>Concurrency</a:t>
+            </a:r>
+            <a:endParaRPr lang="en-US" dirty="0"/>
+          </a:p>
+        </p:txBody>
+      </p:sp>
+      <p:sp>
+        <p:nvSpPr>
+          <p:cNvPr id="3" name="Content Placeholder 2"/>
+          <p:cNvSpPr>
+            <a:spLocks noGrp="1"/>
+          </p:cNvSpPr>
+          <p:nvPr>
+            <p:ph idx="1"/>
+          </p:nvPr>
+        </p:nvSpPr>
+        <p:spPr/>
+        <p:txBody>
+          <a:bodyPr/>
+          <a:lstStyle/>
+          <a:p>
+            <a:r>
+              <a:rPr lang="en-US" dirty="0" smtClean="0"/>
+              <a:t>Program structuring </a:t>
+            </a:r>
+            <a:r>
+              <a:rPr lang="en-US" dirty="0"/>
+              <a:t>technique </a:t>
+            </a:r>
+            <a:r>
+              <a:rPr lang="en-US" dirty="0" smtClean="0"/>
+              <a:t>with </a:t>
+            </a:r>
+            <a:r>
+              <a:rPr lang="en-US" dirty="0"/>
+              <a:t>multiple threads of </a:t>
+            </a:r>
+            <a:r>
+              <a:rPr lang="en-US" dirty="0" smtClean="0"/>
+              <a:t>control</a:t>
+            </a:r>
+          </a:p>
+          <a:p>
+            <a:r>
+              <a:rPr lang="en-US" dirty="0"/>
+              <a:t>Concurrency allows </a:t>
+            </a:r>
+            <a:r>
+              <a:rPr lang="en-US" dirty="0" smtClean="0"/>
+              <a:t>programs </a:t>
+            </a:r>
+            <a:r>
+              <a:rPr lang="en-US" dirty="0"/>
+              <a:t>to be </a:t>
+            </a:r>
+            <a:r>
+              <a:rPr lang="en-US" dirty="0" smtClean="0"/>
+              <a:t>modular</a:t>
+            </a:r>
+          </a:p>
+          <a:p>
+            <a:r>
+              <a:rPr lang="en-US" dirty="0" smtClean="0"/>
+              <a:t>Example: Threads </a:t>
+            </a:r>
+            <a:r>
+              <a:rPr lang="en-US" dirty="0"/>
+              <a:t>that interacts with </a:t>
+            </a:r>
+            <a:r>
+              <a:rPr lang="en-US" dirty="0" smtClean="0"/>
+              <a:t>users could be </a:t>
+            </a:r>
+            <a:r>
+              <a:rPr lang="en-US" dirty="0"/>
+              <a:t>distinct from </a:t>
+            </a:r>
+            <a:r>
+              <a:rPr lang="en-US" dirty="0" smtClean="0"/>
+              <a:t>threads </a:t>
+            </a:r>
+            <a:r>
+              <a:rPr lang="en-US" dirty="0"/>
+              <a:t>that talks to the database.</a:t>
+            </a:r>
+          </a:p>
+          <a:p>
+            <a:r>
+              <a:rPr lang="en-US" dirty="0" smtClean="0"/>
+              <a:t>Difference with parallelism : </a:t>
+            </a:r>
+            <a:r>
+              <a:rPr lang="en-US" dirty="0" smtClean="0"/>
+              <a:t>Parallel programs use multiplicity </a:t>
+            </a:r>
+            <a:r>
+              <a:rPr lang="en-US" dirty="0"/>
+              <a:t>of computational hardware (e.g. multiple processor cores) in order to perform computation </a:t>
+            </a:r>
+            <a:r>
+              <a:rPr lang="en-US" dirty="0" smtClean="0"/>
+              <a:t>faster </a:t>
+            </a:r>
+            <a:endParaRPr lang="en-US" dirty="0" smtClean="0"/>
+          </a:p>
+          <a:p>
+            <a:endParaRPr lang="en-US" dirty="0"/>
+          </a:p>
+        </p:txBody>
+      </p:sp>
+      <p:sp>
+        <p:nvSpPr>
+          <p:cNvPr id="4" name="Rectangle 3"/>
+          <p:cNvSpPr/>
+          <p:nvPr/>
+        </p:nvSpPr>
         <p:spPr>
+          <a:xfrm>
+            <a:off x="603115" y="4519863"/>
+            <a:ext cx="5243208" cy="200055"/>
+          </a:xfrm>
           <a:prstGeom prst="rect">
             <a:avLst/>
           </a:prstGeom>
         </p:spPr>
         <p:txBody>
-          <a:bodyPr vert="horz" wrap="square" lIns="0" tIns="0" rIns="0" bIns="0" numCol="1" rtlCol="0" anchor="ctr" anchorCtr="0" compatLnSpc="1">
-            <a:prstTxWarp prst="textNoShape">
-              <a:avLst/>
-            </a:prstTxWarp>
+          <a:bodyPr wrap="square">
             <a:spAutoFit/>
           </a:bodyPr>
           <a:lstStyle/>
           <a:p>
-            <a:pPr marL="9525"/>
-            <a:r>
-              <a:rPr spc="-4" dirty="0"/>
-              <a:t>Who use</a:t>
-            </a:r>
-            <a:r>
-              <a:rPr lang="en-US" spc="-4" dirty="0"/>
-              <a:t>s</a:t>
-            </a:r>
-            <a:r>
-              <a:rPr spc="-4" dirty="0"/>
-              <a:t> Go?</a:t>
-            </a:r>
-          </a:p>
-        </p:txBody>
-      </p:sp>
-      <p:sp>
-        <p:nvSpPr>
-          <p:cNvPr id="4" name="Content Placeholder 3"/>
-          <p:cNvSpPr>
-            <a:spLocks noGrp="1"/>
-          </p:cNvSpPr>
-          <p:nvPr>
-            <p:ph idx="1"/>
-          </p:nvPr>
-        </p:nvSpPr>
-        <p:spPr/>
-        <p:txBody>
-          <a:bodyPr>
-            <a:normAutofit/>
-          </a:bodyPr>
-          <a:lstStyle/>
-          <a:p>
-            <a:r>
-              <a:rPr lang="en-US" dirty="0"/>
-              <a:t>Google, of course</a:t>
-            </a:r>
-          </a:p>
-          <a:p>
-            <a:r>
-              <a:rPr lang="en-US" dirty="0"/>
-              <a:t>Dropbox</a:t>
-            </a:r>
-          </a:p>
-          <a:p>
-            <a:r>
-              <a:rPr lang="en-US" dirty="0" err="1"/>
-              <a:t>Exotel</a:t>
-            </a:r>
-            <a:endParaRPr lang="en-US" dirty="0"/>
-          </a:p>
-          <a:p>
-            <a:r>
-              <a:rPr lang="en-US" dirty="0"/>
-              <a:t>Tumblr</a:t>
-            </a:r>
-          </a:p>
-          <a:p>
-            <a:r>
-              <a:rPr lang="en-US" dirty="0"/>
-              <a:t>Parse (Acquired by Facebook)</a:t>
-            </a:r>
-          </a:p>
-          <a:p>
-            <a:r>
-              <a:rPr lang="en-US" dirty="0"/>
-              <a:t>Docker</a:t>
-            </a:r>
-          </a:p>
-          <a:p>
-            <a:r>
-              <a:rPr lang="en-US" dirty="0"/>
-              <a:t>Check below link for comprehensive list for all companies who uses Go</a:t>
-            </a:r>
-            <a:r>
-              <a:rPr lang="en-US" dirty="0" smtClean="0"/>
-              <a:t>! https</a:t>
-            </a:r>
-            <a:r>
-              <a:rPr lang="en-US" dirty="0"/>
-              <a:t>://</a:t>
-            </a:r>
-            <a:r>
-              <a:rPr lang="en-US" dirty="0" smtClean="0"/>
-              <a:t>github.com/golang/go/wiki/GoUsers</a:t>
-            </a:r>
-            <a:endParaRPr lang="en-US" dirty="0"/>
+            <a:r>
+              <a:rPr lang="en-US" sz="700" dirty="0" smtClean="0">
+                <a:latin typeface="Calibri" panose="020F0502020204030204" pitchFamily="34" charset="0"/>
+              </a:rPr>
+              <a:t>Source: http</a:t>
+            </a:r>
+            <a:r>
+              <a:rPr lang="en-US" sz="700" dirty="0">
+                <a:latin typeface="Calibri" panose="020F0502020204030204" pitchFamily="34" charset="0"/>
+              </a:rPr>
+              <a:t>://cs.stackexchange.com/questions/19987/difference-between-parallel-and-concurrent-programming</a:t>
+            </a:r>
           </a:p>
         </p:txBody>
       </p:sp>
     </p:spTree>
     <p:extLst>
       <p:ext uri="{BB962C8B-B14F-4D97-AF65-F5344CB8AC3E}">
-        <p14:creationId xmlns:p14="http://schemas.microsoft.com/office/powerpoint/2010/main" val="1508284884"/>
+        <p14:creationId xmlns:p14="http://schemas.microsoft.com/office/powerpoint/2010/main" val="1304896182"/>
       </p:ext>
     </p:extLst>
   </p:cSld>
   <p:clrMapOvr>
     <a:masterClrMapping/>
   </p:clrMapOvr>
-  <p:timing>
-    <p:tnLst>
-      <p:par>
-        <p:cTn id="1" dur="indefinite" restart="never" nodeType="tmRoot"/>
-      </p:par>
-    </p:tnLst>
-  </p:timing>
 </p:sld>
 </file>
 
@@ -13382,54 +14843,185 @@
       </p:grpSpPr>
       <p:sp>
         <p:nvSpPr>
-          <p:cNvPr id="4" name="Text Placeholder 3"/>
-          <p:cNvSpPr>
-            <a:spLocks noGrp="1"/>
-          </p:cNvSpPr>
-          <p:nvPr>
-            <p:ph type="body" sz="quarter" idx="11"/>
+          <p:cNvPr id="2" name="Title 1"/>
+          <p:cNvSpPr>
+            <a:spLocks noGrp="1"/>
+          </p:cNvSpPr>
+          <p:nvPr>
+            <p:ph type="title"/>
           </p:nvPr>
         </p:nvSpPr>
         <p:spPr/>
         <p:txBody>
-          <a:bodyPr>
-            <a:normAutofit fontScale="92500" lnSpcReduction="20000"/>
+          <a:bodyPr/>
+          <a:lstStyle/>
+          <a:p>
+            <a:r>
+              <a:rPr lang="en-US" dirty="0" smtClean="0"/>
+              <a:t>Garbage collection</a:t>
+            </a:r>
+            <a:endParaRPr lang="en-US" dirty="0"/>
+          </a:p>
+        </p:txBody>
+      </p:sp>
+      <p:sp>
+        <p:nvSpPr>
+          <p:cNvPr id="3" name="Content Placeholder 2"/>
+          <p:cNvSpPr>
+            <a:spLocks noGrp="1"/>
+          </p:cNvSpPr>
+          <p:nvPr>
+            <p:ph idx="1"/>
+          </p:nvPr>
+        </p:nvSpPr>
+        <p:spPr/>
+        <p:txBody>
+          <a:bodyPr/>
+          <a:lstStyle/>
+          <a:p>
+            <a:r>
+              <a:rPr lang="en-US" dirty="0" smtClean="0"/>
+              <a:t>Systematic </a:t>
+            </a:r>
+            <a:r>
+              <a:rPr lang="en-US" dirty="0"/>
+              <a:t>recovery of pooled </a:t>
+            </a:r>
+            <a:r>
+              <a:rPr lang="en-US" dirty="0" smtClean="0"/>
+              <a:t>computer storage resources</a:t>
+            </a:r>
+            <a:r>
+              <a:rPr lang="en-US" dirty="0"/>
+              <a:t> </a:t>
+            </a:r>
+            <a:r>
+              <a:rPr lang="en-US" dirty="0" smtClean="0"/>
+              <a:t>that </a:t>
+            </a:r>
+            <a:r>
+              <a:rPr lang="en-US" dirty="0"/>
+              <a:t>is being used by a program </a:t>
+            </a:r>
+            <a:r>
+              <a:rPr lang="en-US" dirty="0" smtClean="0"/>
+              <a:t>when it is no longer needed</a:t>
+            </a:r>
+            <a:endParaRPr lang="en-US" dirty="0" smtClean="0"/>
+          </a:p>
+          <a:p>
+            <a:endParaRPr lang="en-US" dirty="0"/>
+          </a:p>
+          <a:p>
+            <a:r>
+              <a:rPr lang="en-US" dirty="0" smtClean="0"/>
+              <a:t>Key </a:t>
+            </a:r>
+            <a:r>
+              <a:rPr lang="en-US" dirty="0" smtClean="0"/>
+              <a:t>principles </a:t>
+            </a:r>
+            <a:r>
+              <a:rPr lang="en-US" dirty="0" smtClean="0"/>
+              <a:t>of garbage </a:t>
+            </a:r>
+            <a:r>
+              <a:rPr lang="en-US" dirty="0" smtClean="0"/>
+              <a:t>collection </a:t>
+            </a:r>
+          </a:p>
+          <a:p>
+            <a:pPr lvl="1"/>
+            <a:r>
+              <a:rPr lang="en-US" dirty="0" smtClean="0"/>
+              <a:t>Unused </a:t>
+            </a:r>
+            <a:r>
+              <a:rPr lang="en-US" dirty="0"/>
+              <a:t>memory should be </a:t>
+            </a:r>
+            <a:r>
+              <a:rPr lang="en-US" dirty="0" smtClean="0"/>
+              <a:t>freed </a:t>
+            </a:r>
+          </a:p>
+          <a:p>
+            <a:pPr lvl="1"/>
+            <a:r>
+              <a:rPr lang="en-US" dirty="0" smtClean="0"/>
+              <a:t>No </a:t>
+            </a:r>
+            <a:r>
+              <a:rPr lang="en-US" dirty="0"/>
+              <a:t>memory should be freed unless the program will not use it </a:t>
+            </a:r>
+            <a:r>
+              <a:rPr lang="en-US" dirty="0" smtClean="0"/>
+              <a:t>anymore</a:t>
+            </a:r>
+            <a:endParaRPr lang="en-US" dirty="0"/>
+          </a:p>
+        </p:txBody>
+      </p:sp>
+      <p:sp>
+        <p:nvSpPr>
+          <p:cNvPr id="4" name="TextBox 3"/>
+          <p:cNvSpPr txBox="1"/>
+          <p:nvPr/>
+        </p:nvSpPr>
+        <p:spPr>
+          <a:xfrm>
+            <a:off x="573932" y="4719918"/>
+            <a:ext cx="2227634" cy="230832"/>
+          </a:xfrm>
+          <a:prstGeom prst="rect">
+            <a:avLst/>
+          </a:prstGeom>
+          <a:noFill/>
+        </p:spPr>
+        <p:txBody>
+          <a:bodyPr wrap="square" rtlCol="0">
+            <a:spAutoFit/>
           </a:bodyPr>
           <a:lstStyle/>
           <a:p>
             <a:r>
-              <a:rPr lang="en-US" dirty="0" smtClean="0"/>
-              <a:t>Packages, Variables, Constants</a:t>
-            </a:r>
-            <a:endParaRPr lang="en-US" dirty="0"/>
-          </a:p>
-        </p:txBody>
-      </p:sp>
-      <p:sp>
-        <p:nvSpPr>
-          <p:cNvPr id="5" name="Text Placeholder 4"/>
-          <p:cNvSpPr>
-            <a:spLocks noGrp="1"/>
-          </p:cNvSpPr>
-          <p:nvPr>
-            <p:ph type="body" sz="quarter" idx="12"/>
-          </p:nvPr>
-        </p:nvSpPr>
-        <p:spPr/>
-        <p:txBody>
-          <a:bodyPr>
-            <a:normAutofit lnSpcReduction="10000"/>
-          </a:bodyPr>
-          <a:lstStyle/>
-          <a:p>
-            <a:endParaRPr lang="en-US"/>
+              <a:rPr lang="en-US" sz="900" dirty="0" smtClean="0">
+                <a:solidFill>
+                  <a:schemeClr val="tx1">
+                    <a:lumMod val="50000"/>
+                    <a:lumOff val="50000"/>
+                  </a:schemeClr>
+                </a:solidFill>
+              </a:rPr>
+              <a:t>Source: </a:t>
+            </a:r>
+            <a:r>
+              <a:rPr lang="en-US" sz="900" dirty="0" err="1" smtClean="0">
+                <a:solidFill>
+                  <a:schemeClr val="tx1">
+                    <a:lumMod val="50000"/>
+                    <a:lumOff val="50000"/>
+                  </a:schemeClr>
+                </a:solidFill>
+              </a:rPr>
+              <a:t>TechTarget</a:t>
+            </a:r>
+            <a:endParaRPr lang="en-US" sz="900" dirty="0" smtClean="0">
+              <a:solidFill>
+                <a:schemeClr val="tx1">
+                  <a:lumMod val="50000"/>
+                  <a:lumOff val="50000"/>
+                </a:schemeClr>
+              </a:solidFill>
+            </a:endParaRPr>
           </a:p>
         </p:txBody>
       </p:sp>
     </p:spTree>
     <p:extLst>
       <p:ext uri="{BB962C8B-B14F-4D97-AF65-F5344CB8AC3E}">
-        <p14:creationId xmlns:p14="http://schemas.microsoft.com/office/powerpoint/2010/main" val="1798359152"/>
+        <p14:creationId xmlns:p14="http://schemas.microsoft.com/office/powerpoint/2010/main" val="1378049175"/>
       </p:ext>
     </p:extLst>
   </p:cSld>
@@ -13473,7 +15065,7 @@
           <a:p>
             <a:r>
               <a:rPr lang="en-US" dirty="0" smtClean="0"/>
-              <a:t>Packages</a:t>
+              <a:t>Statically typed</a:t>
             </a:r>
             <a:endParaRPr lang="en-US" dirty="0"/>
           </a:p>
@@ -13496,32 +15088,128 @@
           <a:p>
             <a:r>
               <a:rPr lang="en-US" dirty="0"/>
-              <a:t>Every Go program is made up of packages.</a:t>
-            </a:r>
-          </a:p>
-          <a:p>
+              <a:t>Statically typed programming languages do type </a:t>
+            </a:r>
+            <a:r>
+              <a:rPr lang="en-US" dirty="0" smtClean="0"/>
+              <a:t>checking, i.e., verification </a:t>
+            </a:r>
+            <a:r>
+              <a:rPr lang="en-US" dirty="0"/>
+              <a:t>and </a:t>
+            </a:r>
+            <a:r>
+              <a:rPr lang="en-US" dirty="0" smtClean="0"/>
+              <a:t>enforcement of type constraints, at </a:t>
+            </a:r>
+            <a:r>
+              <a:rPr lang="en-US" dirty="0"/>
+              <a:t>compile-time as opposed to run-time. </a:t>
+            </a:r>
+            <a:endParaRPr lang="en-US" dirty="0" smtClean="0"/>
+          </a:p>
+          <a:p>
+            <a:pPr lvl="1"/>
+            <a:r>
+              <a:rPr lang="en-US" dirty="0" smtClean="0"/>
+              <a:t>E.g. C/C++, Java</a:t>
+            </a:r>
+          </a:p>
+          <a:p>
+            <a:r>
+              <a:rPr lang="en-US" dirty="0" smtClean="0"/>
+              <a:t>Dynamically </a:t>
+            </a:r>
+            <a:r>
+              <a:rPr lang="en-US" dirty="0"/>
+              <a:t>typed programming languages </a:t>
+            </a:r>
+            <a:r>
+              <a:rPr lang="en-US" dirty="0" smtClean="0"/>
+              <a:t>perform </a:t>
+            </a:r>
+            <a:r>
+              <a:rPr lang="en-US" dirty="0"/>
+              <a:t>type checking at </a:t>
+            </a:r>
+            <a:r>
+              <a:rPr lang="en-US" dirty="0" smtClean="0"/>
+              <a:t>run time instead of compile time </a:t>
+            </a:r>
+          </a:p>
+          <a:p>
+            <a:pPr lvl="1"/>
+            <a:r>
+              <a:rPr lang="en-US" dirty="0" smtClean="0"/>
+              <a:t>E.g</a:t>
+            </a:r>
+            <a:r>
+              <a:rPr lang="en-US" dirty="0" smtClean="0"/>
+              <a:t>. Perl, Ruby, Python</a:t>
+            </a:r>
             <a:endParaRPr lang="en-US" dirty="0"/>
           </a:p>
-          <a:p>
-            <a:r>
-              <a:rPr lang="en-US" dirty="0"/>
-              <a:t>Programs start running in package </a:t>
-            </a:r>
-            <a:r>
-              <a:rPr lang="en-US" b="1" dirty="0"/>
-              <a:t>main</a:t>
-            </a:r>
-            <a:r>
-              <a:rPr lang="en-US" dirty="0"/>
-              <a:t>.</a:t>
-            </a:r>
+        </p:txBody>
+      </p:sp>
+      <p:sp>
+        <p:nvSpPr>
+          <p:cNvPr id="4" name="TextBox 3"/>
+          <p:cNvSpPr txBox="1"/>
+          <p:nvPr/>
+        </p:nvSpPr>
+        <p:spPr>
+          <a:xfrm>
+            <a:off x="573932" y="4719918"/>
+            <a:ext cx="2227634" cy="230832"/>
+          </a:xfrm>
+          <a:prstGeom prst="rect">
+            <a:avLst/>
+          </a:prstGeom>
+          <a:noFill/>
+        </p:spPr>
+        <p:txBody>
+          <a:bodyPr wrap="square" rtlCol="0">
+            <a:spAutoFit/>
+          </a:bodyPr>
+          <a:lstStyle/>
+          <a:p>
+            <a:r>
+              <a:rPr lang="en-US" sz="900" dirty="0" smtClean="0">
+                <a:solidFill>
+                  <a:schemeClr val="tx1">
+                    <a:lumMod val="50000"/>
+                    <a:lumOff val="50000"/>
+                  </a:schemeClr>
+                </a:solidFill>
+              </a:rPr>
+              <a:t>Source: </a:t>
+            </a:r>
+            <a:r>
+              <a:rPr lang="en-US" sz="900" dirty="0" err="1" smtClean="0">
+                <a:solidFill>
+                  <a:schemeClr val="tx1">
+                    <a:lumMod val="50000"/>
+                    <a:lumOff val="50000"/>
+                  </a:schemeClr>
+                </a:solidFill>
+              </a:rPr>
+              <a:t>StackOverflow</a:t>
+            </a:r>
+            <a:endParaRPr lang="en-US" sz="900" dirty="0" smtClean="0">
+              <a:solidFill>
+                <a:schemeClr val="tx1">
+                  <a:lumMod val="50000"/>
+                  <a:lumOff val="50000"/>
+                </a:schemeClr>
+              </a:solidFill>
+            </a:endParaRPr>
           </a:p>
         </p:txBody>
       </p:sp>
     </p:spTree>
     <p:extLst>
       <p:ext uri="{BB962C8B-B14F-4D97-AF65-F5344CB8AC3E}">
-        <p14:creationId xmlns:p14="http://schemas.microsoft.com/office/powerpoint/2010/main" val="2179189596"/>
+        <p14:creationId xmlns:p14="http://schemas.microsoft.com/office/powerpoint/2010/main" val="1578336996"/>
       </p:ext>
     </p:extLst>
   </p:cSld>
@@ -13565,7 +15253,7 @@
           <a:p>
             <a:r>
               <a:rPr lang="en-US" dirty="0" smtClean="0"/>
-              <a:t>Exported names</a:t>
+              <a:t>Dependencies in Go</a:t>
             </a:r>
             <a:endParaRPr lang="en-US" dirty="0"/>
           </a:p>
@@ -13587,34 +15275,119 @@
           <a:lstStyle/>
           <a:p>
             <a:r>
+              <a:rPr lang="en-US" dirty="0" smtClean="0"/>
+              <a:t>Go defines </a:t>
+            </a:r>
+            <a:r>
+              <a:rPr lang="en-US" dirty="0" smtClean="0"/>
+              <a:t>unused </a:t>
+            </a:r>
+            <a:r>
               <a:rPr lang="en-US" dirty="0"/>
-              <a:t>In Go, a name is exported if it begins with a capital letter.</a:t>
-            </a:r>
-          </a:p>
-          <a:p>
+              <a:t>dependencies </a:t>
+            </a:r>
+            <a:r>
+              <a:rPr lang="en-US" dirty="0" smtClean="0"/>
+              <a:t>as </a:t>
+            </a:r>
+            <a:r>
+              <a:rPr lang="en-US" dirty="0"/>
+              <a:t>compile-time </a:t>
+            </a:r>
+            <a:r>
+              <a:rPr lang="en-US" dirty="0" smtClean="0"/>
+              <a:t>errors</a:t>
+            </a:r>
+            <a:endParaRPr lang="en-US" dirty="0" smtClean="0"/>
+          </a:p>
+          <a:p>
+            <a:r>
+              <a:rPr lang="en-US" dirty="0" smtClean="0"/>
+              <a:t>If a package is imported and not used, </a:t>
+            </a:r>
+            <a:r>
+              <a:rPr lang="en-US" dirty="0"/>
+              <a:t>the program </a:t>
+            </a:r>
+            <a:r>
+              <a:rPr lang="en-US" dirty="0" smtClean="0"/>
+              <a:t>does not compile</a:t>
+            </a:r>
+            <a:endParaRPr lang="en-US" dirty="0" smtClean="0"/>
+          </a:p>
+          <a:p>
+            <a:r>
+              <a:rPr lang="en-US" dirty="0" smtClean="0"/>
+              <a:t>This guarantees </a:t>
+            </a:r>
+            <a:r>
+              <a:rPr lang="en-US" dirty="0"/>
+              <a:t>by construction that the dependency tree for any Go program is </a:t>
+            </a:r>
+            <a:r>
+              <a:rPr lang="en-US" dirty="0" smtClean="0"/>
+              <a:t>precise. No </a:t>
+            </a:r>
+            <a:r>
+              <a:rPr lang="en-US" dirty="0"/>
+              <a:t>extra code </a:t>
+            </a:r>
+            <a:r>
+              <a:rPr lang="en-US" dirty="0" smtClean="0"/>
+              <a:t>is </a:t>
+            </a:r>
+            <a:r>
+              <a:rPr lang="en-US" dirty="0"/>
+              <a:t>compiled when building the </a:t>
+            </a:r>
+            <a:r>
+              <a:rPr lang="en-US" dirty="0" smtClean="0"/>
+              <a:t>program and this minimizes </a:t>
+            </a:r>
+            <a:r>
+              <a:rPr lang="en-US" dirty="0"/>
+              <a:t>compilation </a:t>
+            </a:r>
+            <a:r>
+              <a:rPr lang="en-US" dirty="0" smtClean="0"/>
+              <a:t>time</a:t>
+            </a:r>
             <a:endParaRPr lang="en-US" dirty="0"/>
           </a:p>
-          <a:p>
-            <a:r>
-              <a:rPr lang="en-US" dirty="0"/>
-              <a:t>When importing a package, you can refer only to its exported names. Any "</a:t>
-            </a:r>
-            <a:r>
-              <a:rPr lang="en-US" dirty="0" err="1"/>
-              <a:t>unexported</a:t>
-            </a:r>
-            <a:r>
-              <a:rPr lang="en-US" dirty="0"/>
-              <a:t>" names are not accessible from outside the package.</a:t>
-            </a:r>
-          </a:p>
-          <a:p>
-            <a:endParaRPr lang="en-US" dirty="0"/>
-          </a:p>
-          <a:p>
-            <a:r>
-              <a:rPr lang="en-US" dirty="0"/>
-              <a:t>Foo is an exported name, as is FOO. The name foo is not exported.</a:t>
+        </p:txBody>
+      </p:sp>
+      <p:sp>
+        <p:nvSpPr>
+          <p:cNvPr id="4" name="Rectangle 3"/>
+          <p:cNvSpPr/>
+          <p:nvPr/>
+        </p:nvSpPr>
+        <p:spPr>
+          <a:xfrm>
+            <a:off x="457200" y="4429892"/>
+            <a:ext cx="2876108" cy="246221"/>
+          </a:xfrm>
+          <a:prstGeom prst="rect">
+            <a:avLst/>
+          </a:prstGeom>
+        </p:spPr>
+        <p:txBody>
+          <a:bodyPr wrap="none">
+            <a:spAutoFit/>
+          </a:bodyPr>
+          <a:lstStyle/>
+          <a:p>
+            <a:r>
+              <a:rPr lang="en-US" sz="1000" dirty="0" smtClean="0">
+                <a:latin typeface="Calibri" panose="020F0502020204030204" pitchFamily="34" charset="0"/>
+              </a:rPr>
+              <a:t>Source: https</a:t>
+            </a:r>
+            <a:r>
+              <a:rPr lang="en-US" sz="1000" dirty="0">
+                <a:latin typeface="Calibri" panose="020F0502020204030204" pitchFamily="34" charset="0"/>
+              </a:rPr>
+              <a:t>://talks.golang.org/2012/splash.article</a:t>
             </a:r>
           </a:p>
         </p:txBody>
@@ -13622,7 +15395,7 @@
     </p:spTree>
     <p:extLst>
       <p:ext uri="{BB962C8B-B14F-4D97-AF65-F5344CB8AC3E}">
-        <p14:creationId xmlns:p14="http://schemas.microsoft.com/office/powerpoint/2010/main" val="480797736"/>
+        <p14:creationId xmlns:p14="http://schemas.microsoft.com/office/powerpoint/2010/main" val="2250959739"/>
       </p:ext>
     </p:extLst>
   </p:cSld>
@@ -13666,7 +15439,7 @@
           <a:p>
             <a:r>
               <a:rPr lang="en-US" dirty="0" smtClean="0"/>
-              <a:t>Variables</a:t>
+              <a:t>Naming and visibility</a:t>
             </a:r>
             <a:endParaRPr lang="en-US" dirty="0"/>
           </a:p>
@@ -13688,33 +15461,143 @@
           <a:lstStyle/>
           <a:p>
             <a:r>
+              <a:rPr lang="en-US" dirty="0" smtClean="0"/>
+              <a:t>The variable name </a:t>
+            </a:r>
+            <a:r>
               <a:rPr lang="en-US" dirty="0"/>
-              <a:t>The </a:t>
-            </a:r>
-            <a:r>
-              <a:rPr lang="en-US" dirty="0" err="1"/>
-              <a:t>var</a:t>
+              <a:t>itself carries </a:t>
+            </a:r>
+            <a:r>
+              <a:rPr lang="en-US" dirty="0" smtClean="0"/>
+              <a:t>information on whether </a:t>
+            </a:r>
+            <a:r>
+              <a:rPr lang="en-US" dirty="0" smtClean="0"/>
+              <a:t>a variable in Public or </a:t>
+            </a:r>
+            <a:r>
+              <a:rPr lang="en-US" dirty="0" smtClean="0"/>
+              <a:t>Private. This is determined by the case </a:t>
             </a:r>
             <a:r>
               <a:rPr lang="en-US" dirty="0"/>
-              <a:t> statement declares a list of variables; as in function argument lists, the type is last.</a:t>
-            </a:r>
-          </a:p>
-          <a:p>
+              <a:t>of the initial letter of the </a:t>
+            </a:r>
+            <a:r>
+              <a:rPr lang="en-US" dirty="0" smtClean="0"/>
+              <a:t>identifier </a:t>
+            </a:r>
+            <a:endParaRPr lang="en-US" dirty="0" smtClean="0"/>
+          </a:p>
+          <a:p>
+            <a:r>
+              <a:rPr lang="en-US" dirty="0" smtClean="0"/>
+              <a:t>If </a:t>
+            </a:r>
+            <a:r>
+              <a:rPr lang="en-US" dirty="0"/>
+              <a:t>the initial character is </a:t>
+            </a:r>
+            <a:r>
+              <a:rPr lang="en-US" dirty="0" smtClean="0"/>
+              <a:t>in upper case, </a:t>
+            </a:r>
+            <a:r>
+              <a:rPr lang="en-US" dirty="0"/>
+              <a:t>the identifier is exported </a:t>
+            </a:r>
+            <a:r>
+              <a:rPr lang="en-US" dirty="0" smtClean="0"/>
+              <a:t> as Public, </a:t>
+            </a:r>
+            <a:r>
+              <a:rPr lang="en-US" dirty="0"/>
+              <a:t>otherwise it is </a:t>
+            </a:r>
+            <a:r>
+              <a:rPr lang="en-US" dirty="0" smtClean="0"/>
+              <a:t>treated as Private:</a:t>
+            </a:r>
             <a:endParaRPr lang="en-US" dirty="0"/>
           </a:p>
           <a:p>
+            <a:pPr lvl="1"/>
+            <a:r>
+              <a:rPr lang="en-US" dirty="0" smtClean="0"/>
+              <a:t>&lt;</a:t>
+            </a:r>
+            <a:r>
+              <a:rPr lang="en-US" u="sng" dirty="0" smtClean="0"/>
+              <a:t>N</a:t>
+            </a:r>
+            <a:r>
+              <a:rPr lang="en-US" dirty="0" smtClean="0"/>
+              <a:t>ame&gt; </a:t>
+            </a:r>
             <a:r>
               <a:rPr lang="en-US" dirty="0"/>
-              <a:t>A </a:t>
-            </a:r>
-            <a:r>
-              <a:rPr lang="en-US" dirty="0" err="1"/>
-              <a:t>var</a:t>
+              <a:t>is visible to clients of package</a:t>
+            </a:r>
+          </a:p>
+          <a:p>
+            <a:pPr lvl="1"/>
+            <a:r>
+              <a:rPr lang="en-US" dirty="0" smtClean="0"/>
+              <a:t>&lt;name&gt; </a:t>
             </a:r>
             <a:r>
               <a:rPr lang="en-US" dirty="0"/>
-              <a:t> statement can be at package or function level. </a:t>
+              <a:t>(or </a:t>
+            </a:r>
+            <a:r>
+              <a:rPr lang="en-US" dirty="0" smtClean="0"/>
+              <a:t>&lt;_Name&gt;) - this </a:t>
+            </a:r>
+            <a:r>
+              <a:rPr lang="en-US" dirty="0"/>
+              <a:t>is not visible to clients of </a:t>
+            </a:r>
+            <a:r>
+              <a:rPr lang="en-US" dirty="0" smtClean="0"/>
+              <a:t>the package</a:t>
+            </a:r>
+            <a:endParaRPr lang="en-US" dirty="0"/>
+          </a:p>
+        </p:txBody>
+      </p:sp>
+      <p:sp>
+        <p:nvSpPr>
+          <p:cNvPr id="5" name="Rectangle 4"/>
+          <p:cNvSpPr/>
+          <p:nvPr/>
+        </p:nvSpPr>
+        <p:spPr>
+          <a:xfrm>
+            <a:off x="457200" y="4429892"/>
+            <a:ext cx="2876108" cy="246221"/>
+          </a:xfrm>
+          <a:prstGeom prst="rect">
+            <a:avLst/>
+          </a:prstGeom>
+        </p:spPr>
+        <p:txBody>
+          <a:bodyPr wrap="none">
+            <a:spAutoFit/>
+          </a:bodyPr>
+          <a:lstStyle/>
+          <a:p>
+            <a:r>
+              <a:rPr lang="en-US" sz="1000" dirty="0" smtClean="0">
+                <a:latin typeface="Calibri" panose="020F0502020204030204" pitchFamily="34" charset="0"/>
+              </a:rPr>
+              <a:t>Source: https</a:t>
+            </a:r>
+            <a:r>
+              <a:rPr lang="en-US" sz="1000" dirty="0">
+                <a:latin typeface="Calibri" panose="020F0502020204030204" pitchFamily="34" charset="0"/>
+              </a:rPr>
+              <a:t>://talks.golang.org/2012/splash.article</a:t>
             </a:r>
           </a:p>
         </p:txBody>
@@ -13722,7 +15605,7 @@
     </p:spTree>
     <p:extLst>
       <p:ext uri="{BB962C8B-B14F-4D97-AF65-F5344CB8AC3E}">
-        <p14:creationId xmlns:p14="http://schemas.microsoft.com/office/powerpoint/2010/main" val="492609667"/>
+        <p14:creationId xmlns:p14="http://schemas.microsoft.com/office/powerpoint/2010/main" val="676277336"/>
       </p:ext>
     </p:extLst>
   </p:cSld>
@@ -14292,21 +16175,6 @@
 </file>
 
 <file path=customXml/item1.xml><?xml version="1.0" encoding="utf-8"?>
-<?mso-contentType ?>
-<FormTemplates xmlns="http://schemas.microsoft.com/sharepoint/v3/contenttype/forms">
-  <Display>DocumentLibraryForm</Display>
-  <Edit>DocumentLibraryForm</Edit>
-  <New>DocumentLibraryForm</New>
-</FormTemplates>
-</file>
-
-<file path=customXml/item2.xml><?xml version="1.0" encoding="utf-8"?>
-<p:properties xmlns:p="http://schemas.microsoft.com/office/2006/metadata/properties" xmlns:xsi="http://www.w3.org/2001/XMLSchema-instance" xmlns:pc="http://schemas.microsoft.com/office/infopath/2007/PartnerControls">
-  <documentManagement/>
-</p:properties>
-</file>
-
-<file path=customXml/item3.xml><?xml version="1.0" encoding="utf-8"?>
 <ct:contentTypeSchema xmlns:ct="http://schemas.microsoft.com/office/2006/metadata/contentType" xmlns:ma="http://schemas.microsoft.com/office/2006/metadata/properties/metaAttributes" ct:_="" ma:_="" ma:contentTypeName="Document" ma:contentTypeID="0x010100045942E58BAAE443A917BD23F90BB461" ma:contentTypeVersion="0" ma:contentTypeDescription="Create a new document." ma:contentTypeScope="" ma:versionID="4ccd8ca7c382e5aa3edc5420ff5317fb">
   <xsd:schema xmlns:xsd="http://www.w3.org/2001/XMLSchema" xmlns:xs="http://www.w3.org/2001/XMLSchema" xmlns:p="http://schemas.microsoft.com/office/2006/metadata/properties" targetNamespace="http://schemas.microsoft.com/office/2006/metadata/properties" ma:root="true" ma:fieldsID="06e0e3112098b4d1518554ee266199a9">
     <xsd:element name="properties">
@@ -14420,30 +16288,22 @@
 </ct:contentTypeSchema>
 </file>
 
-<file path=customXml/itemProps1.xml><?xml version="1.0" encoding="utf-8"?>
-<ds:datastoreItem xmlns:ds="http://schemas.openxmlformats.org/officeDocument/2006/customXml" ds:itemID="{D7900DE2-572D-4B07-A4D8-5AF0F1C66077}">
-  <ds:schemaRefs>
-    <ds:schemaRef ds:uri="http://schemas.microsoft.com/sharepoint/v3/contenttype/forms"/>
-  </ds:schemaRefs>
-</ds:datastoreItem>
+<file path=customXml/item2.xml><?xml version="1.0" encoding="utf-8"?>
+<p:properties xmlns:p="http://schemas.microsoft.com/office/2006/metadata/properties" xmlns:xsi="http://www.w3.org/2001/XMLSchema-instance" xmlns:pc="http://schemas.microsoft.com/office/infopath/2007/PartnerControls">
+  <documentManagement/>
+</p:properties>
 </file>
 
-<file path=customXml/itemProps2.xml><?xml version="1.0" encoding="utf-8"?>
-<ds:datastoreItem xmlns:ds="http://schemas.openxmlformats.org/officeDocument/2006/customXml" ds:itemID="{48B79823-585F-4DAE-9341-8D446E410456}">
-  <ds:schemaRefs>
-    <ds:schemaRef ds:uri="http://schemas.microsoft.com/office/2006/documentManagement/types"/>
-    <ds:schemaRef ds:uri="http://schemas.microsoft.com/office/infopath/2007/PartnerControls"/>
-    <ds:schemaRef ds:uri="http://purl.org/dc/elements/1.1/"/>
-    <ds:schemaRef ds:uri="http://schemas.microsoft.com/office/2006/metadata/properties"/>
-    <ds:schemaRef ds:uri="http://purl.org/dc/terms/"/>
-    <ds:schemaRef ds:uri="http://schemas.openxmlformats.org/package/2006/metadata/core-properties"/>
-    <ds:schemaRef ds:uri="http://www.w3.org/XML/1998/namespace"/>
-    <ds:schemaRef ds:uri="http://purl.org/dc/dcmitype/"/>
-  </ds:schemaRefs>
-</ds:datastoreItem>
+<file path=customXml/item3.xml><?xml version="1.0" encoding="utf-8"?>
+<?mso-contentType ?>
+<FormTemplates xmlns="http://schemas.microsoft.com/sharepoint/v3/contenttype/forms">
+  <Display>DocumentLibraryForm</Display>
+  <Edit>DocumentLibraryForm</Edit>
+  <New>DocumentLibraryForm</New>
+</FormTemplates>
 </file>
 
-<file path=customXml/itemProps3.xml><?xml version="1.0" encoding="utf-8"?>
+<file path=customXml/itemProps1.xml><?xml version="1.0" encoding="utf-8"?>
 <ds:datastoreItem xmlns:ds="http://schemas.openxmlformats.org/officeDocument/2006/customXml" ds:itemID="{B7014F99-208B-45EA-9A90-8426599A5225}">
   <ds:schemaRefs>
     <ds:schemaRef ds:uri="http://schemas.microsoft.com/office/2006/metadata/contentType"/>
@@ -14457,4 +16317,27 @@
     <ds:schemaRef ds:uri="http://schemas.microsoft.com/office/infopath/2007/PartnerControls"/>
   </ds:schemaRefs>
 </ds:datastoreItem>
+</file>
+
+<file path=customXml/itemProps2.xml><?xml version="1.0" encoding="utf-8"?>
+<ds:datastoreItem xmlns:ds="http://schemas.openxmlformats.org/officeDocument/2006/customXml" ds:itemID="{48B79823-585F-4DAE-9341-8D446E410456}">
+  <ds:schemaRefs>
+    <ds:schemaRef ds:uri="http://schemas.microsoft.com/office/2006/metadata/properties"/>
+    <ds:schemaRef ds:uri="http://www.w3.org/XML/1998/namespace"/>
+    <ds:schemaRef ds:uri="http://purl.org/dc/elements/1.1/"/>
+    <ds:schemaRef ds:uri="http://schemas.microsoft.com/office/2006/documentManagement/types"/>
+    <ds:schemaRef ds:uri="http://purl.org/dc/dcmitype/"/>
+    <ds:schemaRef ds:uri="http://schemas.microsoft.com/office/infopath/2007/PartnerControls"/>
+    <ds:schemaRef ds:uri="http://schemas.openxmlformats.org/package/2006/metadata/core-properties"/>
+    <ds:schemaRef ds:uri="http://purl.org/dc/terms/"/>
+  </ds:schemaRefs>
+</ds:datastoreItem>
+</file>
+
+<file path=customXml/itemProps3.xml><?xml version="1.0" encoding="utf-8"?>
+<ds:datastoreItem xmlns:ds="http://schemas.openxmlformats.org/officeDocument/2006/customXml" ds:itemID="{D7900DE2-572D-4B07-A4D8-5AF0F1C66077}">
+  <ds:schemaRefs>
+    <ds:schemaRef ds:uri="http://schemas.microsoft.com/sharepoint/v3/contenttype/forms"/>
+  </ds:schemaRefs>
+</ds:datastoreItem>
 </file>
</xml_diff>